<commit_message>
resized the banner and removd old banner files
</commit_message>
<xml_diff>
--- a/images/AzureCitadelBanner.pptx
+++ b/images/AzureCitadelBanner.pptx
@@ -4,6 +4,9 @@
   <p:sldMasterIdLst>
     <p:sldMasterId id="2147483648" r:id="rId1"/>
   </p:sldMasterIdLst>
+  <p:notesMasterIdLst>
+    <p:notesMasterId r:id="rId4"/>
+  </p:notesMasterIdLst>
   <p:sldIdLst>
     <p:sldId id="256" r:id="rId2"/>
     <p:sldId id="257" r:id="rId3"/>
@@ -105,7 +108,534 @@
       </a:defRPr>
     </a:lvl9pPr>
   </p:defaultTextStyle>
+  <p:extLst>
+    <p:ext uri="{EFAFB233-063F-42B5-8137-9DF3F51BA10A}">
+      <p15:sldGuideLst xmlns:p15="http://schemas.microsoft.com/office/powerpoint/2012/main"/>
+    </p:ext>
+  </p:extLst>
 </p:presentation>
+</file>
+
+<file path=ppt/revisionInfo.xml><?xml version="1.0" encoding="utf-8"?>
+<p1510:revInfo xmlns:a="http://schemas.openxmlformats.org/drawingml/2006/main" xmlns:r="http://schemas.openxmlformats.org/officeDocument/2006/relationships" xmlns:p1510="http://schemas.microsoft.com/office/powerpoint/2015/10/main"/>
+</file>
+
+<file path=ppt/notesMasters/notesMaster1.xml><?xml version="1.0" encoding="utf-8"?>
+<p:notesMaster xmlns:a="http://schemas.openxmlformats.org/drawingml/2006/main" xmlns:r="http://schemas.openxmlformats.org/officeDocument/2006/relationships" xmlns:p="http://schemas.openxmlformats.org/presentationml/2006/main">
+  <p:cSld>
+    <p:bg>
+      <p:bgRef idx="1001">
+        <a:schemeClr val="bg1"/>
+      </p:bgRef>
+    </p:bg>
+    <p:spTree>
+      <p:nvGrpSpPr>
+        <p:cNvPr id="1" name=""/>
+        <p:cNvGrpSpPr/>
+        <p:nvPr/>
+      </p:nvGrpSpPr>
+      <p:grpSpPr>
+        <a:xfrm>
+          <a:off x="0" y="0"/>
+          <a:ext cx="0" cy="0"/>
+          <a:chOff x="0" y="0"/>
+          <a:chExt cx="0" cy="0"/>
+        </a:xfrm>
+      </p:grpSpPr>
+      <p:sp>
+        <p:nvSpPr>
+          <p:cNvPr id="2" name="Header Placeholder 1"/>
+          <p:cNvSpPr>
+            <a:spLocks noGrp="1"/>
+          </p:cNvSpPr>
+          <p:nvPr>
+            <p:ph type="hdr" sz="quarter"/>
+          </p:nvPr>
+        </p:nvSpPr>
+        <p:spPr>
+          <a:xfrm>
+            <a:off x="0" y="0"/>
+            <a:ext cx="2971800" cy="458788"/>
+          </a:xfrm>
+          <a:prstGeom prst="rect">
+            <a:avLst/>
+          </a:prstGeom>
+        </p:spPr>
+        <p:txBody>
+          <a:bodyPr vert="horz" lIns="91440" tIns="45720" rIns="91440" bIns="45720" rtlCol="0"/>
+          <a:lstStyle>
+            <a:lvl1pPr algn="l">
+              <a:defRPr sz="1200"/>
+            </a:lvl1pPr>
+          </a:lstStyle>
+          <a:p>
+            <a:endParaRPr lang="en-GB"/>
+          </a:p>
+        </p:txBody>
+      </p:sp>
+      <p:sp>
+        <p:nvSpPr>
+          <p:cNvPr id="3" name="Date Placeholder 2"/>
+          <p:cNvSpPr>
+            <a:spLocks noGrp="1"/>
+          </p:cNvSpPr>
+          <p:nvPr>
+            <p:ph type="dt" idx="1"/>
+          </p:nvPr>
+        </p:nvSpPr>
+        <p:spPr>
+          <a:xfrm>
+            <a:off x="3884613" y="0"/>
+            <a:ext cx="2971800" cy="458788"/>
+          </a:xfrm>
+          <a:prstGeom prst="rect">
+            <a:avLst/>
+          </a:prstGeom>
+        </p:spPr>
+        <p:txBody>
+          <a:bodyPr vert="horz" lIns="91440" tIns="45720" rIns="91440" bIns="45720" rtlCol="0"/>
+          <a:lstStyle>
+            <a:lvl1pPr algn="r">
+              <a:defRPr sz="1200"/>
+            </a:lvl1pPr>
+          </a:lstStyle>
+          <a:p>
+            <a:fld id="{7B6D4EAA-ACCA-462D-97CE-B7FFB398C493}" type="datetimeFigureOut">
+              <a:rPr lang="en-GB" smtClean="0"/>
+              <a:t>28/09/2017</a:t>
+            </a:fld>
+            <a:endParaRPr lang="en-GB"/>
+          </a:p>
+        </p:txBody>
+      </p:sp>
+      <p:sp>
+        <p:nvSpPr>
+          <p:cNvPr id="4" name="Slide Image Placeholder 3"/>
+          <p:cNvSpPr>
+            <a:spLocks noGrp="1" noRot="1" noChangeAspect="1"/>
+          </p:cNvSpPr>
+          <p:nvPr>
+            <p:ph type="sldImg" idx="2"/>
+          </p:nvPr>
+        </p:nvSpPr>
+        <p:spPr>
+          <a:xfrm>
+            <a:off x="685800" y="1143000"/>
+            <a:ext cx="5486400" cy="3086100"/>
+          </a:xfrm>
+          <a:prstGeom prst="rect">
+            <a:avLst/>
+          </a:prstGeom>
+          <a:noFill/>
+          <a:ln w="12700">
+            <a:solidFill>
+              <a:prstClr val="black"/>
+            </a:solidFill>
+          </a:ln>
+        </p:spPr>
+        <p:txBody>
+          <a:bodyPr vert="horz" lIns="91440" tIns="45720" rIns="91440" bIns="45720" rtlCol="0" anchor="ctr"/>
+          <a:lstStyle/>
+          <a:p>
+            <a:endParaRPr lang="en-GB"/>
+          </a:p>
+        </p:txBody>
+      </p:sp>
+      <p:sp>
+        <p:nvSpPr>
+          <p:cNvPr id="5" name="Notes Placeholder 4"/>
+          <p:cNvSpPr>
+            <a:spLocks noGrp="1"/>
+          </p:cNvSpPr>
+          <p:nvPr>
+            <p:ph type="body" sz="quarter" idx="3"/>
+          </p:nvPr>
+        </p:nvSpPr>
+        <p:spPr>
+          <a:xfrm>
+            <a:off x="685800" y="4400550"/>
+            <a:ext cx="5486400" cy="3600450"/>
+          </a:xfrm>
+          <a:prstGeom prst="rect">
+            <a:avLst/>
+          </a:prstGeom>
+        </p:spPr>
+        <p:txBody>
+          <a:bodyPr vert="horz" lIns="91440" tIns="45720" rIns="91440" bIns="45720" rtlCol="0"/>
+          <a:lstStyle/>
+          <a:p>
+            <a:pPr lvl="0"/>
+            <a:r>
+              <a:rPr lang="en-US"/>
+              <a:t>Edit Master text styles</a:t>
+            </a:r>
+          </a:p>
+          <a:p>
+            <a:pPr lvl="1"/>
+            <a:r>
+              <a:rPr lang="en-US"/>
+              <a:t>Second level</a:t>
+            </a:r>
+          </a:p>
+          <a:p>
+            <a:pPr lvl="2"/>
+            <a:r>
+              <a:rPr lang="en-US"/>
+              <a:t>Third level</a:t>
+            </a:r>
+          </a:p>
+          <a:p>
+            <a:pPr lvl="3"/>
+            <a:r>
+              <a:rPr lang="en-US"/>
+              <a:t>Fourth level</a:t>
+            </a:r>
+          </a:p>
+          <a:p>
+            <a:pPr lvl="4"/>
+            <a:r>
+              <a:rPr lang="en-US"/>
+              <a:t>Fifth level</a:t>
+            </a:r>
+            <a:endParaRPr lang="en-GB"/>
+          </a:p>
+        </p:txBody>
+      </p:sp>
+      <p:sp>
+        <p:nvSpPr>
+          <p:cNvPr id="6" name="Footer Placeholder 5"/>
+          <p:cNvSpPr>
+            <a:spLocks noGrp="1"/>
+          </p:cNvSpPr>
+          <p:nvPr>
+            <p:ph type="ftr" sz="quarter" idx="4"/>
+          </p:nvPr>
+        </p:nvSpPr>
+        <p:spPr>
+          <a:xfrm>
+            <a:off x="0" y="8685213"/>
+            <a:ext cx="2971800" cy="458787"/>
+          </a:xfrm>
+          <a:prstGeom prst="rect">
+            <a:avLst/>
+          </a:prstGeom>
+        </p:spPr>
+        <p:txBody>
+          <a:bodyPr vert="horz" lIns="91440" tIns="45720" rIns="91440" bIns="45720" rtlCol="0" anchor="b"/>
+          <a:lstStyle>
+            <a:lvl1pPr algn="l">
+              <a:defRPr sz="1200"/>
+            </a:lvl1pPr>
+          </a:lstStyle>
+          <a:p>
+            <a:endParaRPr lang="en-GB"/>
+          </a:p>
+        </p:txBody>
+      </p:sp>
+      <p:sp>
+        <p:nvSpPr>
+          <p:cNvPr id="7" name="Slide Number Placeholder 6"/>
+          <p:cNvSpPr>
+            <a:spLocks noGrp="1"/>
+          </p:cNvSpPr>
+          <p:nvPr>
+            <p:ph type="sldNum" sz="quarter" idx="5"/>
+          </p:nvPr>
+        </p:nvSpPr>
+        <p:spPr>
+          <a:xfrm>
+            <a:off x="3884613" y="8685213"/>
+            <a:ext cx="2971800" cy="458787"/>
+          </a:xfrm>
+          <a:prstGeom prst="rect">
+            <a:avLst/>
+          </a:prstGeom>
+        </p:spPr>
+        <p:txBody>
+          <a:bodyPr vert="horz" lIns="91440" tIns="45720" rIns="91440" bIns="45720" rtlCol="0" anchor="b"/>
+          <a:lstStyle>
+            <a:lvl1pPr algn="r">
+              <a:defRPr sz="1200"/>
+            </a:lvl1pPr>
+          </a:lstStyle>
+          <a:p>
+            <a:fld id="{984CEC9C-25B7-49AF-B8DB-71646D1676F1}" type="slidenum">
+              <a:rPr lang="en-GB" smtClean="0"/>
+              <a:t>‹#›</a:t>
+            </a:fld>
+            <a:endParaRPr lang="en-GB"/>
+          </a:p>
+        </p:txBody>
+      </p:sp>
+    </p:spTree>
+    <p:extLst>
+      <p:ext uri="{BB962C8B-B14F-4D97-AF65-F5344CB8AC3E}">
+        <p14:creationId xmlns:p14="http://schemas.microsoft.com/office/powerpoint/2010/main" val="947414316"/>
+      </p:ext>
+    </p:extLst>
+  </p:cSld>
+  <p:clrMap bg1="lt1" tx1="dk1" bg2="lt2" tx2="dk2" accent1="accent1" accent2="accent2" accent3="accent3" accent4="accent4" accent5="accent5" accent6="accent6" hlink="hlink" folHlink="folHlink"/>
+  <p:notesStyle>
+    <a:lvl1pPr marL="0" algn="l" defTabSz="914400" rtl="0" eaLnBrk="1" latinLnBrk="0" hangingPunct="1">
+      <a:defRPr sz="1200" kern="1200">
+        <a:solidFill>
+          <a:schemeClr val="tx1"/>
+        </a:solidFill>
+        <a:latin typeface="+mn-lt"/>
+        <a:ea typeface="+mn-ea"/>
+        <a:cs typeface="+mn-cs"/>
+      </a:defRPr>
+    </a:lvl1pPr>
+    <a:lvl2pPr marL="457200" algn="l" defTabSz="914400" rtl="0" eaLnBrk="1" latinLnBrk="0" hangingPunct="1">
+      <a:defRPr sz="1200" kern="1200">
+        <a:solidFill>
+          <a:schemeClr val="tx1"/>
+        </a:solidFill>
+        <a:latin typeface="+mn-lt"/>
+        <a:ea typeface="+mn-ea"/>
+        <a:cs typeface="+mn-cs"/>
+      </a:defRPr>
+    </a:lvl2pPr>
+    <a:lvl3pPr marL="914400" algn="l" defTabSz="914400" rtl="0" eaLnBrk="1" latinLnBrk="0" hangingPunct="1">
+      <a:defRPr sz="1200" kern="1200">
+        <a:solidFill>
+          <a:schemeClr val="tx1"/>
+        </a:solidFill>
+        <a:latin typeface="+mn-lt"/>
+        <a:ea typeface="+mn-ea"/>
+        <a:cs typeface="+mn-cs"/>
+      </a:defRPr>
+    </a:lvl3pPr>
+    <a:lvl4pPr marL="1371600" algn="l" defTabSz="914400" rtl="0" eaLnBrk="1" latinLnBrk="0" hangingPunct="1">
+      <a:defRPr sz="1200" kern="1200">
+        <a:solidFill>
+          <a:schemeClr val="tx1"/>
+        </a:solidFill>
+        <a:latin typeface="+mn-lt"/>
+        <a:ea typeface="+mn-ea"/>
+        <a:cs typeface="+mn-cs"/>
+      </a:defRPr>
+    </a:lvl4pPr>
+    <a:lvl5pPr marL="1828800" algn="l" defTabSz="914400" rtl="0" eaLnBrk="1" latinLnBrk="0" hangingPunct="1">
+      <a:defRPr sz="1200" kern="1200">
+        <a:solidFill>
+          <a:schemeClr val="tx1"/>
+        </a:solidFill>
+        <a:latin typeface="+mn-lt"/>
+        <a:ea typeface="+mn-ea"/>
+        <a:cs typeface="+mn-cs"/>
+      </a:defRPr>
+    </a:lvl5pPr>
+    <a:lvl6pPr marL="2286000" algn="l" defTabSz="914400" rtl="0" eaLnBrk="1" latinLnBrk="0" hangingPunct="1">
+      <a:defRPr sz="1200" kern="1200">
+        <a:solidFill>
+          <a:schemeClr val="tx1"/>
+        </a:solidFill>
+        <a:latin typeface="+mn-lt"/>
+        <a:ea typeface="+mn-ea"/>
+        <a:cs typeface="+mn-cs"/>
+      </a:defRPr>
+    </a:lvl6pPr>
+    <a:lvl7pPr marL="2743200" algn="l" defTabSz="914400" rtl="0" eaLnBrk="1" latinLnBrk="0" hangingPunct="1">
+      <a:defRPr sz="1200" kern="1200">
+        <a:solidFill>
+          <a:schemeClr val="tx1"/>
+        </a:solidFill>
+        <a:latin typeface="+mn-lt"/>
+        <a:ea typeface="+mn-ea"/>
+        <a:cs typeface="+mn-cs"/>
+      </a:defRPr>
+    </a:lvl7pPr>
+    <a:lvl8pPr marL="3200400" algn="l" defTabSz="914400" rtl="0" eaLnBrk="1" latinLnBrk="0" hangingPunct="1">
+      <a:defRPr sz="1200" kern="1200">
+        <a:solidFill>
+          <a:schemeClr val="tx1"/>
+        </a:solidFill>
+        <a:latin typeface="+mn-lt"/>
+        <a:ea typeface="+mn-ea"/>
+        <a:cs typeface="+mn-cs"/>
+      </a:defRPr>
+    </a:lvl8pPr>
+    <a:lvl9pPr marL="3657600" algn="l" defTabSz="914400" rtl="0" eaLnBrk="1" latinLnBrk="0" hangingPunct="1">
+      <a:defRPr sz="1200" kern="1200">
+        <a:solidFill>
+          <a:schemeClr val="tx1"/>
+        </a:solidFill>
+        <a:latin typeface="+mn-lt"/>
+        <a:ea typeface="+mn-ea"/>
+        <a:cs typeface="+mn-cs"/>
+      </a:defRPr>
+    </a:lvl9pPr>
+  </p:notesStyle>
+</p:notesMaster>
+</file>
+
+<file path=ppt/notesSlides/notesSlide1.xml><?xml version="1.0" encoding="utf-8"?>
+<p:notes xmlns:a="http://schemas.openxmlformats.org/drawingml/2006/main" xmlns:r="http://schemas.openxmlformats.org/officeDocument/2006/relationships" xmlns:p="http://schemas.openxmlformats.org/presentationml/2006/main">
+  <p:cSld>
+    <p:spTree>
+      <p:nvGrpSpPr>
+        <p:cNvPr id="1" name=""/>
+        <p:cNvGrpSpPr/>
+        <p:nvPr/>
+      </p:nvGrpSpPr>
+      <p:grpSpPr>
+        <a:xfrm>
+          <a:off x="0" y="0"/>
+          <a:ext cx="0" cy="0"/>
+          <a:chOff x="0" y="0"/>
+          <a:chExt cx="0" cy="0"/>
+        </a:xfrm>
+      </p:grpSpPr>
+      <p:sp>
+        <p:nvSpPr>
+          <p:cNvPr id="2" name="Slide Image Placeholder 1"/>
+          <p:cNvSpPr>
+            <a:spLocks noGrp="1" noRot="1" noChangeAspect="1"/>
+          </p:cNvSpPr>
+          <p:nvPr>
+            <p:ph type="sldImg"/>
+          </p:nvPr>
+        </p:nvSpPr>
+        <p:spPr/>
+      </p:sp>
+      <p:sp>
+        <p:nvSpPr>
+          <p:cNvPr id="3" name="Notes Placeholder 2"/>
+          <p:cNvSpPr>
+            <a:spLocks noGrp="1"/>
+          </p:cNvSpPr>
+          <p:nvPr>
+            <p:ph type="body" idx="1"/>
+          </p:nvPr>
+        </p:nvSpPr>
+        <p:spPr/>
+        <p:txBody>
+          <a:bodyPr/>
+          <a:lstStyle/>
+          <a:p>
+            <a:endParaRPr lang="en-GB"/>
+          </a:p>
+        </p:txBody>
+      </p:sp>
+      <p:sp>
+        <p:nvSpPr>
+          <p:cNvPr id="4" name="Slide Number Placeholder 3"/>
+          <p:cNvSpPr>
+            <a:spLocks noGrp="1"/>
+          </p:cNvSpPr>
+          <p:nvPr>
+            <p:ph type="sldNum" sz="quarter" idx="10"/>
+          </p:nvPr>
+        </p:nvSpPr>
+        <p:spPr/>
+        <p:txBody>
+          <a:bodyPr/>
+          <a:lstStyle/>
+          <a:p>
+            <a:fld id="{984CEC9C-25B7-49AF-B8DB-71646D1676F1}" type="slidenum">
+              <a:rPr lang="en-GB" smtClean="0"/>
+              <a:t>1</a:t>
+            </a:fld>
+            <a:endParaRPr lang="en-GB"/>
+          </a:p>
+        </p:txBody>
+      </p:sp>
+    </p:spTree>
+    <p:extLst>
+      <p:ext uri="{BB962C8B-B14F-4D97-AF65-F5344CB8AC3E}">
+        <p14:creationId xmlns:p14="http://schemas.microsoft.com/office/powerpoint/2010/main" val="2562800207"/>
+      </p:ext>
+    </p:extLst>
+  </p:cSld>
+  <p:clrMapOvr>
+    <a:masterClrMapping/>
+  </p:clrMapOvr>
+</p:notes>
+</file>
+
+<file path=ppt/notesSlides/notesSlide2.xml><?xml version="1.0" encoding="utf-8"?>
+<p:notes xmlns:a="http://schemas.openxmlformats.org/drawingml/2006/main" xmlns:r="http://schemas.openxmlformats.org/officeDocument/2006/relationships" xmlns:p="http://schemas.openxmlformats.org/presentationml/2006/main">
+  <p:cSld>
+    <p:spTree>
+      <p:nvGrpSpPr>
+        <p:cNvPr id="1" name=""/>
+        <p:cNvGrpSpPr/>
+        <p:nvPr/>
+      </p:nvGrpSpPr>
+      <p:grpSpPr>
+        <a:xfrm>
+          <a:off x="0" y="0"/>
+          <a:ext cx="0" cy="0"/>
+          <a:chOff x="0" y="0"/>
+          <a:chExt cx="0" cy="0"/>
+        </a:xfrm>
+      </p:grpSpPr>
+      <p:sp>
+        <p:nvSpPr>
+          <p:cNvPr id="2" name="Slide Image Placeholder 1"/>
+          <p:cNvSpPr>
+            <a:spLocks noGrp="1" noRot="1" noChangeAspect="1"/>
+          </p:cNvSpPr>
+          <p:nvPr>
+            <p:ph type="sldImg"/>
+          </p:nvPr>
+        </p:nvSpPr>
+        <p:spPr/>
+      </p:sp>
+      <p:sp>
+        <p:nvSpPr>
+          <p:cNvPr id="3" name="Notes Placeholder 2"/>
+          <p:cNvSpPr>
+            <a:spLocks noGrp="1"/>
+          </p:cNvSpPr>
+          <p:nvPr>
+            <p:ph type="body" idx="1"/>
+          </p:nvPr>
+        </p:nvSpPr>
+        <p:spPr/>
+        <p:txBody>
+          <a:bodyPr/>
+          <a:lstStyle/>
+          <a:p>
+            <a:endParaRPr lang="en-GB"/>
+          </a:p>
+        </p:txBody>
+      </p:sp>
+      <p:sp>
+        <p:nvSpPr>
+          <p:cNvPr id="4" name="Slide Number Placeholder 3"/>
+          <p:cNvSpPr>
+            <a:spLocks noGrp="1"/>
+          </p:cNvSpPr>
+          <p:nvPr>
+            <p:ph type="sldNum" sz="quarter" idx="10"/>
+          </p:nvPr>
+        </p:nvSpPr>
+        <p:spPr/>
+        <p:txBody>
+          <a:bodyPr/>
+          <a:lstStyle/>
+          <a:p>
+            <a:fld id="{984CEC9C-25B7-49AF-B8DB-71646D1676F1}" type="slidenum">
+              <a:rPr lang="en-GB" smtClean="0"/>
+              <a:t>2</a:t>
+            </a:fld>
+            <a:endParaRPr lang="en-GB"/>
+          </a:p>
+        </p:txBody>
+      </p:sp>
+    </p:spTree>
+    <p:extLst>
+      <p:ext uri="{BB962C8B-B14F-4D97-AF65-F5344CB8AC3E}">
+        <p14:creationId xmlns:p14="http://schemas.microsoft.com/office/powerpoint/2010/main" val="1504944839"/>
+      </p:ext>
+    </p:extLst>
+  </p:cSld>
+  <p:clrMapOvr>
+    <a:masterClrMapping/>
+  </p:clrMapOvr>
+</p:notes>
 </file>
 
 <file path=ppt/slideLayouts/slideLayout1.xml><?xml version="1.0" encoding="utf-8"?>
@@ -257,7 +787,7 @@
           <a:p>
             <a:fld id="{3A34A2D0-F9BC-4E75-AABA-0F8BFEBF7988}" type="datetimeFigureOut">
               <a:rPr lang="en-GB" smtClean="0"/>
-              <a:t>18/09/2017</a:t>
+              <a:t>28/09/2017</a:t>
             </a:fld>
             <a:endParaRPr lang="en-GB"/>
           </a:p>
@@ -457,7 +987,7 @@
           <a:p>
             <a:fld id="{3A34A2D0-F9BC-4E75-AABA-0F8BFEBF7988}" type="datetimeFigureOut">
               <a:rPr lang="en-GB" smtClean="0"/>
-              <a:t>18/09/2017</a:t>
+              <a:t>28/09/2017</a:t>
             </a:fld>
             <a:endParaRPr lang="en-GB"/>
           </a:p>
@@ -667,7 +1197,7 @@
           <a:p>
             <a:fld id="{3A34A2D0-F9BC-4E75-AABA-0F8BFEBF7988}" type="datetimeFigureOut">
               <a:rPr lang="en-GB" smtClean="0"/>
-              <a:t>18/09/2017</a:t>
+              <a:t>28/09/2017</a:t>
             </a:fld>
             <a:endParaRPr lang="en-GB"/>
           </a:p>
@@ -867,7 +1397,7 @@
           <a:p>
             <a:fld id="{3A34A2D0-F9BC-4E75-AABA-0F8BFEBF7988}" type="datetimeFigureOut">
               <a:rPr lang="en-GB" smtClean="0"/>
-              <a:t>18/09/2017</a:t>
+              <a:t>28/09/2017</a:t>
             </a:fld>
             <a:endParaRPr lang="en-GB"/>
           </a:p>
@@ -1143,7 +1673,7 @@
           <a:p>
             <a:fld id="{3A34A2D0-F9BC-4E75-AABA-0F8BFEBF7988}" type="datetimeFigureOut">
               <a:rPr lang="en-GB" smtClean="0"/>
-              <a:t>18/09/2017</a:t>
+              <a:t>28/09/2017</a:t>
             </a:fld>
             <a:endParaRPr lang="en-GB"/>
           </a:p>
@@ -1411,7 +1941,7 @@
           <a:p>
             <a:fld id="{3A34A2D0-F9BC-4E75-AABA-0F8BFEBF7988}" type="datetimeFigureOut">
               <a:rPr lang="en-GB" smtClean="0"/>
-              <a:t>18/09/2017</a:t>
+              <a:t>28/09/2017</a:t>
             </a:fld>
             <a:endParaRPr lang="en-GB"/>
           </a:p>
@@ -1826,7 +2356,7 @@
           <a:p>
             <a:fld id="{3A34A2D0-F9BC-4E75-AABA-0F8BFEBF7988}" type="datetimeFigureOut">
               <a:rPr lang="en-GB" smtClean="0"/>
-              <a:t>18/09/2017</a:t>
+              <a:t>28/09/2017</a:t>
             </a:fld>
             <a:endParaRPr lang="en-GB"/>
           </a:p>
@@ -1968,7 +2498,7 @@
           <a:p>
             <a:fld id="{3A34A2D0-F9BC-4E75-AABA-0F8BFEBF7988}" type="datetimeFigureOut">
               <a:rPr lang="en-GB" smtClean="0"/>
-              <a:t>18/09/2017</a:t>
+              <a:t>28/09/2017</a:t>
             </a:fld>
             <a:endParaRPr lang="en-GB"/>
           </a:p>
@@ -2081,7 +2611,7 @@
           <a:p>
             <a:fld id="{3A34A2D0-F9BC-4E75-AABA-0F8BFEBF7988}" type="datetimeFigureOut">
               <a:rPr lang="en-GB" smtClean="0"/>
-              <a:t>18/09/2017</a:t>
+              <a:t>28/09/2017</a:t>
             </a:fld>
             <a:endParaRPr lang="en-GB"/>
           </a:p>
@@ -2394,7 +2924,7 @@
           <a:p>
             <a:fld id="{3A34A2D0-F9BC-4E75-AABA-0F8BFEBF7988}" type="datetimeFigureOut">
               <a:rPr lang="en-GB" smtClean="0"/>
-              <a:t>18/09/2017</a:t>
+              <a:t>28/09/2017</a:t>
             </a:fld>
             <a:endParaRPr lang="en-GB"/>
           </a:p>
@@ -2683,7 +3213,7 @@
           <a:p>
             <a:fld id="{3A34A2D0-F9BC-4E75-AABA-0F8BFEBF7988}" type="datetimeFigureOut">
               <a:rPr lang="en-GB" smtClean="0"/>
-              <a:t>18/09/2017</a:t>
+              <a:t>28/09/2017</a:t>
             </a:fld>
             <a:endParaRPr lang="en-GB"/>
           </a:p>
@@ -2926,7 +3456,7 @@
           <a:p>
             <a:fld id="{3A34A2D0-F9BC-4E75-AABA-0F8BFEBF7988}" type="datetimeFigureOut">
               <a:rPr lang="en-GB" smtClean="0"/>
-              <a:t>18/09/2017</a:t>
+              <a:t>28/09/2017</a:t>
             </a:fld>
             <a:endParaRPr lang="en-GB"/>
           </a:p>
@@ -3357,8 +3887,8 @@
         </p:nvSpPr>
         <p:spPr>
           <a:xfrm>
-            <a:off x="397336" y="3672502"/>
-            <a:ext cx="11356521" cy="791022"/>
+            <a:off x="397336" y="3776554"/>
+            <a:ext cx="11356521" cy="686969"/>
           </a:xfrm>
           <a:prstGeom prst="rect">
             <a:avLst/>
@@ -3409,8 +3939,8 @@
         </p:nvSpPr>
         <p:spPr>
           <a:xfrm>
-            <a:off x="397335" y="404884"/>
-            <a:ext cx="11356521" cy="3267617"/>
+            <a:off x="397335" y="1348346"/>
+            <a:ext cx="11356521" cy="2429385"/>
           </a:xfrm>
           <a:prstGeom prst="rect">
             <a:avLst/>
@@ -3447,45 +3977,6 @@
           </a:p>
         </p:txBody>
       </p:sp>
-      <p:pic>
-        <p:nvPicPr>
-          <p:cNvPr id="172" name="Graphic 171">
-            <a:extLst>
-              <a:ext uri="{FF2B5EF4-FFF2-40B4-BE49-F238E27FC236}">
-                <a16:creationId xmlns:a16="http://schemas.microsoft.com/office/drawing/2014/main" id="{D742ED65-150B-446D-B285-041F63ABD497}"/>
-              </a:ext>
-            </a:extLst>
-          </p:cNvPr>
-          <p:cNvPicPr>
-            <a:picLocks noChangeAspect="1"/>
-          </p:cNvPicPr>
-          <p:nvPr/>
-        </p:nvPicPr>
-        <p:blipFill>
-          <a:blip r:embed="rId2">
-            <a:extLst>
-              <a:ext uri="{28A0092B-C50C-407E-A947-70E740481C1C}">
-                <a14:useLocalDpi xmlns:a14="http://schemas.microsoft.com/office/drawing/2010/main" val="0"/>
-              </a:ext>
-              <a:ext uri="{96DAC541-7B7A-43D3-8B79-37D633B846F1}">
-                <asvg:svgBlip xmlns:asvg="http://schemas.microsoft.com/office/drawing/2016/SVG/main" r:embed="rId3"/>
-              </a:ext>
-            </a:extLst>
-          </a:blip>
-          <a:stretch>
-            <a:fillRect/>
-          </a:stretch>
-        </p:blipFill>
-        <p:spPr>
-          <a:xfrm>
-            <a:off x="-750637" y="-808999"/>
-            <a:ext cx="4848844" cy="6858000"/>
-          </a:xfrm>
-          <a:prstGeom prst="rect">
-            <a:avLst/>
-          </a:prstGeom>
-        </p:spPr>
-      </p:pic>
       <p:grpSp>
         <p:nvGrpSpPr>
           <p:cNvPr id="173" name="Group 172">
@@ -3500,10 +3991,10 @@
         </p:nvGrpSpPr>
         <p:grpSpPr>
           <a:xfrm>
-            <a:off x="3700257" y="2825088"/>
-            <a:ext cx="3182764" cy="1651760"/>
+            <a:off x="3700257" y="2824793"/>
+            <a:ext cx="3182764" cy="1637951"/>
             <a:chOff x="320675" y="3908425"/>
-            <a:chExt cx="1538288" cy="949326"/>
+            <a:chExt cx="1538288" cy="941388"/>
           </a:xfrm>
         </p:grpSpPr>
         <p:sp>
@@ -3522,7 +4013,7 @@
           </p:nvSpPr>
           <p:spPr bwMode="auto">
             <a:xfrm>
-              <a:off x="493713" y="4087813"/>
+              <a:off x="493713" y="4078687"/>
               <a:ext cx="73025" cy="769938"/>
             </a:xfrm>
             <a:custGeom>
@@ -4770,8 +5261,8 @@
           </p:nvSpPr>
           <p:spPr bwMode="auto">
             <a:xfrm>
-              <a:off x="1120775" y="4411663"/>
-              <a:ext cx="239713" cy="438150"/>
+              <a:off x="1088231" y="4333875"/>
+              <a:ext cx="250033" cy="514813"/>
             </a:xfrm>
             <a:custGeom>
               <a:avLst/>
@@ -4820,7 +5311,7 @@
               </a:pathLst>
             </a:custGeom>
             <a:solidFill>
-              <a:srgbClr val="007029"/>
+              <a:srgbClr val="005C21"/>
             </a:solidFill>
             <a:ln>
               <a:noFill/>
@@ -4961,8 +5452,8 @@
         </p:nvGrpSpPr>
         <p:grpSpPr>
           <a:xfrm>
-            <a:off x="9766981" y="1269867"/>
-            <a:ext cx="2070496" cy="1287474"/>
+            <a:off x="9324532" y="2022451"/>
+            <a:ext cx="2256901" cy="1147814"/>
             <a:chOff x="1550988" y="2668588"/>
             <a:chExt cx="1587500" cy="846138"/>
           </a:xfrm>
@@ -5568,7 +6059,7 @@
         </p:nvSpPr>
         <p:spPr>
           <a:xfrm>
-            <a:off x="3883507" y="681038"/>
+            <a:off x="3225951" y="1554139"/>
             <a:ext cx="6670362" cy="1200329"/>
           </a:xfrm>
           <a:prstGeom prst="rect">
@@ -5609,8 +6100,8 @@
         </p:nvGrpSpPr>
         <p:grpSpPr>
           <a:xfrm>
-            <a:off x="8100644" y="2266041"/>
-            <a:ext cx="3653686" cy="2195038"/>
+            <a:off x="8850490" y="2940264"/>
+            <a:ext cx="2903840" cy="1521291"/>
             <a:chOff x="2490788" y="4079875"/>
             <a:chExt cx="1163638" cy="601663"/>
           </a:xfrm>
@@ -6165,7 +6656,2332 @@
               </a:pathLst>
             </a:custGeom>
             <a:solidFill>
-              <a:srgbClr val="FFFFFF"/>
+              <a:schemeClr val="accent6">
+                <a:lumMod val="50000"/>
+              </a:schemeClr>
+            </a:solidFill>
+            <a:ln>
+              <a:noFill/>
+            </a:ln>
+            <a:extLst>
+              <a:ext uri="{91240B29-F687-4F45-9708-019B960494DF}">
+                <a14:hiddenLine xmlns:a14="http://schemas.microsoft.com/office/drawing/2010/main" w="9525">
+                  <a:solidFill>
+                    <a:srgbClr val="000000"/>
+                  </a:solidFill>
+                  <a:round/>
+                  <a:headEnd/>
+                  <a:tailEnd/>
+                </a14:hiddenLine>
+              </a:ext>
+            </a:extLst>
+          </p:spPr>
+          <p:txBody>
+            <a:bodyPr vert="horz" wrap="square" lIns="91440" tIns="45720" rIns="91440" bIns="45720" numCol="1" anchor="t" anchorCtr="0" compatLnSpc="1">
+              <a:prstTxWarp prst="textNoShape">
+                <a:avLst/>
+              </a:prstTxWarp>
+            </a:bodyPr>
+            <a:lstStyle/>
+            <a:p>
+              <a:endParaRPr lang="en-US"/>
+            </a:p>
+          </p:txBody>
+        </p:sp>
+      </p:grpSp>
+      <p:grpSp>
+        <p:nvGrpSpPr>
+          <p:cNvPr id="62" name="Group 61">
+            <a:extLst>
+              <a:ext uri="{FF2B5EF4-FFF2-40B4-BE49-F238E27FC236}">
+                <a16:creationId xmlns:a16="http://schemas.microsoft.com/office/drawing/2014/main" id="{73CBB873-BA45-4D82-B18C-A9B628432543}"/>
+              </a:ext>
+            </a:extLst>
+          </p:cNvPr>
+          <p:cNvGrpSpPr/>
+          <p:nvPr/>
+        </p:nvGrpSpPr>
+        <p:grpSpPr>
+          <a:xfrm>
+            <a:off x="892257" y="1453351"/>
+            <a:ext cx="2016520" cy="3008204"/>
+            <a:chOff x="7006571" y="1010691"/>
+            <a:chExt cx="2637198" cy="3934119"/>
+          </a:xfrm>
+        </p:grpSpPr>
+        <p:sp>
+          <p:nvSpPr>
+            <p:cNvPr id="63" name="Rectangle 428">
+              <a:extLst>
+                <a:ext uri="{FF2B5EF4-FFF2-40B4-BE49-F238E27FC236}">
+                  <a16:creationId xmlns:a16="http://schemas.microsoft.com/office/drawing/2014/main" id="{25F87F93-6A5F-4492-809E-EF83069760F2}"/>
+                </a:ext>
+              </a:extLst>
+            </p:cNvPr>
+            <p:cNvSpPr>
+              <a:spLocks noChangeArrowheads="1"/>
+            </p:cNvSpPr>
+            <p:nvPr/>
+          </p:nvSpPr>
+          <p:spPr bwMode="auto">
+            <a:xfrm rot="18753471">
+              <a:off x="7577072" y="2965315"/>
+              <a:ext cx="388975" cy="762892"/>
+            </a:xfrm>
+            <a:prstGeom prst="rect">
+              <a:avLst/>
+            </a:prstGeom>
+            <a:solidFill>
+              <a:srgbClr val="40CDF5"/>
+            </a:solidFill>
+            <a:ln>
+              <a:noFill/>
+            </a:ln>
+            <a:extLst>
+              <a:ext uri="{91240B29-F687-4F45-9708-019B960494DF}">
+                <a14:hiddenLine xmlns:a14="http://schemas.microsoft.com/office/drawing/2010/main" w="9525">
+                  <a:solidFill>
+                    <a:srgbClr val="000000"/>
+                  </a:solidFill>
+                  <a:miter lim="800000"/>
+                  <a:headEnd/>
+                  <a:tailEnd/>
+                </a14:hiddenLine>
+              </a:ext>
+            </a:extLst>
+          </p:spPr>
+          <p:txBody>
+            <a:bodyPr vert="horz" wrap="square" lIns="91440" tIns="45720" rIns="91440" bIns="45720" numCol="1" anchor="t" anchorCtr="0" compatLnSpc="1">
+              <a:prstTxWarp prst="textNoShape">
+                <a:avLst/>
+              </a:prstTxWarp>
+            </a:bodyPr>
+            <a:lstStyle/>
+            <a:p>
+              <a:endParaRPr lang="en-US"/>
+            </a:p>
+          </p:txBody>
+        </p:sp>
+        <p:sp>
+          <p:nvSpPr>
+            <p:cNvPr id="64" name="Freeform 591">
+              <a:extLst>
+                <a:ext uri="{FF2B5EF4-FFF2-40B4-BE49-F238E27FC236}">
+                  <a16:creationId xmlns:a16="http://schemas.microsoft.com/office/drawing/2014/main" id="{DE445C3C-A2F8-4ADC-8B46-FB19073D660A}"/>
+                </a:ext>
+              </a:extLst>
+            </p:cNvPr>
+            <p:cNvSpPr>
+              <a:spLocks/>
+            </p:cNvSpPr>
+            <p:nvPr/>
+          </p:nvSpPr>
+          <p:spPr bwMode="auto">
+            <a:xfrm>
+              <a:off x="8513390" y="2061610"/>
+              <a:ext cx="941023" cy="499524"/>
+            </a:xfrm>
+            <a:custGeom>
+              <a:avLst/>
+              <a:gdLst>
+                <a:gd name="T0" fmla="*/ 147 w 170"/>
+                <a:gd name="T1" fmla="*/ 45 h 91"/>
+                <a:gd name="T2" fmla="*/ 146 w 170"/>
+                <a:gd name="T3" fmla="*/ 45 h 91"/>
+                <a:gd name="T4" fmla="*/ 101 w 170"/>
+                <a:gd name="T5" fmla="*/ 0 h 91"/>
+                <a:gd name="T6" fmla="*/ 56 w 170"/>
+                <a:gd name="T7" fmla="*/ 40 h 91"/>
+                <a:gd name="T8" fmla="*/ 31 w 170"/>
+                <a:gd name="T9" fmla="*/ 28 h 91"/>
+                <a:gd name="T10" fmla="*/ 0 w 170"/>
+                <a:gd name="T11" fmla="*/ 60 h 91"/>
+                <a:gd name="T12" fmla="*/ 31 w 170"/>
+                <a:gd name="T13" fmla="*/ 91 h 91"/>
+                <a:gd name="T14" fmla="*/ 147 w 170"/>
+                <a:gd name="T15" fmla="*/ 91 h 91"/>
+                <a:gd name="T16" fmla="*/ 170 w 170"/>
+                <a:gd name="T17" fmla="*/ 68 h 91"/>
+                <a:gd name="T18" fmla="*/ 147 w 170"/>
+                <a:gd name="T19" fmla="*/ 45 h 91"/>
+              </a:gdLst>
+              <a:ahLst/>
+              <a:cxnLst>
+                <a:cxn ang="0">
+                  <a:pos x="T0" y="T1"/>
+                </a:cxn>
+                <a:cxn ang="0">
+                  <a:pos x="T2" y="T3"/>
+                </a:cxn>
+                <a:cxn ang="0">
+                  <a:pos x="T4" y="T5"/>
+                </a:cxn>
+                <a:cxn ang="0">
+                  <a:pos x="T6" y="T7"/>
+                </a:cxn>
+                <a:cxn ang="0">
+                  <a:pos x="T8" y="T9"/>
+                </a:cxn>
+                <a:cxn ang="0">
+                  <a:pos x="T10" y="T11"/>
+                </a:cxn>
+                <a:cxn ang="0">
+                  <a:pos x="T12" y="T13"/>
+                </a:cxn>
+                <a:cxn ang="0">
+                  <a:pos x="T14" y="T15"/>
+                </a:cxn>
+                <a:cxn ang="0">
+                  <a:pos x="T16" y="T17"/>
+                </a:cxn>
+                <a:cxn ang="0">
+                  <a:pos x="T18" y="T19"/>
+                </a:cxn>
+              </a:cxnLst>
+              <a:rect l="0" t="0" r="r" b="b"/>
+              <a:pathLst>
+                <a:path w="170" h="91">
+                  <a:moveTo>
+                    <a:pt x="147" y="45"/>
+                  </a:moveTo>
+                  <a:cubicBezTo>
+                    <a:pt x="146" y="45"/>
+                    <a:pt x="146" y="45"/>
+                    <a:pt x="146" y="45"/>
+                  </a:cubicBezTo>
+                  <a:cubicBezTo>
+                    <a:pt x="146" y="20"/>
+                    <a:pt x="126" y="0"/>
+                    <a:pt x="101" y="0"/>
+                  </a:cubicBezTo>
+                  <a:cubicBezTo>
+                    <a:pt x="78" y="0"/>
+                    <a:pt x="59" y="18"/>
+                    <a:pt x="56" y="40"/>
+                  </a:cubicBezTo>
+                  <a:cubicBezTo>
+                    <a:pt x="50" y="33"/>
+                    <a:pt x="41" y="28"/>
+                    <a:pt x="31" y="28"/>
+                  </a:cubicBezTo>
+                  <a:cubicBezTo>
+                    <a:pt x="14" y="28"/>
+                    <a:pt x="0" y="42"/>
+                    <a:pt x="0" y="60"/>
+                  </a:cubicBezTo>
+                  <a:cubicBezTo>
+                    <a:pt x="0" y="77"/>
+                    <a:pt x="14" y="91"/>
+                    <a:pt x="31" y="91"/>
+                  </a:cubicBezTo>
+                  <a:cubicBezTo>
+                    <a:pt x="147" y="91"/>
+                    <a:pt x="147" y="91"/>
+                    <a:pt x="147" y="91"/>
+                  </a:cubicBezTo>
+                  <a:cubicBezTo>
+                    <a:pt x="160" y="91"/>
+                    <a:pt x="170" y="81"/>
+                    <a:pt x="170" y="68"/>
+                  </a:cubicBezTo>
+                  <a:cubicBezTo>
+                    <a:pt x="170" y="56"/>
+                    <a:pt x="160" y="45"/>
+                    <a:pt x="147" y="45"/>
+                  </a:cubicBezTo>
+                  <a:close/>
+                </a:path>
+              </a:pathLst>
+            </a:custGeom>
+            <a:solidFill>
+              <a:schemeClr val="bg1">
+                <a:lumMod val="95000"/>
+              </a:schemeClr>
+            </a:solidFill>
+            <a:ln>
+              <a:noFill/>
+            </a:ln>
+            <a:extLst>
+              <a:ext uri="{91240B29-F687-4F45-9708-019B960494DF}">
+                <a14:hiddenLine xmlns:a14="http://schemas.microsoft.com/office/drawing/2010/main" w="9525">
+                  <a:solidFill>
+                    <a:srgbClr val="000000"/>
+                  </a:solidFill>
+                  <a:round/>
+                  <a:headEnd/>
+                  <a:tailEnd/>
+                </a14:hiddenLine>
+              </a:ext>
+            </a:extLst>
+          </p:spPr>
+          <p:txBody>
+            <a:bodyPr vert="horz" wrap="square" lIns="91440" tIns="45720" rIns="91440" bIns="45720" numCol="1" anchor="t" anchorCtr="0" compatLnSpc="1">
+              <a:prstTxWarp prst="textNoShape">
+                <a:avLst/>
+              </a:prstTxWarp>
+            </a:bodyPr>
+            <a:lstStyle/>
+            <a:p>
+              <a:endParaRPr lang="en-US"/>
+            </a:p>
+          </p:txBody>
+        </p:sp>
+        <p:grpSp>
+          <p:nvGrpSpPr>
+            <p:cNvPr id="65" name="Group 64">
+              <a:extLst>
+                <a:ext uri="{FF2B5EF4-FFF2-40B4-BE49-F238E27FC236}">
+                  <a16:creationId xmlns:a16="http://schemas.microsoft.com/office/drawing/2014/main" id="{153BBCFA-6ABE-495C-B347-0B5AACC25827}"/>
+                </a:ext>
+              </a:extLst>
+            </p:cNvPr>
+            <p:cNvGrpSpPr/>
+            <p:nvPr/>
+          </p:nvGrpSpPr>
+          <p:grpSpPr>
+            <a:xfrm>
+              <a:off x="7363425" y="1699274"/>
+              <a:ext cx="388975" cy="1534850"/>
+              <a:chOff x="6130192" y="1830519"/>
+              <a:chExt cx="719319" cy="2838348"/>
+            </a:xfrm>
+          </p:grpSpPr>
+          <p:sp>
+            <p:nvSpPr>
+              <p:cNvPr id="84" name="Rectangle 428">
+                <a:extLst>
+                  <a:ext uri="{FF2B5EF4-FFF2-40B4-BE49-F238E27FC236}">
+                    <a16:creationId xmlns:a16="http://schemas.microsoft.com/office/drawing/2014/main" id="{38265C2D-84C5-465D-893C-6C21DC835193}"/>
+                  </a:ext>
+                </a:extLst>
+              </p:cNvPr>
+              <p:cNvSpPr>
+                <a:spLocks noChangeArrowheads="1"/>
+              </p:cNvSpPr>
+              <p:nvPr/>
+            </p:nvSpPr>
+            <p:spPr bwMode="auto">
+              <a:xfrm>
+                <a:off x="6130192" y="2500575"/>
+                <a:ext cx="719319" cy="2168292"/>
+              </a:xfrm>
+              <a:prstGeom prst="rect">
+                <a:avLst/>
+              </a:prstGeom>
+              <a:solidFill>
+                <a:srgbClr val="40CDF5"/>
+              </a:solidFill>
+              <a:ln>
+                <a:noFill/>
+              </a:ln>
+              <a:extLst>
+                <a:ext uri="{91240B29-F687-4F45-9708-019B960494DF}">
+                  <a14:hiddenLine xmlns:a14="http://schemas.microsoft.com/office/drawing/2010/main" w="9525">
+                    <a:solidFill>
+                      <a:srgbClr val="000000"/>
+                    </a:solidFill>
+                    <a:miter lim="800000"/>
+                    <a:headEnd/>
+                    <a:tailEnd/>
+                  </a14:hiddenLine>
+                </a:ext>
+              </a:extLst>
+            </p:spPr>
+            <p:txBody>
+              <a:bodyPr vert="horz" wrap="square" lIns="91440" tIns="45720" rIns="91440" bIns="45720" numCol="1" anchor="t" anchorCtr="0" compatLnSpc="1">
+                <a:prstTxWarp prst="textNoShape">
+                  <a:avLst/>
+                </a:prstTxWarp>
+              </a:bodyPr>
+              <a:lstStyle/>
+              <a:p>
+                <a:endParaRPr lang="en-US"/>
+              </a:p>
+            </p:txBody>
+          </p:sp>
+          <p:sp>
+            <p:nvSpPr>
+              <p:cNvPr id="85" name="Oval 438">
+                <a:extLst>
+                  <a:ext uri="{FF2B5EF4-FFF2-40B4-BE49-F238E27FC236}">
+                    <a16:creationId xmlns:a16="http://schemas.microsoft.com/office/drawing/2014/main" id="{1715920A-8564-4FF4-AE6B-65B7877337ED}"/>
+                  </a:ext>
+                </a:extLst>
+              </p:cNvPr>
+              <p:cNvSpPr>
+                <a:spLocks noChangeArrowheads="1"/>
+              </p:cNvSpPr>
+              <p:nvPr/>
+            </p:nvSpPr>
+            <p:spPr bwMode="auto">
+              <a:xfrm>
+                <a:off x="6387722" y="2067047"/>
+                <a:ext cx="213131" cy="236528"/>
+              </a:xfrm>
+              <a:prstGeom prst="ellipse">
+                <a:avLst/>
+              </a:prstGeom>
+              <a:solidFill>
+                <a:srgbClr val="002050"/>
+              </a:solidFill>
+              <a:ln>
+                <a:noFill/>
+              </a:ln>
+              <a:extLst>
+                <a:ext uri="{91240B29-F687-4F45-9708-019B960494DF}">
+                  <a14:hiddenLine xmlns:a14="http://schemas.microsoft.com/office/drawing/2010/main" w="9525">
+                    <a:solidFill>
+                      <a:srgbClr val="000000"/>
+                    </a:solidFill>
+                    <a:round/>
+                    <a:headEnd/>
+                    <a:tailEnd/>
+                  </a14:hiddenLine>
+                </a:ext>
+              </a:extLst>
+            </p:spPr>
+            <p:txBody>
+              <a:bodyPr vert="horz" wrap="square" lIns="91440" tIns="45720" rIns="91440" bIns="45720" numCol="1" anchor="t" anchorCtr="0" compatLnSpc="1">
+                <a:prstTxWarp prst="textNoShape">
+                  <a:avLst/>
+                </a:prstTxWarp>
+              </a:bodyPr>
+              <a:lstStyle/>
+              <a:p>
+                <a:endParaRPr lang="en-US"/>
+              </a:p>
+            </p:txBody>
+          </p:sp>
+          <p:sp>
+            <p:nvSpPr>
+              <p:cNvPr id="86" name="Freeform 439">
+                <a:extLst>
+                  <a:ext uri="{FF2B5EF4-FFF2-40B4-BE49-F238E27FC236}">
+                    <a16:creationId xmlns:a16="http://schemas.microsoft.com/office/drawing/2014/main" id="{F79B91BE-7DF3-4936-B503-BA269496EECD}"/>
+                  </a:ext>
+                </a:extLst>
+              </p:cNvPr>
+              <p:cNvSpPr>
+                <a:spLocks/>
+              </p:cNvSpPr>
+              <p:nvPr/>
+            </p:nvSpPr>
+            <p:spPr bwMode="auto">
+              <a:xfrm>
+                <a:off x="6272279" y="2855475"/>
+                <a:ext cx="444022" cy="453346"/>
+              </a:xfrm>
+              <a:custGeom>
+                <a:avLst/>
+                <a:gdLst>
+                  <a:gd name="T0" fmla="*/ 12 w 23"/>
+                  <a:gd name="T1" fmla="*/ 0 h 21"/>
+                  <a:gd name="T2" fmla="*/ 0 w 23"/>
+                  <a:gd name="T3" fmla="*/ 12 h 21"/>
+                  <a:gd name="T4" fmla="*/ 0 w 23"/>
+                  <a:gd name="T5" fmla="*/ 21 h 21"/>
+                  <a:gd name="T6" fmla="*/ 23 w 23"/>
+                  <a:gd name="T7" fmla="*/ 21 h 21"/>
+                  <a:gd name="T8" fmla="*/ 23 w 23"/>
+                  <a:gd name="T9" fmla="*/ 12 h 21"/>
+                  <a:gd name="T10" fmla="*/ 12 w 23"/>
+                  <a:gd name="T11" fmla="*/ 0 h 21"/>
+                </a:gdLst>
+                <a:ahLst/>
+                <a:cxnLst>
+                  <a:cxn ang="0">
+                    <a:pos x="T0" y="T1"/>
+                  </a:cxn>
+                  <a:cxn ang="0">
+                    <a:pos x="T2" y="T3"/>
+                  </a:cxn>
+                  <a:cxn ang="0">
+                    <a:pos x="T4" y="T5"/>
+                  </a:cxn>
+                  <a:cxn ang="0">
+                    <a:pos x="T6" y="T7"/>
+                  </a:cxn>
+                  <a:cxn ang="0">
+                    <a:pos x="T8" y="T9"/>
+                  </a:cxn>
+                  <a:cxn ang="0">
+                    <a:pos x="T10" y="T11"/>
+                  </a:cxn>
+                </a:cxnLst>
+                <a:rect l="0" t="0" r="r" b="b"/>
+                <a:pathLst>
+                  <a:path w="23" h="21">
+                    <a:moveTo>
+                      <a:pt x="12" y="0"/>
+                    </a:moveTo>
+                    <a:cubicBezTo>
+                      <a:pt x="5" y="0"/>
+                      <a:pt x="0" y="5"/>
+                      <a:pt x="0" y="12"/>
+                    </a:cubicBezTo>
+                    <a:cubicBezTo>
+                      <a:pt x="0" y="21"/>
+                      <a:pt x="0" y="21"/>
+                      <a:pt x="0" y="21"/>
+                    </a:cubicBezTo>
+                    <a:cubicBezTo>
+                      <a:pt x="23" y="21"/>
+                      <a:pt x="23" y="21"/>
+                      <a:pt x="23" y="21"/>
+                    </a:cubicBezTo>
+                    <a:cubicBezTo>
+                      <a:pt x="23" y="12"/>
+                      <a:pt x="23" y="12"/>
+                      <a:pt x="23" y="12"/>
+                    </a:cubicBezTo>
+                    <a:cubicBezTo>
+                      <a:pt x="23" y="5"/>
+                      <a:pt x="18" y="0"/>
+                      <a:pt x="12" y="0"/>
+                    </a:cubicBezTo>
+                    <a:close/>
+                  </a:path>
+                </a:pathLst>
+              </a:custGeom>
+              <a:solidFill>
+                <a:srgbClr val="002050"/>
+              </a:solidFill>
+              <a:ln>
+                <a:noFill/>
+              </a:ln>
+              <a:extLst>
+                <a:ext uri="{91240B29-F687-4F45-9708-019B960494DF}">
+                  <a14:hiddenLine xmlns:a14="http://schemas.microsoft.com/office/drawing/2010/main" w="9525">
+                    <a:solidFill>
+                      <a:srgbClr val="000000"/>
+                    </a:solidFill>
+                    <a:round/>
+                    <a:headEnd/>
+                    <a:tailEnd/>
+                  </a14:hiddenLine>
+                </a:ext>
+              </a:extLst>
+            </p:spPr>
+            <p:txBody>
+              <a:bodyPr vert="horz" wrap="square" lIns="91440" tIns="45720" rIns="91440" bIns="45720" numCol="1" anchor="t" anchorCtr="0" compatLnSpc="1">
+                <a:prstTxWarp prst="textNoShape">
+                  <a:avLst/>
+                </a:prstTxWarp>
+              </a:bodyPr>
+              <a:lstStyle/>
+              <a:p>
+                <a:endParaRPr lang="en-US"/>
+              </a:p>
+            </p:txBody>
+          </p:sp>
+          <p:sp>
+            <p:nvSpPr>
+              <p:cNvPr id="87" name="Freeform 486">
+                <a:extLst>
+                  <a:ext uri="{FF2B5EF4-FFF2-40B4-BE49-F238E27FC236}">
+                    <a16:creationId xmlns:a16="http://schemas.microsoft.com/office/drawing/2014/main" id="{3AAFD0B4-15AD-465F-B93D-82D9AE2C089F}"/>
+                  </a:ext>
+                </a:extLst>
+              </p:cNvPr>
+              <p:cNvSpPr>
+                <a:spLocks/>
+              </p:cNvSpPr>
+              <p:nvPr/>
+            </p:nvSpPr>
+            <p:spPr bwMode="auto">
+              <a:xfrm>
+                <a:off x="6130192" y="1830519"/>
+                <a:ext cx="719319" cy="601180"/>
+              </a:xfrm>
+              <a:custGeom>
+                <a:avLst/>
+                <a:gdLst>
+                  <a:gd name="T0" fmla="*/ 42 w 81"/>
+                  <a:gd name="T1" fmla="*/ 0 h 61"/>
+                  <a:gd name="T2" fmla="*/ 0 w 81"/>
+                  <a:gd name="T3" fmla="*/ 61 h 61"/>
+                  <a:gd name="T4" fmla="*/ 81 w 81"/>
+                  <a:gd name="T5" fmla="*/ 61 h 61"/>
+                  <a:gd name="T6" fmla="*/ 42 w 81"/>
+                  <a:gd name="T7" fmla="*/ 0 h 61"/>
+                </a:gdLst>
+                <a:ahLst/>
+                <a:cxnLst>
+                  <a:cxn ang="0">
+                    <a:pos x="T0" y="T1"/>
+                  </a:cxn>
+                  <a:cxn ang="0">
+                    <a:pos x="T2" y="T3"/>
+                  </a:cxn>
+                  <a:cxn ang="0">
+                    <a:pos x="T4" y="T5"/>
+                  </a:cxn>
+                  <a:cxn ang="0">
+                    <a:pos x="T6" y="T7"/>
+                  </a:cxn>
+                </a:cxnLst>
+                <a:rect l="0" t="0" r="r" b="b"/>
+                <a:pathLst>
+                  <a:path w="81" h="61">
+                    <a:moveTo>
+                      <a:pt x="42" y="0"/>
+                    </a:moveTo>
+                    <a:lnTo>
+                      <a:pt x="0" y="61"/>
+                    </a:lnTo>
+                    <a:lnTo>
+                      <a:pt x="81" y="61"/>
+                    </a:lnTo>
+                    <a:lnTo>
+                      <a:pt x="42" y="0"/>
+                    </a:lnTo>
+                    <a:close/>
+                  </a:path>
+                </a:pathLst>
+              </a:custGeom>
+              <a:solidFill>
+                <a:schemeClr val="bg1">
+                  <a:lumMod val="65000"/>
+                </a:schemeClr>
+              </a:solidFill>
+              <a:ln>
+                <a:noFill/>
+              </a:ln>
+              <a:extLst>
+                <a:ext uri="{91240B29-F687-4F45-9708-019B960494DF}">
+                  <a14:hiddenLine xmlns:a14="http://schemas.microsoft.com/office/drawing/2010/main" w="9525">
+                    <a:solidFill>
+                      <a:srgbClr val="000000"/>
+                    </a:solidFill>
+                    <a:round/>
+                    <a:headEnd/>
+                    <a:tailEnd/>
+                  </a14:hiddenLine>
+                </a:ext>
+              </a:extLst>
+            </p:spPr>
+            <p:txBody>
+              <a:bodyPr vert="horz" wrap="square" lIns="91440" tIns="45720" rIns="91440" bIns="45720" numCol="1" anchor="t" anchorCtr="0" compatLnSpc="1">
+                <a:prstTxWarp prst="textNoShape">
+                  <a:avLst/>
+                </a:prstTxWarp>
+              </a:bodyPr>
+              <a:lstStyle/>
+              <a:p>
+                <a:endParaRPr lang="en-US"/>
+              </a:p>
+            </p:txBody>
+          </p:sp>
+          <p:sp>
+            <p:nvSpPr>
+              <p:cNvPr id="88" name="Rectangle 487">
+                <a:extLst>
+                  <a:ext uri="{FF2B5EF4-FFF2-40B4-BE49-F238E27FC236}">
+                    <a16:creationId xmlns:a16="http://schemas.microsoft.com/office/drawing/2014/main" id="{A3EAA4AC-B669-43BF-913B-273DD45B2BFF}"/>
+                  </a:ext>
+                </a:extLst>
+              </p:cNvPr>
+              <p:cNvSpPr>
+                <a:spLocks noChangeArrowheads="1"/>
+              </p:cNvSpPr>
+              <p:nvPr/>
+            </p:nvSpPr>
+            <p:spPr bwMode="auto">
+              <a:xfrm>
+                <a:off x="6369961" y="2816054"/>
+                <a:ext cx="17761" cy="650453"/>
+              </a:xfrm>
+              <a:prstGeom prst="rect">
+                <a:avLst/>
+              </a:prstGeom>
+              <a:solidFill>
+                <a:srgbClr val="40CDF5"/>
+              </a:solidFill>
+              <a:ln>
+                <a:noFill/>
+              </a:ln>
+              <a:extLst>
+                <a:ext uri="{91240B29-F687-4F45-9708-019B960494DF}">
+                  <a14:hiddenLine xmlns:a14="http://schemas.microsoft.com/office/drawing/2010/main" w="9525">
+                    <a:solidFill>
+                      <a:srgbClr val="000000"/>
+                    </a:solidFill>
+                    <a:miter lim="800000"/>
+                    <a:headEnd/>
+                    <a:tailEnd/>
+                  </a14:hiddenLine>
+                </a:ext>
+              </a:extLst>
+            </p:spPr>
+            <p:txBody>
+              <a:bodyPr vert="horz" wrap="square" lIns="91440" tIns="45720" rIns="91440" bIns="45720" numCol="1" anchor="t" anchorCtr="0" compatLnSpc="1">
+                <a:prstTxWarp prst="textNoShape">
+                  <a:avLst/>
+                </a:prstTxWarp>
+              </a:bodyPr>
+              <a:lstStyle/>
+              <a:p>
+                <a:endParaRPr lang="en-US"/>
+              </a:p>
+            </p:txBody>
+          </p:sp>
+          <p:sp>
+            <p:nvSpPr>
+              <p:cNvPr id="89" name="Rectangle 488">
+                <a:extLst>
+                  <a:ext uri="{FF2B5EF4-FFF2-40B4-BE49-F238E27FC236}">
+                    <a16:creationId xmlns:a16="http://schemas.microsoft.com/office/drawing/2014/main" id="{82FF6225-BDF2-49D6-9CD2-8BBA29837CFF}"/>
+                  </a:ext>
+                </a:extLst>
+              </p:cNvPr>
+              <p:cNvSpPr>
+                <a:spLocks noChangeArrowheads="1"/>
+              </p:cNvSpPr>
+              <p:nvPr/>
+            </p:nvSpPr>
+            <p:spPr bwMode="auto">
+              <a:xfrm>
+                <a:off x="6600853" y="2816054"/>
+                <a:ext cx="35522" cy="650453"/>
+              </a:xfrm>
+              <a:prstGeom prst="rect">
+                <a:avLst/>
+              </a:prstGeom>
+              <a:solidFill>
+                <a:srgbClr val="40CDF5"/>
+              </a:solidFill>
+              <a:ln>
+                <a:noFill/>
+              </a:ln>
+              <a:extLst>
+                <a:ext uri="{91240B29-F687-4F45-9708-019B960494DF}">
+                  <a14:hiddenLine xmlns:a14="http://schemas.microsoft.com/office/drawing/2010/main" w="9525">
+                    <a:solidFill>
+                      <a:srgbClr val="000000"/>
+                    </a:solidFill>
+                    <a:miter lim="800000"/>
+                    <a:headEnd/>
+                    <a:tailEnd/>
+                  </a14:hiddenLine>
+                </a:ext>
+              </a:extLst>
+            </p:spPr>
+            <p:txBody>
+              <a:bodyPr vert="horz" wrap="square" lIns="91440" tIns="45720" rIns="91440" bIns="45720" numCol="1" anchor="t" anchorCtr="0" compatLnSpc="1">
+                <a:prstTxWarp prst="textNoShape">
+                  <a:avLst/>
+                </a:prstTxWarp>
+              </a:bodyPr>
+              <a:lstStyle/>
+              <a:p>
+                <a:endParaRPr lang="en-US"/>
+              </a:p>
+            </p:txBody>
+          </p:sp>
+          <p:sp>
+            <p:nvSpPr>
+              <p:cNvPr id="90" name="Rectangle 489">
+                <a:extLst>
+                  <a:ext uri="{FF2B5EF4-FFF2-40B4-BE49-F238E27FC236}">
+                    <a16:creationId xmlns:a16="http://schemas.microsoft.com/office/drawing/2014/main" id="{97C94B03-6F6A-450A-9510-2BF77B400C81}"/>
+                  </a:ext>
+                </a:extLst>
+              </p:cNvPr>
+              <p:cNvSpPr>
+                <a:spLocks noChangeArrowheads="1"/>
+              </p:cNvSpPr>
+              <p:nvPr/>
+            </p:nvSpPr>
+            <p:spPr bwMode="auto">
+              <a:xfrm>
+                <a:off x="6192352" y="3141284"/>
+                <a:ext cx="586110" cy="19711"/>
+              </a:xfrm>
+              <a:prstGeom prst="rect">
+                <a:avLst/>
+              </a:prstGeom>
+              <a:solidFill>
+                <a:srgbClr val="40CDF5"/>
+              </a:solidFill>
+              <a:ln>
+                <a:noFill/>
+              </a:ln>
+              <a:extLst>
+                <a:ext uri="{91240B29-F687-4F45-9708-019B960494DF}">
+                  <a14:hiddenLine xmlns:a14="http://schemas.microsoft.com/office/drawing/2010/main" w="9525">
+                    <a:solidFill>
+                      <a:srgbClr val="000000"/>
+                    </a:solidFill>
+                    <a:miter lim="800000"/>
+                    <a:headEnd/>
+                    <a:tailEnd/>
+                  </a14:hiddenLine>
+                </a:ext>
+              </a:extLst>
+            </p:spPr>
+            <p:txBody>
+              <a:bodyPr vert="horz" wrap="square" lIns="91440" tIns="45720" rIns="91440" bIns="45720" numCol="1" anchor="t" anchorCtr="0" compatLnSpc="1">
+                <a:prstTxWarp prst="textNoShape">
+                  <a:avLst/>
+                </a:prstTxWarp>
+              </a:bodyPr>
+              <a:lstStyle/>
+              <a:p>
+                <a:endParaRPr lang="en-US"/>
+              </a:p>
+            </p:txBody>
+          </p:sp>
+        </p:grpSp>
+        <p:grpSp>
+          <p:nvGrpSpPr>
+            <p:cNvPr id="66" name="Group 65">
+              <a:extLst>
+                <a:ext uri="{FF2B5EF4-FFF2-40B4-BE49-F238E27FC236}">
+                  <a16:creationId xmlns:a16="http://schemas.microsoft.com/office/drawing/2014/main" id="{EBE07B51-B322-49DE-8180-BDA0B2AE70EE}"/>
+                </a:ext>
+              </a:extLst>
+            </p:cNvPr>
+            <p:cNvGrpSpPr/>
+            <p:nvPr/>
+          </p:nvGrpSpPr>
+          <p:grpSpPr>
+            <a:xfrm>
+              <a:off x="7884075" y="1077124"/>
+              <a:ext cx="910251" cy="3591743"/>
+              <a:chOff x="8075007" y="1830519"/>
+              <a:chExt cx="719319" cy="2838348"/>
+            </a:xfrm>
+          </p:grpSpPr>
+          <p:sp>
+            <p:nvSpPr>
+              <p:cNvPr id="73" name="Rectangle 427">
+                <a:extLst>
+                  <a:ext uri="{FF2B5EF4-FFF2-40B4-BE49-F238E27FC236}">
+                    <a16:creationId xmlns:a16="http://schemas.microsoft.com/office/drawing/2014/main" id="{9A2EFE30-65DC-4637-8D6B-B88AE94177F1}"/>
+                  </a:ext>
+                </a:extLst>
+              </p:cNvPr>
+              <p:cNvSpPr>
+                <a:spLocks noChangeArrowheads="1"/>
+              </p:cNvSpPr>
+              <p:nvPr/>
+            </p:nvSpPr>
+            <p:spPr bwMode="auto">
+              <a:xfrm>
+                <a:off x="8075007" y="2471120"/>
+                <a:ext cx="719319" cy="2197747"/>
+              </a:xfrm>
+              <a:prstGeom prst="rect">
+                <a:avLst/>
+              </a:prstGeom>
+              <a:solidFill>
+                <a:srgbClr val="40CDF5"/>
+              </a:solidFill>
+              <a:ln>
+                <a:noFill/>
+              </a:ln>
+              <a:extLst>
+                <a:ext uri="{91240B29-F687-4F45-9708-019B960494DF}">
+                  <a14:hiddenLine xmlns:a14="http://schemas.microsoft.com/office/drawing/2010/main" w="9525">
+                    <a:solidFill>
+                      <a:srgbClr val="000000"/>
+                    </a:solidFill>
+                    <a:miter lim="800000"/>
+                    <a:headEnd/>
+                    <a:tailEnd/>
+                  </a14:hiddenLine>
+                </a:ext>
+              </a:extLst>
+            </p:spPr>
+            <p:txBody>
+              <a:bodyPr vert="horz" wrap="square" lIns="91440" tIns="45720" rIns="91440" bIns="45720" numCol="1" anchor="t" anchorCtr="0" compatLnSpc="1">
+                <a:prstTxWarp prst="textNoShape">
+                  <a:avLst/>
+                </a:prstTxWarp>
+              </a:bodyPr>
+              <a:lstStyle/>
+              <a:p>
+                <a:endParaRPr lang="en-US"/>
+              </a:p>
+            </p:txBody>
+          </p:sp>
+          <p:sp>
+            <p:nvSpPr>
+              <p:cNvPr id="74" name="Oval 440">
+                <a:extLst>
+                  <a:ext uri="{FF2B5EF4-FFF2-40B4-BE49-F238E27FC236}">
+                    <a16:creationId xmlns:a16="http://schemas.microsoft.com/office/drawing/2014/main" id="{2886AAC9-B7B3-44D8-A2FA-167DAF94A7AF}"/>
+                  </a:ext>
+                </a:extLst>
+              </p:cNvPr>
+              <p:cNvSpPr>
+                <a:spLocks noChangeArrowheads="1"/>
+              </p:cNvSpPr>
+              <p:nvPr/>
+            </p:nvSpPr>
+            <p:spPr bwMode="auto">
+              <a:xfrm>
+                <a:off x="8332543" y="2067047"/>
+                <a:ext cx="213131" cy="236528"/>
+              </a:xfrm>
+              <a:prstGeom prst="ellipse">
+                <a:avLst/>
+              </a:prstGeom>
+              <a:solidFill>
+                <a:srgbClr val="002050"/>
+              </a:solidFill>
+              <a:ln>
+                <a:noFill/>
+              </a:ln>
+              <a:extLst>
+                <a:ext uri="{91240B29-F687-4F45-9708-019B960494DF}">
+                  <a14:hiddenLine xmlns:a14="http://schemas.microsoft.com/office/drawing/2010/main" w="9525">
+                    <a:solidFill>
+                      <a:srgbClr val="000000"/>
+                    </a:solidFill>
+                    <a:round/>
+                    <a:headEnd/>
+                    <a:tailEnd/>
+                  </a14:hiddenLine>
+                </a:ext>
+              </a:extLst>
+            </p:spPr>
+            <p:txBody>
+              <a:bodyPr vert="horz" wrap="square" lIns="91440" tIns="45720" rIns="91440" bIns="45720" numCol="1" anchor="t" anchorCtr="0" compatLnSpc="1">
+                <a:prstTxWarp prst="textNoShape">
+                  <a:avLst/>
+                </a:prstTxWarp>
+              </a:bodyPr>
+              <a:lstStyle/>
+              <a:p>
+                <a:endParaRPr lang="en-US"/>
+              </a:p>
+            </p:txBody>
+          </p:sp>
+          <p:sp>
+            <p:nvSpPr>
+              <p:cNvPr id="75" name="Freeform 442">
+                <a:extLst>
+                  <a:ext uri="{FF2B5EF4-FFF2-40B4-BE49-F238E27FC236}">
+                    <a16:creationId xmlns:a16="http://schemas.microsoft.com/office/drawing/2014/main" id="{3191446F-8885-4DA7-B1B2-E7CB05142683}"/>
+                  </a:ext>
+                </a:extLst>
+              </p:cNvPr>
+              <p:cNvSpPr>
+                <a:spLocks/>
+              </p:cNvSpPr>
+              <p:nvPr/>
+            </p:nvSpPr>
+            <p:spPr bwMode="auto">
+              <a:xfrm>
+                <a:off x="8217095" y="2855475"/>
+                <a:ext cx="444022" cy="453346"/>
+              </a:xfrm>
+              <a:custGeom>
+                <a:avLst/>
+                <a:gdLst>
+                  <a:gd name="T0" fmla="*/ 11 w 23"/>
+                  <a:gd name="T1" fmla="*/ 0 h 21"/>
+                  <a:gd name="T2" fmla="*/ 0 w 23"/>
+                  <a:gd name="T3" fmla="*/ 12 h 21"/>
+                  <a:gd name="T4" fmla="*/ 0 w 23"/>
+                  <a:gd name="T5" fmla="*/ 21 h 21"/>
+                  <a:gd name="T6" fmla="*/ 23 w 23"/>
+                  <a:gd name="T7" fmla="*/ 21 h 21"/>
+                  <a:gd name="T8" fmla="*/ 23 w 23"/>
+                  <a:gd name="T9" fmla="*/ 12 h 21"/>
+                  <a:gd name="T10" fmla="*/ 11 w 23"/>
+                  <a:gd name="T11" fmla="*/ 0 h 21"/>
+                </a:gdLst>
+                <a:ahLst/>
+                <a:cxnLst>
+                  <a:cxn ang="0">
+                    <a:pos x="T0" y="T1"/>
+                  </a:cxn>
+                  <a:cxn ang="0">
+                    <a:pos x="T2" y="T3"/>
+                  </a:cxn>
+                  <a:cxn ang="0">
+                    <a:pos x="T4" y="T5"/>
+                  </a:cxn>
+                  <a:cxn ang="0">
+                    <a:pos x="T6" y="T7"/>
+                  </a:cxn>
+                  <a:cxn ang="0">
+                    <a:pos x="T8" y="T9"/>
+                  </a:cxn>
+                  <a:cxn ang="0">
+                    <a:pos x="T10" y="T11"/>
+                  </a:cxn>
+                </a:cxnLst>
+                <a:rect l="0" t="0" r="r" b="b"/>
+                <a:pathLst>
+                  <a:path w="23" h="21">
+                    <a:moveTo>
+                      <a:pt x="11" y="0"/>
+                    </a:moveTo>
+                    <a:cubicBezTo>
+                      <a:pt x="5" y="0"/>
+                      <a:pt x="0" y="5"/>
+                      <a:pt x="0" y="12"/>
+                    </a:cubicBezTo>
+                    <a:cubicBezTo>
+                      <a:pt x="0" y="21"/>
+                      <a:pt x="0" y="21"/>
+                      <a:pt x="0" y="21"/>
+                    </a:cubicBezTo>
+                    <a:cubicBezTo>
+                      <a:pt x="23" y="21"/>
+                      <a:pt x="23" y="21"/>
+                      <a:pt x="23" y="21"/>
+                    </a:cubicBezTo>
+                    <a:cubicBezTo>
+                      <a:pt x="23" y="12"/>
+                      <a:pt x="23" y="12"/>
+                      <a:pt x="23" y="12"/>
+                    </a:cubicBezTo>
+                    <a:cubicBezTo>
+                      <a:pt x="23" y="5"/>
+                      <a:pt x="18" y="0"/>
+                      <a:pt x="11" y="0"/>
+                    </a:cubicBezTo>
+                    <a:close/>
+                  </a:path>
+                </a:pathLst>
+              </a:custGeom>
+              <a:solidFill>
+                <a:srgbClr val="002050"/>
+              </a:solidFill>
+              <a:ln>
+                <a:noFill/>
+              </a:ln>
+              <a:extLst>
+                <a:ext uri="{91240B29-F687-4F45-9708-019B960494DF}">
+                  <a14:hiddenLine xmlns:a14="http://schemas.microsoft.com/office/drawing/2010/main" w="9525">
+                    <a:solidFill>
+                      <a:srgbClr val="000000"/>
+                    </a:solidFill>
+                    <a:round/>
+                    <a:headEnd/>
+                    <a:tailEnd/>
+                  </a14:hiddenLine>
+                </a:ext>
+              </a:extLst>
+            </p:spPr>
+            <p:txBody>
+              <a:bodyPr vert="horz" wrap="square" lIns="91440" tIns="45720" rIns="91440" bIns="45720" numCol="1" anchor="t" anchorCtr="0" compatLnSpc="1">
+                <a:prstTxWarp prst="textNoShape">
+                  <a:avLst/>
+                </a:prstTxWarp>
+              </a:bodyPr>
+              <a:lstStyle/>
+              <a:p>
+                <a:endParaRPr lang="en-US"/>
+              </a:p>
+            </p:txBody>
+          </p:sp>
+          <p:sp>
+            <p:nvSpPr>
+              <p:cNvPr id="76" name="Rectangle 459">
+                <a:extLst>
+                  <a:ext uri="{FF2B5EF4-FFF2-40B4-BE49-F238E27FC236}">
+                    <a16:creationId xmlns:a16="http://schemas.microsoft.com/office/drawing/2014/main" id="{3B9F7C48-79F3-4E07-B4D1-BB03ABB5B413}"/>
+                  </a:ext>
+                </a:extLst>
+              </p:cNvPr>
+              <p:cNvSpPr>
+                <a:spLocks noChangeArrowheads="1"/>
+              </p:cNvSpPr>
+              <p:nvPr/>
+            </p:nvSpPr>
+            <p:spPr bwMode="auto">
+              <a:xfrm>
+                <a:off x="8283699" y="3485624"/>
+                <a:ext cx="97688" cy="216818"/>
+              </a:xfrm>
+              <a:prstGeom prst="rect">
+                <a:avLst/>
+              </a:prstGeom>
+              <a:solidFill>
+                <a:srgbClr val="002050"/>
+              </a:solidFill>
+              <a:ln>
+                <a:noFill/>
+              </a:ln>
+              <a:extLst>
+                <a:ext uri="{91240B29-F687-4F45-9708-019B960494DF}">
+                  <a14:hiddenLine xmlns:a14="http://schemas.microsoft.com/office/drawing/2010/main" w="9525">
+                    <a:solidFill>
+                      <a:srgbClr val="000000"/>
+                    </a:solidFill>
+                    <a:miter lim="800000"/>
+                    <a:headEnd/>
+                    <a:tailEnd/>
+                  </a14:hiddenLine>
+                </a:ext>
+              </a:extLst>
+            </p:spPr>
+            <p:txBody>
+              <a:bodyPr vert="horz" wrap="square" lIns="91440" tIns="45720" rIns="91440" bIns="45720" numCol="1" anchor="t" anchorCtr="0" compatLnSpc="1">
+                <a:prstTxWarp prst="textNoShape">
+                  <a:avLst/>
+                </a:prstTxWarp>
+              </a:bodyPr>
+              <a:lstStyle/>
+              <a:p>
+                <a:endParaRPr lang="en-US"/>
+              </a:p>
+            </p:txBody>
+          </p:sp>
+          <p:sp>
+            <p:nvSpPr>
+              <p:cNvPr id="77" name="Rectangle 460">
+                <a:extLst>
+                  <a:ext uri="{FF2B5EF4-FFF2-40B4-BE49-F238E27FC236}">
+                    <a16:creationId xmlns:a16="http://schemas.microsoft.com/office/drawing/2014/main" id="{ECD4FF31-B4BC-40A2-A8C2-F361C175D616}"/>
+                  </a:ext>
+                </a:extLst>
+              </p:cNvPr>
+              <p:cNvSpPr>
+                <a:spLocks noChangeArrowheads="1"/>
+              </p:cNvSpPr>
+              <p:nvPr/>
+            </p:nvSpPr>
+            <p:spPr bwMode="auto">
+              <a:xfrm>
+                <a:off x="8523468" y="3485624"/>
+                <a:ext cx="88804" cy="216818"/>
+              </a:xfrm>
+              <a:prstGeom prst="rect">
+                <a:avLst/>
+              </a:prstGeom>
+              <a:solidFill>
+                <a:srgbClr val="002050"/>
+              </a:solidFill>
+              <a:ln>
+                <a:noFill/>
+              </a:ln>
+              <a:extLst>
+                <a:ext uri="{91240B29-F687-4F45-9708-019B960494DF}">
+                  <a14:hiddenLine xmlns:a14="http://schemas.microsoft.com/office/drawing/2010/main" w="9525">
+                    <a:solidFill>
+                      <a:srgbClr val="000000"/>
+                    </a:solidFill>
+                    <a:miter lim="800000"/>
+                    <a:headEnd/>
+                    <a:tailEnd/>
+                  </a14:hiddenLine>
+                </a:ext>
+              </a:extLst>
+            </p:spPr>
+            <p:txBody>
+              <a:bodyPr vert="horz" wrap="square" lIns="91440" tIns="45720" rIns="91440" bIns="45720" numCol="1" anchor="t" anchorCtr="0" compatLnSpc="1">
+                <a:prstTxWarp prst="textNoShape">
+                  <a:avLst/>
+                </a:prstTxWarp>
+              </a:bodyPr>
+              <a:lstStyle/>
+              <a:p>
+                <a:endParaRPr lang="en-US"/>
+              </a:p>
+            </p:txBody>
+          </p:sp>
+          <p:sp>
+            <p:nvSpPr>
+              <p:cNvPr id="78" name="Rectangle 461">
+                <a:extLst>
+                  <a:ext uri="{FF2B5EF4-FFF2-40B4-BE49-F238E27FC236}">
+                    <a16:creationId xmlns:a16="http://schemas.microsoft.com/office/drawing/2014/main" id="{F3D28433-933E-4A17-9583-4C4953091EB2}"/>
+                  </a:ext>
+                </a:extLst>
+              </p:cNvPr>
+              <p:cNvSpPr>
+                <a:spLocks noChangeArrowheads="1"/>
+              </p:cNvSpPr>
+              <p:nvPr/>
+            </p:nvSpPr>
+            <p:spPr bwMode="auto">
+              <a:xfrm>
+                <a:off x="8283699" y="4027665"/>
+                <a:ext cx="97688" cy="216818"/>
+              </a:xfrm>
+              <a:prstGeom prst="rect">
+                <a:avLst/>
+              </a:prstGeom>
+              <a:solidFill>
+                <a:srgbClr val="002050"/>
+              </a:solidFill>
+              <a:ln>
+                <a:noFill/>
+              </a:ln>
+              <a:extLst>
+                <a:ext uri="{91240B29-F687-4F45-9708-019B960494DF}">
+                  <a14:hiddenLine xmlns:a14="http://schemas.microsoft.com/office/drawing/2010/main" w="9525">
+                    <a:solidFill>
+                      <a:srgbClr val="000000"/>
+                    </a:solidFill>
+                    <a:miter lim="800000"/>
+                    <a:headEnd/>
+                    <a:tailEnd/>
+                  </a14:hiddenLine>
+                </a:ext>
+              </a:extLst>
+            </p:spPr>
+            <p:txBody>
+              <a:bodyPr vert="horz" wrap="square" lIns="91440" tIns="45720" rIns="91440" bIns="45720" numCol="1" anchor="t" anchorCtr="0" compatLnSpc="1">
+                <a:prstTxWarp prst="textNoShape">
+                  <a:avLst/>
+                </a:prstTxWarp>
+              </a:bodyPr>
+              <a:lstStyle/>
+              <a:p>
+                <a:endParaRPr lang="en-US"/>
+              </a:p>
+            </p:txBody>
+          </p:sp>
+          <p:sp>
+            <p:nvSpPr>
+              <p:cNvPr id="79" name="Rectangle 462">
+                <a:extLst>
+                  <a:ext uri="{FF2B5EF4-FFF2-40B4-BE49-F238E27FC236}">
+                    <a16:creationId xmlns:a16="http://schemas.microsoft.com/office/drawing/2014/main" id="{89A2D300-FBD5-4D0B-9F7F-776FBFBD0E68}"/>
+                  </a:ext>
+                </a:extLst>
+              </p:cNvPr>
+              <p:cNvSpPr>
+                <a:spLocks noChangeArrowheads="1"/>
+              </p:cNvSpPr>
+              <p:nvPr/>
+            </p:nvSpPr>
+            <p:spPr bwMode="auto">
+              <a:xfrm>
+                <a:off x="8523468" y="4027665"/>
+                <a:ext cx="88804" cy="216818"/>
+              </a:xfrm>
+              <a:prstGeom prst="rect">
+                <a:avLst/>
+              </a:prstGeom>
+              <a:solidFill>
+                <a:srgbClr val="002050"/>
+              </a:solidFill>
+              <a:ln>
+                <a:noFill/>
+              </a:ln>
+              <a:extLst>
+                <a:ext uri="{91240B29-F687-4F45-9708-019B960494DF}">
+                  <a14:hiddenLine xmlns:a14="http://schemas.microsoft.com/office/drawing/2010/main" w="9525">
+                    <a:solidFill>
+                      <a:srgbClr val="000000"/>
+                    </a:solidFill>
+                    <a:miter lim="800000"/>
+                    <a:headEnd/>
+                    <a:tailEnd/>
+                  </a14:hiddenLine>
+                </a:ext>
+              </a:extLst>
+            </p:spPr>
+            <p:txBody>
+              <a:bodyPr vert="horz" wrap="square" lIns="91440" tIns="45720" rIns="91440" bIns="45720" numCol="1" anchor="t" anchorCtr="0" compatLnSpc="1">
+                <a:prstTxWarp prst="textNoShape">
+                  <a:avLst/>
+                </a:prstTxWarp>
+              </a:bodyPr>
+              <a:lstStyle/>
+              <a:p>
+                <a:endParaRPr lang="en-US"/>
+              </a:p>
+            </p:txBody>
+          </p:sp>
+          <p:sp>
+            <p:nvSpPr>
+              <p:cNvPr id="80" name="Freeform 490">
+                <a:extLst>
+                  <a:ext uri="{FF2B5EF4-FFF2-40B4-BE49-F238E27FC236}">
+                    <a16:creationId xmlns:a16="http://schemas.microsoft.com/office/drawing/2014/main" id="{5CE5902D-4672-40AC-96DA-8857D4BE961F}"/>
+                  </a:ext>
+                </a:extLst>
+              </p:cNvPr>
+              <p:cNvSpPr>
+                <a:spLocks/>
+              </p:cNvSpPr>
+              <p:nvPr/>
+            </p:nvSpPr>
+            <p:spPr bwMode="auto">
+              <a:xfrm>
+                <a:off x="8075007" y="1830519"/>
+                <a:ext cx="719319" cy="601180"/>
+              </a:xfrm>
+              <a:custGeom>
+                <a:avLst/>
+                <a:gdLst>
+                  <a:gd name="T0" fmla="*/ 40 w 81"/>
+                  <a:gd name="T1" fmla="*/ 0 h 61"/>
+                  <a:gd name="T2" fmla="*/ 0 w 81"/>
+                  <a:gd name="T3" fmla="*/ 61 h 61"/>
+                  <a:gd name="T4" fmla="*/ 81 w 81"/>
+                  <a:gd name="T5" fmla="*/ 61 h 61"/>
+                  <a:gd name="T6" fmla="*/ 40 w 81"/>
+                  <a:gd name="T7" fmla="*/ 0 h 61"/>
+                </a:gdLst>
+                <a:ahLst/>
+                <a:cxnLst>
+                  <a:cxn ang="0">
+                    <a:pos x="T0" y="T1"/>
+                  </a:cxn>
+                  <a:cxn ang="0">
+                    <a:pos x="T2" y="T3"/>
+                  </a:cxn>
+                  <a:cxn ang="0">
+                    <a:pos x="T4" y="T5"/>
+                  </a:cxn>
+                  <a:cxn ang="0">
+                    <a:pos x="T6" y="T7"/>
+                  </a:cxn>
+                </a:cxnLst>
+                <a:rect l="0" t="0" r="r" b="b"/>
+                <a:pathLst>
+                  <a:path w="81" h="61">
+                    <a:moveTo>
+                      <a:pt x="40" y="0"/>
+                    </a:moveTo>
+                    <a:lnTo>
+                      <a:pt x="0" y="61"/>
+                    </a:lnTo>
+                    <a:lnTo>
+                      <a:pt x="81" y="61"/>
+                    </a:lnTo>
+                    <a:lnTo>
+                      <a:pt x="40" y="0"/>
+                    </a:lnTo>
+                    <a:close/>
+                  </a:path>
+                </a:pathLst>
+              </a:custGeom>
+              <a:solidFill>
+                <a:schemeClr val="bg1">
+                  <a:lumMod val="65000"/>
+                </a:schemeClr>
+              </a:solidFill>
+              <a:ln>
+                <a:noFill/>
+              </a:ln>
+              <a:extLst>
+                <a:ext uri="{91240B29-F687-4F45-9708-019B960494DF}">
+                  <a14:hiddenLine xmlns:a14="http://schemas.microsoft.com/office/drawing/2010/main" w="9525">
+                    <a:solidFill>
+                      <a:srgbClr val="000000"/>
+                    </a:solidFill>
+                    <a:round/>
+                    <a:headEnd/>
+                    <a:tailEnd/>
+                  </a14:hiddenLine>
+                </a:ext>
+              </a:extLst>
+            </p:spPr>
+            <p:txBody>
+              <a:bodyPr vert="horz" wrap="square" lIns="91440" tIns="45720" rIns="91440" bIns="45720" numCol="1" anchor="t" anchorCtr="0" compatLnSpc="1">
+                <a:prstTxWarp prst="textNoShape">
+                  <a:avLst/>
+                </a:prstTxWarp>
+              </a:bodyPr>
+              <a:lstStyle/>
+              <a:p>
+                <a:endParaRPr lang="en-US"/>
+              </a:p>
+            </p:txBody>
+          </p:sp>
+          <p:sp>
+            <p:nvSpPr>
+              <p:cNvPr id="81" name="Rectangle 492">
+                <a:extLst>
+                  <a:ext uri="{FF2B5EF4-FFF2-40B4-BE49-F238E27FC236}">
+                    <a16:creationId xmlns:a16="http://schemas.microsoft.com/office/drawing/2014/main" id="{752D01EF-2587-46AD-8D53-49718AD709C4}"/>
+                  </a:ext>
+                </a:extLst>
+              </p:cNvPr>
+              <p:cNvSpPr>
+                <a:spLocks noChangeArrowheads="1"/>
+              </p:cNvSpPr>
+              <p:nvPr/>
+            </p:nvSpPr>
+            <p:spPr bwMode="auto">
+              <a:xfrm>
+                <a:off x="8314782" y="2816054"/>
+                <a:ext cx="17761" cy="650453"/>
+              </a:xfrm>
+              <a:prstGeom prst="rect">
+                <a:avLst/>
+              </a:prstGeom>
+              <a:solidFill>
+                <a:srgbClr val="40CDF5"/>
+              </a:solidFill>
+              <a:ln>
+                <a:noFill/>
+              </a:ln>
+              <a:extLst>
+                <a:ext uri="{91240B29-F687-4F45-9708-019B960494DF}">
+                  <a14:hiddenLine xmlns:a14="http://schemas.microsoft.com/office/drawing/2010/main" w="9525">
+                    <a:solidFill>
+                      <a:srgbClr val="000000"/>
+                    </a:solidFill>
+                    <a:miter lim="800000"/>
+                    <a:headEnd/>
+                    <a:tailEnd/>
+                  </a14:hiddenLine>
+                </a:ext>
+              </a:extLst>
+            </p:spPr>
+            <p:txBody>
+              <a:bodyPr vert="horz" wrap="square" lIns="91440" tIns="45720" rIns="91440" bIns="45720" numCol="1" anchor="t" anchorCtr="0" compatLnSpc="1">
+                <a:prstTxWarp prst="textNoShape">
+                  <a:avLst/>
+                </a:prstTxWarp>
+              </a:bodyPr>
+              <a:lstStyle/>
+              <a:p>
+                <a:endParaRPr lang="en-US"/>
+              </a:p>
+            </p:txBody>
+          </p:sp>
+          <p:sp>
+            <p:nvSpPr>
+              <p:cNvPr id="82" name="Rectangle 493">
+                <a:extLst>
+                  <a:ext uri="{FF2B5EF4-FFF2-40B4-BE49-F238E27FC236}">
+                    <a16:creationId xmlns:a16="http://schemas.microsoft.com/office/drawing/2014/main" id="{7E8B3EE6-1030-457F-A720-716C7AAE2D95}"/>
+                  </a:ext>
+                </a:extLst>
+              </p:cNvPr>
+              <p:cNvSpPr>
+                <a:spLocks noChangeArrowheads="1"/>
+              </p:cNvSpPr>
+              <p:nvPr/>
+            </p:nvSpPr>
+            <p:spPr bwMode="auto">
+              <a:xfrm>
+                <a:off x="8545674" y="2816054"/>
+                <a:ext cx="17761" cy="650453"/>
+              </a:xfrm>
+              <a:prstGeom prst="rect">
+                <a:avLst/>
+              </a:prstGeom>
+              <a:solidFill>
+                <a:srgbClr val="40CDF5"/>
+              </a:solidFill>
+              <a:ln>
+                <a:noFill/>
+              </a:ln>
+              <a:extLst>
+                <a:ext uri="{91240B29-F687-4F45-9708-019B960494DF}">
+                  <a14:hiddenLine xmlns:a14="http://schemas.microsoft.com/office/drawing/2010/main" w="9525">
+                    <a:solidFill>
+                      <a:srgbClr val="000000"/>
+                    </a:solidFill>
+                    <a:miter lim="800000"/>
+                    <a:headEnd/>
+                    <a:tailEnd/>
+                  </a14:hiddenLine>
+                </a:ext>
+              </a:extLst>
+            </p:spPr>
+            <p:txBody>
+              <a:bodyPr vert="horz" wrap="square" lIns="91440" tIns="45720" rIns="91440" bIns="45720" numCol="1" anchor="t" anchorCtr="0" compatLnSpc="1">
+                <a:prstTxWarp prst="textNoShape">
+                  <a:avLst/>
+                </a:prstTxWarp>
+              </a:bodyPr>
+              <a:lstStyle/>
+              <a:p>
+                <a:endParaRPr lang="en-US"/>
+              </a:p>
+            </p:txBody>
+          </p:sp>
+          <p:sp>
+            <p:nvSpPr>
+              <p:cNvPr id="83" name="Rectangle 494">
+                <a:extLst>
+                  <a:ext uri="{FF2B5EF4-FFF2-40B4-BE49-F238E27FC236}">
+                    <a16:creationId xmlns:a16="http://schemas.microsoft.com/office/drawing/2014/main" id="{ADD83331-7B29-4645-8703-20C939C7CF80}"/>
+                  </a:ext>
+                </a:extLst>
+              </p:cNvPr>
+              <p:cNvSpPr>
+                <a:spLocks noChangeArrowheads="1"/>
+              </p:cNvSpPr>
+              <p:nvPr/>
+            </p:nvSpPr>
+            <p:spPr bwMode="auto">
+              <a:xfrm>
+                <a:off x="8137173" y="3141284"/>
+                <a:ext cx="568349" cy="19711"/>
+              </a:xfrm>
+              <a:prstGeom prst="rect">
+                <a:avLst/>
+              </a:prstGeom>
+              <a:solidFill>
+                <a:srgbClr val="40CDF5"/>
+              </a:solidFill>
+              <a:ln>
+                <a:noFill/>
+              </a:ln>
+              <a:extLst>
+                <a:ext uri="{91240B29-F687-4F45-9708-019B960494DF}">
+                  <a14:hiddenLine xmlns:a14="http://schemas.microsoft.com/office/drawing/2010/main" w="9525">
+                    <a:solidFill>
+                      <a:srgbClr val="000000"/>
+                    </a:solidFill>
+                    <a:miter lim="800000"/>
+                    <a:headEnd/>
+                    <a:tailEnd/>
+                  </a14:hiddenLine>
+                </a:ext>
+              </a:extLst>
+            </p:spPr>
+            <p:txBody>
+              <a:bodyPr vert="horz" wrap="square" lIns="91440" tIns="45720" rIns="91440" bIns="45720" numCol="1" anchor="t" anchorCtr="0" compatLnSpc="1">
+                <a:prstTxWarp prst="textNoShape">
+                  <a:avLst/>
+                </a:prstTxWarp>
+              </a:bodyPr>
+              <a:lstStyle/>
+              <a:p>
+                <a:endParaRPr lang="en-US"/>
+              </a:p>
+            </p:txBody>
+          </p:sp>
+        </p:grpSp>
+        <p:sp>
+          <p:nvSpPr>
+            <p:cNvPr id="67" name="Freeform 431">
+              <a:extLst>
+                <a:ext uri="{FF2B5EF4-FFF2-40B4-BE49-F238E27FC236}">
+                  <a16:creationId xmlns:a16="http://schemas.microsoft.com/office/drawing/2014/main" id="{44FCFDEB-080D-4AC5-88FC-4751A54C1DC0}"/>
+                </a:ext>
+              </a:extLst>
+            </p:cNvPr>
+            <p:cNvSpPr>
+              <a:spLocks/>
+            </p:cNvSpPr>
+            <p:nvPr/>
+          </p:nvSpPr>
+          <p:spPr bwMode="auto">
+            <a:xfrm>
+              <a:off x="8008395" y="4381500"/>
+              <a:ext cx="852523" cy="563310"/>
+            </a:xfrm>
+            <a:custGeom>
+              <a:avLst/>
+              <a:gdLst>
+                <a:gd name="T0" fmla="*/ 44 w 44"/>
+                <a:gd name="T1" fmla="*/ 20 h 20"/>
+                <a:gd name="T2" fmla="*/ 22 w 44"/>
+                <a:gd name="T3" fmla="*/ 0 h 20"/>
+                <a:gd name="T4" fmla="*/ 0 w 44"/>
+                <a:gd name="T5" fmla="*/ 20 h 20"/>
+                <a:gd name="T6" fmla="*/ 44 w 44"/>
+                <a:gd name="T7" fmla="*/ 20 h 20"/>
+              </a:gdLst>
+              <a:ahLst/>
+              <a:cxnLst>
+                <a:cxn ang="0">
+                  <a:pos x="T0" y="T1"/>
+                </a:cxn>
+                <a:cxn ang="0">
+                  <a:pos x="T2" y="T3"/>
+                </a:cxn>
+                <a:cxn ang="0">
+                  <a:pos x="T4" y="T5"/>
+                </a:cxn>
+                <a:cxn ang="0">
+                  <a:pos x="T6" y="T7"/>
+                </a:cxn>
+              </a:cxnLst>
+              <a:rect l="0" t="0" r="r" b="b"/>
+              <a:pathLst>
+                <a:path w="44" h="20">
+                  <a:moveTo>
+                    <a:pt x="44" y="20"/>
+                  </a:moveTo>
+                  <a:cubicBezTo>
+                    <a:pt x="43" y="9"/>
+                    <a:pt x="33" y="0"/>
+                    <a:pt x="22" y="0"/>
+                  </a:cubicBezTo>
+                  <a:cubicBezTo>
+                    <a:pt x="10" y="0"/>
+                    <a:pt x="1" y="9"/>
+                    <a:pt x="0" y="20"/>
+                  </a:cubicBezTo>
+                  <a:lnTo>
+                    <a:pt x="44" y="20"/>
+                  </a:lnTo>
+                  <a:close/>
+                </a:path>
+              </a:pathLst>
+            </a:custGeom>
+            <a:solidFill>
+              <a:srgbClr val="0070C0"/>
+            </a:solidFill>
+            <a:ln>
+              <a:noFill/>
+            </a:ln>
+            <a:extLst/>
+          </p:spPr>
+          <p:txBody>
+            <a:bodyPr vert="horz" wrap="square" lIns="91440" tIns="45720" rIns="91440" bIns="45720" numCol="1" anchor="t" anchorCtr="0" compatLnSpc="1">
+              <a:prstTxWarp prst="textNoShape">
+                <a:avLst/>
+              </a:prstTxWarp>
+            </a:bodyPr>
+            <a:lstStyle/>
+            <a:p>
+              <a:endParaRPr lang="en-US"/>
+            </a:p>
+          </p:txBody>
+        </p:sp>
+        <p:sp>
+          <p:nvSpPr>
+            <p:cNvPr id="68" name="Freeform 484">
+              <a:extLst>
+                <a:ext uri="{FF2B5EF4-FFF2-40B4-BE49-F238E27FC236}">
+                  <a16:creationId xmlns:a16="http://schemas.microsoft.com/office/drawing/2014/main" id="{530B39AA-767D-49E5-B135-191370651394}"/>
+                </a:ext>
+              </a:extLst>
+            </p:cNvPr>
+            <p:cNvSpPr>
+              <a:spLocks/>
+            </p:cNvSpPr>
+            <p:nvPr/>
+          </p:nvSpPr>
+          <p:spPr bwMode="auto">
+            <a:xfrm>
+              <a:off x="7006571" y="4472013"/>
+              <a:ext cx="1354601" cy="472796"/>
+            </a:xfrm>
+            <a:custGeom>
+              <a:avLst/>
+              <a:gdLst>
+                <a:gd name="T0" fmla="*/ 58 w 58"/>
+                <a:gd name="T1" fmla="*/ 26 h 26"/>
+                <a:gd name="T2" fmla="*/ 29 w 58"/>
+                <a:gd name="T3" fmla="*/ 0 h 26"/>
+                <a:gd name="T4" fmla="*/ 0 w 58"/>
+                <a:gd name="T5" fmla="*/ 26 h 26"/>
+                <a:gd name="T6" fmla="*/ 58 w 58"/>
+                <a:gd name="T7" fmla="*/ 26 h 26"/>
+              </a:gdLst>
+              <a:ahLst/>
+              <a:cxnLst>
+                <a:cxn ang="0">
+                  <a:pos x="T0" y="T1"/>
+                </a:cxn>
+                <a:cxn ang="0">
+                  <a:pos x="T2" y="T3"/>
+                </a:cxn>
+                <a:cxn ang="0">
+                  <a:pos x="T4" y="T5"/>
+                </a:cxn>
+                <a:cxn ang="0">
+                  <a:pos x="T6" y="T7"/>
+                </a:cxn>
+              </a:cxnLst>
+              <a:rect l="0" t="0" r="r" b="b"/>
+              <a:pathLst>
+                <a:path w="58" h="26">
+                  <a:moveTo>
+                    <a:pt x="58" y="26"/>
+                  </a:moveTo>
+                  <a:cubicBezTo>
+                    <a:pt x="56" y="11"/>
+                    <a:pt x="44" y="0"/>
+                    <a:pt x="29" y="0"/>
+                  </a:cubicBezTo>
+                  <a:cubicBezTo>
+                    <a:pt x="14" y="0"/>
+                    <a:pt x="1" y="11"/>
+                    <a:pt x="0" y="26"/>
+                  </a:cubicBezTo>
+                  <a:lnTo>
+                    <a:pt x="58" y="26"/>
+                  </a:lnTo>
+                  <a:close/>
+                </a:path>
+              </a:pathLst>
+            </a:custGeom>
+            <a:solidFill>
+              <a:srgbClr val="002050"/>
+            </a:solidFill>
+            <a:ln>
+              <a:noFill/>
+            </a:ln>
+            <a:extLst/>
+          </p:spPr>
+          <p:txBody>
+            <a:bodyPr vert="horz" wrap="square" lIns="91440" tIns="45720" rIns="91440" bIns="45720" numCol="1" anchor="t" anchorCtr="0" compatLnSpc="1">
+              <a:prstTxWarp prst="textNoShape">
+                <a:avLst/>
+              </a:prstTxWarp>
+            </a:bodyPr>
+            <a:lstStyle/>
+            <a:p>
+              <a:endParaRPr lang="en-US"/>
+            </a:p>
+          </p:txBody>
+        </p:sp>
+        <p:sp>
+          <p:nvSpPr>
+            <p:cNvPr id="69" name="Freeform 431">
+              <a:extLst>
+                <a:ext uri="{FF2B5EF4-FFF2-40B4-BE49-F238E27FC236}">
+                  <a16:creationId xmlns:a16="http://schemas.microsoft.com/office/drawing/2014/main" id="{242A41C9-E8A2-4CDB-B9C9-4AC94AE787F0}"/>
+                </a:ext>
+              </a:extLst>
+            </p:cNvPr>
+            <p:cNvSpPr>
+              <a:spLocks/>
+            </p:cNvSpPr>
+            <p:nvPr/>
+          </p:nvSpPr>
+          <p:spPr bwMode="auto">
+            <a:xfrm>
+              <a:off x="8434657" y="4459537"/>
+              <a:ext cx="852523" cy="485273"/>
+            </a:xfrm>
+            <a:custGeom>
+              <a:avLst/>
+              <a:gdLst>
+                <a:gd name="T0" fmla="*/ 44 w 44"/>
+                <a:gd name="T1" fmla="*/ 20 h 20"/>
+                <a:gd name="T2" fmla="*/ 22 w 44"/>
+                <a:gd name="T3" fmla="*/ 0 h 20"/>
+                <a:gd name="T4" fmla="*/ 0 w 44"/>
+                <a:gd name="T5" fmla="*/ 20 h 20"/>
+                <a:gd name="T6" fmla="*/ 44 w 44"/>
+                <a:gd name="T7" fmla="*/ 20 h 20"/>
+              </a:gdLst>
+              <a:ahLst/>
+              <a:cxnLst>
+                <a:cxn ang="0">
+                  <a:pos x="T0" y="T1"/>
+                </a:cxn>
+                <a:cxn ang="0">
+                  <a:pos x="T2" y="T3"/>
+                </a:cxn>
+                <a:cxn ang="0">
+                  <a:pos x="T4" y="T5"/>
+                </a:cxn>
+                <a:cxn ang="0">
+                  <a:pos x="T6" y="T7"/>
+                </a:cxn>
+              </a:cxnLst>
+              <a:rect l="0" t="0" r="r" b="b"/>
+              <a:pathLst>
+                <a:path w="44" h="20">
+                  <a:moveTo>
+                    <a:pt x="44" y="20"/>
+                  </a:moveTo>
+                  <a:cubicBezTo>
+                    <a:pt x="43" y="9"/>
+                    <a:pt x="33" y="0"/>
+                    <a:pt x="22" y="0"/>
+                  </a:cubicBezTo>
+                  <a:cubicBezTo>
+                    <a:pt x="10" y="0"/>
+                    <a:pt x="1" y="9"/>
+                    <a:pt x="0" y="20"/>
+                  </a:cubicBezTo>
+                  <a:lnTo>
+                    <a:pt x="44" y="20"/>
+                  </a:lnTo>
+                  <a:close/>
+                </a:path>
+              </a:pathLst>
+            </a:custGeom>
+            <a:solidFill>
+              <a:schemeClr val="bg1">
+                <a:lumMod val="65000"/>
+              </a:schemeClr>
+            </a:solidFill>
+            <a:ln>
+              <a:noFill/>
+            </a:ln>
+            <a:extLst/>
+          </p:spPr>
+          <p:txBody>
+            <a:bodyPr vert="horz" wrap="square" lIns="91440" tIns="45720" rIns="91440" bIns="45720" numCol="1" anchor="t" anchorCtr="0" compatLnSpc="1">
+              <a:prstTxWarp prst="textNoShape">
+                <a:avLst/>
+              </a:prstTxWarp>
+            </a:bodyPr>
+            <a:lstStyle/>
+            <a:p>
+              <a:endParaRPr lang="en-US"/>
+            </a:p>
+          </p:txBody>
+        </p:sp>
+        <p:sp>
+          <p:nvSpPr>
+            <p:cNvPr id="70" name="Freeform 592">
+              <a:extLst>
+                <a:ext uri="{FF2B5EF4-FFF2-40B4-BE49-F238E27FC236}">
+                  <a16:creationId xmlns:a16="http://schemas.microsoft.com/office/drawing/2014/main" id="{C676F2F2-A1B7-47B6-B548-79ECE602104D}"/>
+                </a:ext>
+              </a:extLst>
+            </p:cNvPr>
+            <p:cNvSpPr>
+              <a:spLocks/>
+            </p:cNvSpPr>
+            <p:nvPr/>
+          </p:nvSpPr>
+          <p:spPr bwMode="auto">
+            <a:xfrm>
+              <a:off x="8130061" y="1120968"/>
+              <a:ext cx="1513708" cy="610529"/>
+            </a:xfrm>
+            <a:custGeom>
+              <a:avLst/>
+              <a:gdLst>
+                <a:gd name="T0" fmla="*/ 245 w 274"/>
+                <a:gd name="T1" fmla="*/ 52 h 111"/>
+                <a:gd name="T2" fmla="*/ 240 w 274"/>
+                <a:gd name="T3" fmla="*/ 52 h 111"/>
+                <a:gd name="T4" fmla="*/ 185 w 274"/>
+                <a:gd name="T5" fmla="*/ 0 h 111"/>
+                <a:gd name="T6" fmla="*/ 131 w 274"/>
+                <a:gd name="T7" fmla="*/ 41 h 111"/>
+                <a:gd name="T8" fmla="*/ 102 w 274"/>
+                <a:gd name="T9" fmla="*/ 29 h 111"/>
+                <a:gd name="T10" fmla="*/ 61 w 274"/>
+                <a:gd name="T11" fmla="*/ 66 h 111"/>
+                <a:gd name="T12" fmla="*/ 41 w 274"/>
+                <a:gd name="T13" fmla="*/ 75 h 111"/>
+                <a:gd name="T14" fmla="*/ 23 w 274"/>
+                <a:gd name="T15" fmla="*/ 65 h 111"/>
+                <a:gd name="T16" fmla="*/ 0 w 274"/>
+                <a:gd name="T17" fmla="*/ 88 h 111"/>
+                <a:gd name="T18" fmla="*/ 23 w 274"/>
+                <a:gd name="T19" fmla="*/ 111 h 111"/>
+                <a:gd name="T20" fmla="*/ 29 w 274"/>
+                <a:gd name="T21" fmla="*/ 111 h 111"/>
+                <a:gd name="T22" fmla="*/ 104 w 274"/>
+                <a:gd name="T23" fmla="*/ 111 h 111"/>
+                <a:gd name="T24" fmla="*/ 146 w 274"/>
+                <a:gd name="T25" fmla="*/ 111 h 111"/>
+                <a:gd name="T26" fmla="*/ 247 w 274"/>
+                <a:gd name="T27" fmla="*/ 111 h 111"/>
+                <a:gd name="T28" fmla="*/ 247 w 274"/>
+                <a:gd name="T29" fmla="*/ 111 h 111"/>
+                <a:gd name="T30" fmla="*/ 274 w 274"/>
+                <a:gd name="T31" fmla="*/ 81 h 111"/>
+                <a:gd name="T32" fmla="*/ 245 w 274"/>
+                <a:gd name="T33" fmla="*/ 52 h 111"/>
+              </a:gdLst>
+              <a:ahLst/>
+              <a:cxnLst>
+                <a:cxn ang="0">
+                  <a:pos x="T0" y="T1"/>
+                </a:cxn>
+                <a:cxn ang="0">
+                  <a:pos x="T2" y="T3"/>
+                </a:cxn>
+                <a:cxn ang="0">
+                  <a:pos x="T4" y="T5"/>
+                </a:cxn>
+                <a:cxn ang="0">
+                  <a:pos x="T6" y="T7"/>
+                </a:cxn>
+                <a:cxn ang="0">
+                  <a:pos x="T8" y="T9"/>
+                </a:cxn>
+                <a:cxn ang="0">
+                  <a:pos x="T10" y="T11"/>
+                </a:cxn>
+                <a:cxn ang="0">
+                  <a:pos x="T12" y="T13"/>
+                </a:cxn>
+                <a:cxn ang="0">
+                  <a:pos x="T14" y="T15"/>
+                </a:cxn>
+                <a:cxn ang="0">
+                  <a:pos x="T16" y="T17"/>
+                </a:cxn>
+                <a:cxn ang="0">
+                  <a:pos x="T18" y="T19"/>
+                </a:cxn>
+                <a:cxn ang="0">
+                  <a:pos x="T20" y="T21"/>
+                </a:cxn>
+                <a:cxn ang="0">
+                  <a:pos x="T22" y="T23"/>
+                </a:cxn>
+                <a:cxn ang="0">
+                  <a:pos x="T24" y="T25"/>
+                </a:cxn>
+                <a:cxn ang="0">
+                  <a:pos x="T26" y="T27"/>
+                </a:cxn>
+                <a:cxn ang="0">
+                  <a:pos x="T28" y="T29"/>
+                </a:cxn>
+                <a:cxn ang="0">
+                  <a:pos x="T30" y="T31"/>
+                </a:cxn>
+                <a:cxn ang="0">
+                  <a:pos x="T32" y="T33"/>
+                </a:cxn>
+              </a:cxnLst>
+              <a:rect l="0" t="0" r="r" b="b"/>
+              <a:pathLst>
+                <a:path w="274" h="111">
+                  <a:moveTo>
+                    <a:pt x="245" y="52"/>
+                  </a:moveTo>
+                  <a:cubicBezTo>
+                    <a:pt x="243" y="52"/>
+                    <a:pt x="242" y="52"/>
+                    <a:pt x="240" y="52"/>
+                  </a:cubicBezTo>
+                  <a:cubicBezTo>
+                    <a:pt x="239" y="23"/>
+                    <a:pt x="214" y="0"/>
+                    <a:pt x="185" y="0"/>
+                  </a:cubicBezTo>
+                  <a:cubicBezTo>
+                    <a:pt x="159" y="0"/>
+                    <a:pt x="137" y="17"/>
+                    <a:pt x="131" y="41"/>
+                  </a:cubicBezTo>
+                  <a:cubicBezTo>
+                    <a:pt x="123" y="33"/>
+                    <a:pt x="113" y="29"/>
+                    <a:pt x="102" y="29"/>
+                  </a:cubicBezTo>
+                  <a:cubicBezTo>
+                    <a:pt x="80" y="29"/>
+                    <a:pt x="63" y="45"/>
+                    <a:pt x="61" y="66"/>
+                  </a:cubicBezTo>
+                  <a:cubicBezTo>
+                    <a:pt x="53" y="67"/>
+                    <a:pt x="47" y="70"/>
+                    <a:pt x="41" y="75"/>
+                  </a:cubicBezTo>
+                  <a:cubicBezTo>
+                    <a:pt x="37" y="69"/>
+                    <a:pt x="30" y="65"/>
+                    <a:pt x="23" y="65"/>
+                  </a:cubicBezTo>
+                  <a:cubicBezTo>
+                    <a:pt x="10" y="65"/>
+                    <a:pt x="0" y="75"/>
+                    <a:pt x="0" y="88"/>
+                  </a:cubicBezTo>
+                  <a:cubicBezTo>
+                    <a:pt x="0" y="101"/>
+                    <a:pt x="10" y="111"/>
+                    <a:pt x="23" y="111"/>
+                  </a:cubicBezTo>
+                  <a:cubicBezTo>
+                    <a:pt x="29" y="111"/>
+                    <a:pt x="29" y="111"/>
+                    <a:pt x="29" y="111"/>
+                  </a:cubicBezTo>
+                  <a:cubicBezTo>
+                    <a:pt x="104" y="111"/>
+                    <a:pt x="104" y="111"/>
+                    <a:pt x="104" y="111"/>
+                  </a:cubicBezTo>
+                  <a:cubicBezTo>
+                    <a:pt x="146" y="111"/>
+                    <a:pt x="146" y="111"/>
+                    <a:pt x="146" y="111"/>
+                  </a:cubicBezTo>
+                  <a:cubicBezTo>
+                    <a:pt x="247" y="111"/>
+                    <a:pt x="247" y="111"/>
+                    <a:pt x="247" y="111"/>
+                  </a:cubicBezTo>
+                  <a:cubicBezTo>
+                    <a:pt x="247" y="111"/>
+                    <a:pt x="247" y="111"/>
+                    <a:pt x="247" y="111"/>
+                  </a:cubicBezTo>
+                  <a:cubicBezTo>
+                    <a:pt x="262" y="110"/>
+                    <a:pt x="274" y="97"/>
+                    <a:pt x="274" y="81"/>
+                  </a:cubicBezTo>
+                  <a:cubicBezTo>
+                    <a:pt x="274" y="65"/>
+                    <a:pt x="261" y="52"/>
+                    <a:pt x="245" y="52"/>
+                  </a:cubicBezTo>
+                  <a:close/>
+                </a:path>
+              </a:pathLst>
+            </a:custGeom>
+            <a:solidFill>
+              <a:schemeClr val="bg1">
+                <a:lumMod val="95000"/>
+              </a:schemeClr>
+            </a:solidFill>
+            <a:ln>
+              <a:noFill/>
+            </a:ln>
+            <a:extLst>
+              <a:ext uri="{91240B29-F687-4F45-9708-019B960494DF}">
+                <a14:hiddenLine xmlns:a14="http://schemas.microsoft.com/office/drawing/2010/main" w="9525">
+                  <a:solidFill>
+                    <a:srgbClr val="000000"/>
+                  </a:solidFill>
+                  <a:round/>
+                  <a:headEnd/>
+                  <a:tailEnd/>
+                </a14:hiddenLine>
+              </a:ext>
+            </a:extLst>
+          </p:spPr>
+          <p:txBody>
+            <a:bodyPr vert="horz" wrap="square" lIns="91440" tIns="45720" rIns="91440" bIns="45720" numCol="1" anchor="t" anchorCtr="0" compatLnSpc="1">
+              <a:prstTxWarp prst="textNoShape">
+                <a:avLst/>
+              </a:prstTxWarp>
+            </a:bodyPr>
+            <a:lstStyle/>
+            <a:p>
+              <a:endParaRPr lang="en-US"/>
+            </a:p>
+          </p:txBody>
+        </p:sp>
+        <p:sp>
+          <p:nvSpPr>
+            <p:cNvPr id="71" name="Freeform 593">
+              <a:extLst>
+                <a:ext uri="{FF2B5EF4-FFF2-40B4-BE49-F238E27FC236}">
+                  <a16:creationId xmlns:a16="http://schemas.microsoft.com/office/drawing/2014/main" id="{25B1E9A6-E5AC-4F36-B373-0587CE3CE648}"/>
+                </a:ext>
+              </a:extLst>
+            </p:cNvPr>
+            <p:cNvSpPr>
+              <a:spLocks/>
+            </p:cNvSpPr>
+            <p:nvPr/>
+          </p:nvSpPr>
+          <p:spPr bwMode="auto">
+            <a:xfrm>
+              <a:off x="7006571" y="2117316"/>
+              <a:ext cx="867859" cy="489432"/>
+            </a:xfrm>
+            <a:custGeom>
+              <a:avLst/>
+              <a:gdLst>
+                <a:gd name="T0" fmla="*/ 131 w 157"/>
+                <a:gd name="T1" fmla="*/ 37 h 89"/>
+                <a:gd name="T2" fmla="*/ 128 w 157"/>
+                <a:gd name="T3" fmla="*/ 38 h 89"/>
+                <a:gd name="T4" fmla="*/ 131 w 157"/>
+                <a:gd name="T5" fmla="*/ 26 h 89"/>
+                <a:gd name="T6" fmla="*/ 105 w 157"/>
+                <a:gd name="T7" fmla="*/ 0 h 89"/>
+                <a:gd name="T8" fmla="*/ 80 w 157"/>
+                <a:gd name="T9" fmla="*/ 23 h 89"/>
+                <a:gd name="T10" fmla="*/ 60 w 157"/>
+                <a:gd name="T11" fmla="*/ 15 h 89"/>
+                <a:gd name="T12" fmla="*/ 35 w 157"/>
+                <a:gd name="T13" fmla="*/ 39 h 89"/>
+                <a:gd name="T14" fmla="*/ 26 w 157"/>
+                <a:gd name="T15" fmla="*/ 37 h 89"/>
+                <a:gd name="T16" fmla="*/ 0 w 157"/>
+                <a:gd name="T17" fmla="*/ 63 h 89"/>
+                <a:gd name="T18" fmla="*/ 26 w 157"/>
+                <a:gd name="T19" fmla="*/ 89 h 89"/>
+                <a:gd name="T20" fmla="*/ 131 w 157"/>
+                <a:gd name="T21" fmla="*/ 89 h 89"/>
+                <a:gd name="T22" fmla="*/ 157 w 157"/>
+                <a:gd name="T23" fmla="*/ 63 h 89"/>
+                <a:gd name="T24" fmla="*/ 131 w 157"/>
+                <a:gd name="T25" fmla="*/ 37 h 89"/>
+              </a:gdLst>
+              <a:ahLst/>
+              <a:cxnLst>
+                <a:cxn ang="0">
+                  <a:pos x="T0" y="T1"/>
+                </a:cxn>
+                <a:cxn ang="0">
+                  <a:pos x="T2" y="T3"/>
+                </a:cxn>
+                <a:cxn ang="0">
+                  <a:pos x="T4" y="T5"/>
+                </a:cxn>
+                <a:cxn ang="0">
+                  <a:pos x="T6" y="T7"/>
+                </a:cxn>
+                <a:cxn ang="0">
+                  <a:pos x="T8" y="T9"/>
+                </a:cxn>
+                <a:cxn ang="0">
+                  <a:pos x="T10" y="T11"/>
+                </a:cxn>
+                <a:cxn ang="0">
+                  <a:pos x="T12" y="T13"/>
+                </a:cxn>
+                <a:cxn ang="0">
+                  <a:pos x="T14" y="T15"/>
+                </a:cxn>
+                <a:cxn ang="0">
+                  <a:pos x="T16" y="T17"/>
+                </a:cxn>
+                <a:cxn ang="0">
+                  <a:pos x="T18" y="T19"/>
+                </a:cxn>
+                <a:cxn ang="0">
+                  <a:pos x="T20" y="T21"/>
+                </a:cxn>
+                <a:cxn ang="0">
+                  <a:pos x="T22" y="T23"/>
+                </a:cxn>
+                <a:cxn ang="0">
+                  <a:pos x="T24" y="T25"/>
+                </a:cxn>
+              </a:cxnLst>
+              <a:rect l="0" t="0" r="r" b="b"/>
+              <a:pathLst>
+                <a:path w="157" h="89">
+                  <a:moveTo>
+                    <a:pt x="131" y="37"/>
+                  </a:moveTo>
+                  <a:cubicBezTo>
+                    <a:pt x="130" y="37"/>
+                    <a:pt x="129" y="38"/>
+                    <a:pt x="128" y="38"/>
+                  </a:cubicBezTo>
+                  <a:cubicBezTo>
+                    <a:pt x="130" y="34"/>
+                    <a:pt x="131" y="30"/>
+                    <a:pt x="131" y="26"/>
+                  </a:cubicBezTo>
+                  <a:cubicBezTo>
+                    <a:pt x="131" y="12"/>
+                    <a:pt x="120" y="0"/>
+                    <a:pt x="105" y="0"/>
+                  </a:cubicBezTo>
+                  <a:cubicBezTo>
+                    <a:pt x="92" y="0"/>
+                    <a:pt x="81" y="10"/>
+                    <a:pt x="80" y="23"/>
+                  </a:cubicBezTo>
+                  <a:cubicBezTo>
+                    <a:pt x="75" y="18"/>
+                    <a:pt x="68" y="15"/>
+                    <a:pt x="60" y="15"/>
+                  </a:cubicBezTo>
+                  <a:cubicBezTo>
+                    <a:pt x="47" y="15"/>
+                    <a:pt x="35" y="25"/>
+                    <a:pt x="35" y="39"/>
+                  </a:cubicBezTo>
+                  <a:cubicBezTo>
+                    <a:pt x="32" y="38"/>
+                    <a:pt x="29" y="37"/>
+                    <a:pt x="26" y="37"/>
+                  </a:cubicBezTo>
+                  <a:cubicBezTo>
+                    <a:pt x="12" y="37"/>
+                    <a:pt x="0" y="49"/>
+                    <a:pt x="0" y="63"/>
+                  </a:cubicBezTo>
+                  <a:cubicBezTo>
+                    <a:pt x="0" y="78"/>
+                    <a:pt x="12" y="89"/>
+                    <a:pt x="26" y="89"/>
+                  </a:cubicBezTo>
+                  <a:cubicBezTo>
+                    <a:pt x="131" y="89"/>
+                    <a:pt x="131" y="89"/>
+                    <a:pt x="131" y="89"/>
+                  </a:cubicBezTo>
+                  <a:cubicBezTo>
+                    <a:pt x="145" y="89"/>
+                    <a:pt x="157" y="78"/>
+                    <a:pt x="157" y="63"/>
+                  </a:cubicBezTo>
+                  <a:cubicBezTo>
+                    <a:pt x="157" y="49"/>
+                    <a:pt x="145" y="37"/>
+                    <a:pt x="131" y="37"/>
+                  </a:cubicBezTo>
+                  <a:close/>
+                </a:path>
+              </a:pathLst>
+            </a:custGeom>
+            <a:solidFill>
+              <a:schemeClr val="bg1">
+                <a:lumMod val="95000"/>
+              </a:schemeClr>
+            </a:solidFill>
+            <a:ln>
+              <a:noFill/>
+            </a:ln>
+            <a:extLst>
+              <a:ext uri="{91240B29-F687-4F45-9708-019B960494DF}">
+                <a14:hiddenLine xmlns:a14="http://schemas.microsoft.com/office/drawing/2010/main" w="9525">
+                  <a:solidFill>
+                    <a:srgbClr val="000000"/>
+                  </a:solidFill>
+                  <a:round/>
+                  <a:headEnd/>
+                  <a:tailEnd/>
+                </a14:hiddenLine>
+              </a:ext>
+            </a:extLst>
+          </p:spPr>
+          <p:txBody>
+            <a:bodyPr vert="horz" wrap="square" lIns="91440" tIns="45720" rIns="91440" bIns="45720" numCol="1" anchor="t" anchorCtr="0" compatLnSpc="1">
+              <a:prstTxWarp prst="textNoShape">
+                <a:avLst/>
+              </a:prstTxWarp>
+            </a:bodyPr>
+            <a:lstStyle/>
+            <a:p>
+              <a:endParaRPr lang="en-US"/>
+            </a:p>
+          </p:txBody>
+        </p:sp>
+        <p:sp>
+          <p:nvSpPr>
+            <p:cNvPr id="72" name="Freeform 591">
+              <a:extLst>
+                <a:ext uri="{FF2B5EF4-FFF2-40B4-BE49-F238E27FC236}">
+                  <a16:creationId xmlns:a16="http://schemas.microsoft.com/office/drawing/2014/main" id="{1D32D0B1-3473-4D39-B144-A751564298DE}"/>
+                </a:ext>
+              </a:extLst>
+            </p:cNvPr>
+            <p:cNvSpPr>
+              <a:spLocks/>
+            </p:cNvSpPr>
+            <p:nvPr/>
+          </p:nvSpPr>
+          <p:spPr bwMode="auto">
+            <a:xfrm>
+              <a:off x="7474594" y="1010691"/>
+              <a:ext cx="589284" cy="312810"/>
+            </a:xfrm>
+            <a:custGeom>
+              <a:avLst/>
+              <a:gdLst>
+                <a:gd name="T0" fmla="*/ 147 w 170"/>
+                <a:gd name="T1" fmla="*/ 45 h 91"/>
+                <a:gd name="T2" fmla="*/ 146 w 170"/>
+                <a:gd name="T3" fmla="*/ 45 h 91"/>
+                <a:gd name="T4" fmla="*/ 101 w 170"/>
+                <a:gd name="T5" fmla="*/ 0 h 91"/>
+                <a:gd name="T6" fmla="*/ 56 w 170"/>
+                <a:gd name="T7" fmla="*/ 40 h 91"/>
+                <a:gd name="T8" fmla="*/ 31 w 170"/>
+                <a:gd name="T9" fmla="*/ 28 h 91"/>
+                <a:gd name="T10" fmla="*/ 0 w 170"/>
+                <a:gd name="T11" fmla="*/ 60 h 91"/>
+                <a:gd name="T12" fmla="*/ 31 w 170"/>
+                <a:gd name="T13" fmla="*/ 91 h 91"/>
+                <a:gd name="T14" fmla="*/ 147 w 170"/>
+                <a:gd name="T15" fmla="*/ 91 h 91"/>
+                <a:gd name="T16" fmla="*/ 170 w 170"/>
+                <a:gd name="T17" fmla="*/ 68 h 91"/>
+                <a:gd name="T18" fmla="*/ 147 w 170"/>
+                <a:gd name="T19" fmla="*/ 45 h 91"/>
+              </a:gdLst>
+              <a:ahLst/>
+              <a:cxnLst>
+                <a:cxn ang="0">
+                  <a:pos x="T0" y="T1"/>
+                </a:cxn>
+                <a:cxn ang="0">
+                  <a:pos x="T2" y="T3"/>
+                </a:cxn>
+                <a:cxn ang="0">
+                  <a:pos x="T4" y="T5"/>
+                </a:cxn>
+                <a:cxn ang="0">
+                  <a:pos x="T6" y="T7"/>
+                </a:cxn>
+                <a:cxn ang="0">
+                  <a:pos x="T8" y="T9"/>
+                </a:cxn>
+                <a:cxn ang="0">
+                  <a:pos x="T10" y="T11"/>
+                </a:cxn>
+                <a:cxn ang="0">
+                  <a:pos x="T12" y="T13"/>
+                </a:cxn>
+                <a:cxn ang="0">
+                  <a:pos x="T14" y="T15"/>
+                </a:cxn>
+                <a:cxn ang="0">
+                  <a:pos x="T16" y="T17"/>
+                </a:cxn>
+                <a:cxn ang="0">
+                  <a:pos x="T18" y="T19"/>
+                </a:cxn>
+              </a:cxnLst>
+              <a:rect l="0" t="0" r="r" b="b"/>
+              <a:pathLst>
+                <a:path w="170" h="91">
+                  <a:moveTo>
+                    <a:pt x="147" y="45"/>
+                  </a:moveTo>
+                  <a:cubicBezTo>
+                    <a:pt x="146" y="45"/>
+                    <a:pt x="146" y="45"/>
+                    <a:pt x="146" y="45"/>
+                  </a:cubicBezTo>
+                  <a:cubicBezTo>
+                    <a:pt x="146" y="20"/>
+                    <a:pt x="126" y="0"/>
+                    <a:pt x="101" y="0"/>
+                  </a:cubicBezTo>
+                  <a:cubicBezTo>
+                    <a:pt x="78" y="0"/>
+                    <a:pt x="59" y="18"/>
+                    <a:pt x="56" y="40"/>
+                  </a:cubicBezTo>
+                  <a:cubicBezTo>
+                    <a:pt x="50" y="33"/>
+                    <a:pt x="41" y="28"/>
+                    <a:pt x="31" y="28"/>
+                  </a:cubicBezTo>
+                  <a:cubicBezTo>
+                    <a:pt x="14" y="28"/>
+                    <a:pt x="0" y="42"/>
+                    <a:pt x="0" y="60"/>
+                  </a:cubicBezTo>
+                  <a:cubicBezTo>
+                    <a:pt x="0" y="77"/>
+                    <a:pt x="14" y="91"/>
+                    <a:pt x="31" y="91"/>
+                  </a:cubicBezTo>
+                  <a:cubicBezTo>
+                    <a:pt x="147" y="91"/>
+                    <a:pt x="147" y="91"/>
+                    <a:pt x="147" y="91"/>
+                  </a:cubicBezTo>
+                  <a:cubicBezTo>
+                    <a:pt x="160" y="91"/>
+                    <a:pt x="170" y="81"/>
+                    <a:pt x="170" y="68"/>
+                  </a:cubicBezTo>
+                  <a:cubicBezTo>
+                    <a:pt x="170" y="56"/>
+                    <a:pt x="160" y="45"/>
+                    <a:pt x="147" y="45"/>
+                  </a:cubicBezTo>
+                  <a:close/>
+                </a:path>
+              </a:pathLst>
+            </a:custGeom>
+            <a:solidFill>
+              <a:schemeClr val="bg1">
+                <a:lumMod val="95000"/>
+              </a:schemeClr>
             </a:solidFill>
             <a:ln>
               <a:noFill/>
@@ -19603,4 +22419,299 @@
     </a:ext>
   </a:extLst>
 </a:theme>
+</file>
+
+<file path=ppt/theme/theme2.xml><?xml version="1.0" encoding="utf-8"?>
+<a:theme xmlns:a="http://schemas.openxmlformats.org/drawingml/2006/main" name="Office Theme">
+  <a:themeElements>
+    <a:clrScheme name="Office">
+      <a:dk1>
+        <a:sysClr val="windowText" lastClr="000000"/>
+      </a:dk1>
+      <a:lt1>
+        <a:sysClr val="window" lastClr="FFFFFF"/>
+      </a:lt1>
+      <a:dk2>
+        <a:srgbClr val="44546A"/>
+      </a:dk2>
+      <a:lt2>
+        <a:srgbClr val="E7E6E6"/>
+      </a:lt2>
+      <a:accent1>
+        <a:srgbClr val="4472C4"/>
+      </a:accent1>
+      <a:accent2>
+        <a:srgbClr val="ED7D31"/>
+      </a:accent2>
+      <a:accent3>
+        <a:srgbClr val="A5A5A5"/>
+      </a:accent3>
+      <a:accent4>
+        <a:srgbClr val="FFC000"/>
+      </a:accent4>
+      <a:accent5>
+        <a:srgbClr val="5B9BD5"/>
+      </a:accent5>
+      <a:accent6>
+        <a:srgbClr val="70AD47"/>
+      </a:accent6>
+      <a:hlink>
+        <a:srgbClr val="0563C1"/>
+      </a:hlink>
+      <a:folHlink>
+        <a:srgbClr val="954F72"/>
+      </a:folHlink>
+    </a:clrScheme>
+    <a:fontScheme name="Office">
+      <a:majorFont>
+        <a:latin typeface="Calibri Light" panose="020F0302020204030204"/>
+        <a:ea typeface=""/>
+        <a:cs typeface=""/>
+        <a:font script="Jpan" typeface="游ゴシック Light"/>
+        <a:font script="Hang" typeface="맑은 고딕"/>
+        <a:font script="Hans" typeface="等线 Light"/>
+        <a:font script="Hant" typeface="新細明體"/>
+        <a:font script="Arab" typeface="Times New Roman"/>
+        <a:font script="Hebr" typeface="Times New Roman"/>
+        <a:font script="Thai" typeface="Angsana New"/>
+        <a:font script="Ethi" typeface="Nyala"/>
+        <a:font script="Beng" typeface="Vrinda"/>
+        <a:font script="Gujr" typeface="Shruti"/>
+        <a:font script="Khmr" typeface="MoolBoran"/>
+        <a:font script="Knda" typeface="Tunga"/>
+        <a:font script="Guru" typeface="Raavi"/>
+        <a:font script="Cans" typeface="Euphemia"/>
+        <a:font script="Cher" typeface="Plantagenet Cherokee"/>
+        <a:font script="Yiii" typeface="Microsoft Yi Baiti"/>
+        <a:font script="Tibt" typeface="Microsoft Himalaya"/>
+        <a:font script="Thaa" typeface="MV Boli"/>
+        <a:font script="Deva" typeface="Mangal"/>
+        <a:font script="Telu" typeface="Gautami"/>
+        <a:font script="Taml" typeface="Latha"/>
+        <a:font script="Syrc" typeface="Estrangelo Edessa"/>
+        <a:font script="Orya" typeface="Kalinga"/>
+        <a:font script="Mlym" typeface="Kartika"/>
+        <a:font script="Laoo" typeface="DokChampa"/>
+        <a:font script="Sinh" typeface="Iskoola Pota"/>
+        <a:font script="Mong" typeface="Mongolian Baiti"/>
+        <a:font script="Viet" typeface="Times New Roman"/>
+        <a:font script="Uigh" typeface="Microsoft Uighur"/>
+        <a:font script="Geor" typeface="Sylfaen"/>
+        <a:font script="Armn" typeface="Arial"/>
+        <a:font script="Bugi" typeface="Leelawadee UI"/>
+        <a:font script="Bopo" typeface="Microsoft JhengHei"/>
+        <a:font script="Java" typeface="Javanese Text"/>
+        <a:font script="Lisu" typeface="Segoe UI"/>
+        <a:font script="Mymr" typeface="Myanmar Text"/>
+        <a:font script="Nkoo" typeface="Ebrima"/>
+        <a:font script="Olck" typeface="Nirmala UI"/>
+        <a:font script="Osma" typeface="Ebrima"/>
+        <a:font script="Phag" typeface="Phagspa"/>
+        <a:font script="Syrn" typeface="Estrangelo Edessa"/>
+        <a:font script="Syrj" typeface="Estrangelo Edessa"/>
+        <a:font script="Syre" typeface="Estrangelo Edessa"/>
+        <a:font script="Sora" typeface="Nirmala UI"/>
+        <a:font script="Tale" typeface="Microsoft Tai Le"/>
+        <a:font script="Talu" typeface="Microsoft New Tai Lue"/>
+        <a:font script="Tfng" typeface="Ebrima"/>
+      </a:majorFont>
+      <a:minorFont>
+        <a:latin typeface="Calibri" panose="020F0502020204030204"/>
+        <a:ea typeface=""/>
+        <a:cs typeface=""/>
+        <a:font script="Jpan" typeface="游ゴシック"/>
+        <a:font script="Hang" typeface="맑은 고딕"/>
+        <a:font script="Hans" typeface="等线"/>
+        <a:font script="Hant" typeface="新細明體"/>
+        <a:font script="Arab" typeface="Arial"/>
+        <a:font script="Hebr" typeface="Arial"/>
+        <a:font script="Thai" typeface="Cordia New"/>
+        <a:font script="Ethi" typeface="Nyala"/>
+        <a:font script="Beng" typeface="Vrinda"/>
+        <a:font script="Gujr" typeface="Shruti"/>
+        <a:font script="Khmr" typeface="DaunPenh"/>
+        <a:font script="Knda" typeface="Tunga"/>
+        <a:font script="Guru" typeface="Raavi"/>
+        <a:font script="Cans" typeface="Euphemia"/>
+        <a:font script="Cher" typeface="Plantagenet Cherokee"/>
+        <a:font script="Yiii" typeface="Microsoft Yi Baiti"/>
+        <a:font script="Tibt" typeface="Microsoft Himalaya"/>
+        <a:font script="Thaa" typeface="MV Boli"/>
+        <a:font script="Deva" typeface="Mangal"/>
+        <a:font script="Telu" typeface="Gautami"/>
+        <a:font script="Taml" typeface="Latha"/>
+        <a:font script="Syrc" typeface="Estrangelo Edessa"/>
+        <a:font script="Orya" typeface="Kalinga"/>
+        <a:font script="Mlym" typeface="Kartika"/>
+        <a:font script="Laoo" typeface="DokChampa"/>
+        <a:font script="Sinh" typeface="Iskoola Pota"/>
+        <a:font script="Mong" typeface="Mongolian Baiti"/>
+        <a:font script="Viet" typeface="Arial"/>
+        <a:font script="Uigh" typeface="Microsoft Uighur"/>
+        <a:font script="Geor" typeface="Sylfaen"/>
+        <a:font script="Armn" typeface="Arial"/>
+        <a:font script="Bugi" typeface="Leelawadee UI"/>
+        <a:font script="Bopo" typeface="Microsoft JhengHei"/>
+        <a:font script="Java" typeface="Javanese Text"/>
+        <a:font script="Lisu" typeface="Segoe UI"/>
+        <a:font script="Mymr" typeface="Myanmar Text"/>
+        <a:font script="Nkoo" typeface="Ebrima"/>
+        <a:font script="Olck" typeface="Nirmala UI"/>
+        <a:font script="Osma" typeface="Ebrima"/>
+        <a:font script="Phag" typeface="Phagspa"/>
+        <a:font script="Syrn" typeface="Estrangelo Edessa"/>
+        <a:font script="Syrj" typeface="Estrangelo Edessa"/>
+        <a:font script="Syre" typeface="Estrangelo Edessa"/>
+        <a:font script="Sora" typeface="Nirmala UI"/>
+        <a:font script="Tale" typeface="Microsoft Tai Le"/>
+        <a:font script="Talu" typeface="Microsoft New Tai Lue"/>
+        <a:font script="Tfng" typeface="Ebrima"/>
+      </a:minorFont>
+    </a:fontScheme>
+    <a:fmtScheme name="Office">
+      <a:fillStyleLst>
+        <a:solidFill>
+          <a:schemeClr val="phClr"/>
+        </a:solidFill>
+        <a:gradFill rotWithShape="1">
+          <a:gsLst>
+            <a:gs pos="0">
+              <a:schemeClr val="phClr">
+                <a:lumMod val="110000"/>
+                <a:satMod val="105000"/>
+                <a:tint val="67000"/>
+              </a:schemeClr>
+            </a:gs>
+            <a:gs pos="50000">
+              <a:schemeClr val="phClr">
+                <a:lumMod val="105000"/>
+                <a:satMod val="103000"/>
+                <a:tint val="73000"/>
+              </a:schemeClr>
+            </a:gs>
+            <a:gs pos="100000">
+              <a:schemeClr val="phClr">
+                <a:lumMod val="105000"/>
+                <a:satMod val="109000"/>
+                <a:tint val="81000"/>
+              </a:schemeClr>
+            </a:gs>
+          </a:gsLst>
+          <a:lin ang="5400000" scaled="0"/>
+        </a:gradFill>
+        <a:gradFill rotWithShape="1">
+          <a:gsLst>
+            <a:gs pos="0">
+              <a:schemeClr val="phClr">
+                <a:satMod val="103000"/>
+                <a:lumMod val="102000"/>
+                <a:tint val="94000"/>
+              </a:schemeClr>
+            </a:gs>
+            <a:gs pos="50000">
+              <a:schemeClr val="phClr">
+                <a:satMod val="110000"/>
+                <a:lumMod val="100000"/>
+                <a:shade val="100000"/>
+              </a:schemeClr>
+            </a:gs>
+            <a:gs pos="100000">
+              <a:schemeClr val="phClr">
+                <a:lumMod val="99000"/>
+                <a:satMod val="120000"/>
+                <a:shade val="78000"/>
+              </a:schemeClr>
+            </a:gs>
+          </a:gsLst>
+          <a:lin ang="5400000" scaled="0"/>
+        </a:gradFill>
+      </a:fillStyleLst>
+      <a:lnStyleLst>
+        <a:ln w="6350" cap="flat" cmpd="sng" algn="ctr">
+          <a:solidFill>
+            <a:schemeClr val="phClr"/>
+          </a:solidFill>
+          <a:prstDash val="solid"/>
+          <a:miter lim="800000"/>
+        </a:ln>
+        <a:ln w="12700" cap="flat" cmpd="sng" algn="ctr">
+          <a:solidFill>
+            <a:schemeClr val="phClr"/>
+          </a:solidFill>
+          <a:prstDash val="solid"/>
+          <a:miter lim="800000"/>
+        </a:ln>
+        <a:ln w="19050" cap="flat" cmpd="sng" algn="ctr">
+          <a:solidFill>
+            <a:schemeClr val="phClr"/>
+          </a:solidFill>
+          <a:prstDash val="solid"/>
+          <a:miter lim="800000"/>
+        </a:ln>
+      </a:lnStyleLst>
+      <a:effectStyleLst>
+        <a:effectStyle>
+          <a:effectLst/>
+        </a:effectStyle>
+        <a:effectStyle>
+          <a:effectLst/>
+        </a:effectStyle>
+        <a:effectStyle>
+          <a:effectLst>
+            <a:outerShdw blurRad="57150" dist="19050" dir="5400000" algn="ctr" rotWithShape="0">
+              <a:srgbClr val="000000">
+                <a:alpha val="63000"/>
+              </a:srgbClr>
+            </a:outerShdw>
+          </a:effectLst>
+        </a:effectStyle>
+      </a:effectStyleLst>
+      <a:bgFillStyleLst>
+        <a:solidFill>
+          <a:schemeClr val="phClr"/>
+        </a:solidFill>
+        <a:solidFill>
+          <a:schemeClr val="phClr">
+            <a:tint val="95000"/>
+            <a:satMod val="170000"/>
+          </a:schemeClr>
+        </a:solidFill>
+        <a:gradFill rotWithShape="1">
+          <a:gsLst>
+            <a:gs pos="0">
+              <a:schemeClr val="phClr">
+                <a:tint val="93000"/>
+                <a:satMod val="150000"/>
+                <a:shade val="98000"/>
+                <a:lumMod val="102000"/>
+              </a:schemeClr>
+            </a:gs>
+            <a:gs pos="50000">
+              <a:schemeClr val="phClr">
+                <a:tint val="98000"/>
+                <a:satMod val="130000"/>
+                <a:shade val="90000"/>
+                <a:lumMod val="103000"/>
+              </a:schemeClr>
+            </a:gs>
+            <a:gs pos="100000">
+              <a:schemeClr val="phClr">
+                <a:shade val="63000"/>
+                <a:satMod val="120000"/>
+              </a:schemeClr>
+            </a:gs>
+          </a:gsLst>
+          <a:lin ang="5400000" scaled="0"/>
+        </a:gradFill>
+      </a:bgFillStyleLst>
+    </a:fmtScheme>
+  </a:themeElements>
+  <a:objectDefaults/>
+  <a:extraClrSchemeLst/>
+  <a:extLst>
+    <a:ext uri="{05A4C25C-085E-4340-85A3-A5531E510DB2}">
+      <thm15:themeFamily xmlns:thm15="http://schemas.microsoft.com/office/thememl/2012/main" name="Office Theme" id="{62F939B6-93AF-4DB8-9C6B-D6C7DFDC589F}" vid="{4A3C46E8-61CC-4603-A589-7422A47A8E4A}"/>
+    </a:ext>
+  </a:extLst>
+</a:theme>
 </file>
</xml_diff>

<commit_message>
New SVG icon, CLI updates
</commit_message>
<xml_diff>
--- a/images/AzureCitadelBanner.pptx
+++ b/images/AzureCitadelBanner.pptx
@@ -5,11 +5,12 @@
     <p:sldMasterId id="2147483648" r:id="rId1"/>
   </p:sldMasterIdLst>
   <p:notesMasterIdLst>
-    <p:notesMasterId r:id="rId4"/>
+    <p:notesMasterId r:id="rId5"/>
   </p:notesMasterIdLst>
   <p:sldIdLst>
     <p:sldId id="256" r:id="rId2"/>
-    <p:sldId id="257" r:id="rId3"/>
+    <p:sldId id="258" r:id="rId3"/>
+    <p:sldId id="257" r:id="rId4"/>
   </p:sldIdLst>
   <p:sldSz cx="12192000" cy="6858000"/>
   <p:notesSz cx="6858000" cy="9144000"/>
@@ -202,7 +203,7 @@
           <a:p>
             <a:fld id="{7B6D4EAA-ACCA-462D-97CE-B7FFB398C493}" type="datetimeFigureOut">
               <a:rPr lang="en-GB" smtClean="0"/>
-              <a:t>28/09/2017</a:t>
+              <a:t>20/10/2017</a:t>
             </a:fld>
             <a:endParaRPr lang="en-GB"/>
           </a:p>
@@ -628,6 +629,90 @@
     </p:spTree>
     <p:extLst>
       <p:ext uri="{BB962C8B-B14F-4D97-AF65-F5344CB8AC3E}">
+        <p14:creationId xmlns:p14="http://schemas.microsoft.com/office/powerpoint/2010/main" val="1844068533"/>
+      </p:ext>
+    </p:extLst>
+  </p:cSld>
+  <p:clrMapOvr>
+    <a:masterClrMapping/>
+  </p:clrMapOvr>
+</p:notes>
+</file>
+
+<file path=ppt/notesSlides/notesSlide3.xml><?xml version="1.0" encoding="utf-8"?>
+<p:notes xmlns:a="http://schemas.openxmlformats.org/drawingml/2006/main" xmlns:r="http://schemas.openxmlformats.org/officeDocument/2006/relationships" xmlns:p="http://schemas.openxmlformats.org/presentationml/2006/main">
+  <p:cSld>
+    <p:spTree>
+      <p:nvGrpSpPr>
+        <p:cNvPr id="1" name=""/>
+        <p:cNvGrpSpPr/>
+        <p:nvPr/>
+      </p:nvGrpSpPr>
+      <p:grpSpPr>
+        <a:xfrm>
+          <a:off x="0" y="0"/>
+          <a:ext cx="0" cy="0"/>
+          <a:chOff x="0" y="0"/>
+          <a:chExt cx="0" cy="0"/>
+        </a:xfrm>
+      </p:grpSpPr>
+      <p:sp>
+        <p:nvSpPr>
+          <p:cNvPr id="2" name="Slide Image Placeholder 1"/>
+          <p:cNvSpPr>
+            <a:spLocks noGrp="1" noRot="1" noChangeAspect="1"/>
+          </p:cNvSpPr>
+          <p:nvPr>
+            <p:ph type="sldImg"/>
+          </p:nvPr>
+        </p:nvSpPr>
+        <p:spPr/>
+      </p:sp>
+      <p:sp>
+        <p:nvSpPr>
+          <p:cNvPr id="3" name="Notes Placeholder 2"/>
+          <p:cNvSpPr>
+            <a:spLocks noGrp="1"/>
+          </p:cNvSpPr>
+          <p:nvPr>
+            <p:ph type="body" idx="1"/>
+          </p:nvPr>
+        </p:nvSpPr>
+        <p:spPr/>
+        <p:txBody>
+          <a:bodyPr/>
+          <a:lstStyle/>
+          <a:p>
+            <a:endParaRPr lang="en-GB"/>
+          </a:p>
+        </p:txBody>
+      </p:sp>
+      <p:sp>
+        <p:nvSpPr>
+          <p:cNvPr id="4" name="Slide Number Placeholder 3"/>
+          <p:cNvSpPr>
+            <a:spLocks noGrp="1"/>
+          </p:cNvSpPr>
+          <p:nvPr>
+            <p:ph type="sldNum" sz="quarter" idx="10"/>
+          </p:nvPr>
+        </p:nvSpPr>
+        <p:spPr/>
+        <p:txBody>
+          <a:bodyPr/>
+          <a:lstStyle/>
+          <a:p>
+            <a:fld id="{984CEC9C-25B7-49AF-B8DB-71646D1676F1}" type="slidenum">
+              <a:rPr lang="en-GB" smtClean="0"/>
+              <a:t>3</a:t>
+            </a:fld>
+            <a:endParaRPr lang="en-GB"/>
+          </a:p>
+        </p:txBody>
+      </p:sp>
+    </p:spTree>
+    <p:extLst>
+      <p:ext uri="{BB962C8B-B14F-4D97-AF65-F5344CB8AC3E}">
         <p14:creationId xmlns:p14="http://schemas.microsoft.com/office/powerpoint/2010/main" val="1504944839"/>
       </p:ext>
     </p:extLst>
@@ -787,7 +872,7 @@
           <a:p>
             <a:fld id="{3A34A2D0-F9BC-4E75-AABA-0F8BFEBF7988}" type="datetimeFigureOut">
               <a:rPr lang="en-GB" smtClean="0"/>
-              <a:t>28/09/2017</a:t>
+              <a:t>20/10/2017</a:t>
             </a:fld>
             <a:endParaRPr lang="en-GB"/>
           </a:p>
@@ -987,7 +1072,7 @@
           <a:p>
             <a:fld id="{3A34A2D0-F9BC-4E75-AABA-0F8BFEBF7988}" type="datetimeFigureOut">
               <a:rPr lang="en-GB" smtClean="0"/>
-              <a:t>28/09/2017</a:t>
+              <a:t>20/10/2017</a:t>
             </a:fld>
             <a:endParaRPr lang="en-GB"/>
           </a:p>
@@ -1197,7 +1282,7 @@
           <a:p>
             <a:fld id="{3A34A2D0-F9BC-4E75-AABA-0F8BFEBF7988}" type="datetimeFigureOut">
               <a:rPr lang="en-GB" smtClean="0"/>
-              <a:t>28/09/2017</a:t>
+              <a:t>20/10/2017</a:t>
             </a:fld>
             <a:endParaRPr lang="en-GB"/>
           </a:p>
@@ -1397,7 +1482,7 @@
           <a:p>
             <a:fld id="{3A34A2D0-F9BC-4E75-AABA-0F8BFEBF7988}" type="datetimeFigureOut">
               <a:rPr lang="en-GB" smtClean="0"/>
-              <a:t>28/09/2017</a:t>
+              <a:t>20/10/2017</a:t>
             </a:fld>
             <a:endParaRPr lang="en-GB"/>
           </a:p>
@@ -1673,7 +1758,7 @@
           <a:p>
             <a:fld id="{3A34A2D0-F9BC-4E75-AABA-0F8BFEBF7988}" type="datetimeFigureOut">
               <a:rPr lang="en-GB" smtClean="0"/>
-              <a:t>28/09/2017</a:t>
+              <a:t>20/10/2017</a:t>
             </a:fld>
             <a:endParaRPr lang="en-GB"/>
           </a:p>
@@ -1941,7 +2026,7 @@
           <a:p>
             <a:fld id="{3A34A2D0-F9BC-4E75-AABA-0F8BFEBF7988}" type="datetimeFigureOut">
               <a:rPr lang="en-GB" smtClean="0"/>
-              <a:t>28/09/2017</a:t>
+              <a:t>20/10/2017</a:t>
             </a:fld>
             <a:endParaRPr lang="en-GB"/>
           </a:p>
@@ -2356,7 +2441,7 @@
           <a:p>
             <a:fld id="{3A34A2D0-F9BC-4E75-AABA-0F8BFEBF7988}" type="datetimeFigureOut">
               <a:rPr lang="en-GB" smtClean="0"/>
-              <a:t>28/09/2017</a:t>
+              <a:t>20/10/2017</a:t>
             </a:fld>
             <a:endParaRPr lang="en-GB"/>
           </a:p>
@@ -2498,7 +2583,7 @@
           <a:p>
             <a:fld id="{3A34A2D0-F9BC-4E75-AABA-0F8BFEBF7988}" type="datetimeFigureOut">
               <a:rPr lang="en-GB" smtClean="0"/>
-              <a:t>28/09/2017</a:t>
+              <a:t>20/10/2017</a:t>
             </a:fld>
             <a:endParaRPr lang="en-GB"/>
           </a:p>
@@ -2611,7 +2696,7 @@
           <a:p>
             <a:fld id="{3A34A2D0-F9BC-4E75-AABA-0F8BFEBF7988}" type="datetimeFigureOut">
               <a:rPr lang="en-GB" smtClean="0"/>
-              <a:t>28/09/2017</a:t>
+              <a:t>20/10/2017</a:t>
             </a:fld>
             <a:endParaRPr lang="en-GB"/>
           </a:p>
@@ -2924,7 +3009,7 @@
           <a:p>
             <a:fld id="{3A34A2D0-F9BC-4E75-AABA-0F8BFEBF7988}" type="datetimeFigureOut">
               <a:rPr lang="en-GB" smtClean="0"/>
-              <a:t>28/09/2017</a:t>
+              <a:t>20/10/2017</a:t>
             </a:fld>
             <a:endParaRPr lang="en-GB"/>
           </a:p>
@@ -3213,7 +3298,7 @@
           <a:p>
             <a:fld id="{3A34A2D0-F9BC-4E75-AABA-0F8BFEBF7988}" type="datetimeFigureOut">
               <a:rPr lang="en-GB" smtClean="0"/>
-              <a:t>28/09/2017</a:t>
+              <a:t>20/10/2017</a:t>
             </a:fld>
             <a:endParaRPr lang="en-GB"/>
           </a:p>
@@ -3456,7 +3541,7 @@
           <a:p>
             <a:fld id="{3A34A2D0-F9BC-4E75-AABA-0F8BFEBF7988}" type="datetimeFigureOut">
               <a:rPr lang="en-GB" smtClean="0"/>
-              <a:t>28/09/2017</a:t>
+              <a:t>20/10/2017</a:t>
             </a:fld>
             <a:endParaRPr lang="en-GB"/>
           </a:p>
@@ -9044,6 +9129,2463 @@
       </p:grpSpPr>
       <p:sp>
         <p:nvSpPr>
+          <p:cNvPr id="4" name="Rectangle 3">
+            <a:extLst>
+              <a:ext uri="{FF2B5EF4-FFF2-40B4-BE49-F238E27FC236}">
+                <a16:creationId xmlns:a16="http://schemas.microsoft.com/office/drawing/2014/main" id="{22C8C818-88C7-4E8C-B871-8C0B76DDF82D}"/>
+              </a:ext>
+            </a:extLst>
+          </p:cNvPr>
+          <p:cNvSpPr/>
+          <p:nvPr/>
+        </p:nvSpPr>
+        <p:spPr>
+          <a:xfrm>
+            <a:off x="397337" y="3776554"/>
+            <a:ext cx="3254886" cy="686969"/>
+          </a:xfrm>
+          <a:prstGeom prst="rect">
+            <a:avLst/>
+          </a:prstGeom>
+          <a:solidFill>
+            <a:srgbClr val="407855"/>
+          </a:solidFill>
+          <a:ln>
+            <a:noFill/>
+          </a:ln>
+        </p:spPr>
+        <p:style>
+          <a:lnRef idx="2">
+            <a:schemeClr val="accent1">
+              <a:shade val="50000"/>
+            </a:schemeClr>
+          </a:lnRef>
+          <a:fillRef idx="1">
+            <a:schemeClr val="accent1"/>
+          </a:fillRef>
+          <a:effectRef idx="0">
+            <a:schemeClr val="accent1"/>
+          </a:effectRef>
+          <a:fontRef idx="minor">
+            <a:schemeClr val="lt1"/>
+          </a:fontRef>
+        </p:style>
+        <p:txBody>
+          <a:bodyPr rtlCol="0" anchor="ctr"/>
+          <a:lstStyle/>
+          <a:p>
+            <a:pPr algn="ctr"/>
+            <a:endParaRPr lang="en-GB"/>
+          </a:p>
+        </p:txBody>
+      </p:sp>
+      <p:sp>
+        <p:nvSpPr>
+          <p:cNvPr id="134" name="Rectangle 133">
+            <a:extLst>
+              <a:ext uri="{FF2B5EF4-FFF2-40B4-BE49-F238E27FC236}">
+                <a16:creationId xmlns:a16="http://schemas.microsoft.com/office/drawing/2014/main" id="{A4378927-191A-4FDE-8C5E-CB9CFBE46A95}"/>
+              </a:ext>
+            </a:extLst>
+          </p:cNvPr>
+          <p:cNvSpPr/>
+          <p:nvPr/>
+        </p:nvSpPr>
+        <p:spPr>
+          <a:xfrm>
+            <a:off x="397336" y="1348346"/>
+            <a:ext cx="3254886" cy="2429385"/>
+          </a:xfrm>
+          <a:prstGeom prst="rect">
+            <a:avLst/>
+          </a:prstGeom>
+          <a:solidFill>
+            <a:srgbClr val="0078D7"/>
+          </a:solidFill>
+          <a:ln>
+            <a:noFill/>
+          </a:ln>
+        </p:spPr>
+        <p:style>
+          <a:lnRef idx="2">
+            <a:schemeClr val="accent1">
+              <a:shade val="50000"/>
+            </a:schemeClr>
+          </a:lnRef>
+          <a:fillRef idx="1">
+            <a:schemeClr val="accent1"/>
+          </a:fillRef>
+          <a:effectRef idx="0">
+            <a:schemeClr val="accent1"/>
+          </a:effectRef>
+          <a:fontRef idx="minor">
+            <a:schemeClr val="lt1"/>
+          </a:fontRef>
+        </p:style>
+        <p:txBody>
+          <a:bodyPr rtlCol="0" anchor="ctr"/>
+          <a:lstStyle/>
+          <a:p>
+            <a:pPr algn="ctr"/>
+            <a:endParaRPr lang="en-GB"/>
+          </a:p>
+        </p:txBody>
+      </p:sp>
+      <p:grpSp>
+        <p:nvGrpSpPr>
+          <p:cNvPr id="62" name="Group 61">
+            <a:extLst>
+              <a:ext uri="{FF2B5EF4-FFF2-40B4-BE49-F238E27FC236}">
+                <a16:creationId xmlns:a16="http://schemas.microsoft.com/office/drawing/2014/main" id="{73CBB873-BA45-4D82-B18C-A9B628432543}"/>
+              </a:ext>
+            </a:extLst>
+          </p:cNvPr>
+          <p:cNvGrpSpPr/>
+          <p:nvPr/>
+        </p:nvGrpSpPr>
+        <p:grpSpPr>
+          <a:xfrm>
+            <a:off x="892257" y="1453351"/>
+            <a:ext cx="2016520" cy="3008204"/>
+            <a:chOff x="7006571" y="1010691"/>
+            <a:chExt cx="2637198" cy="3934119"/>
+          </a:xfrm>
+        </p:grpSpPr>
+        <p:sp>
+          <p:nvSpPr>
+            <p:cNvPr id="63" name="Rectangle 428">
+              <a:extLst>
+                <a:ext uri="{FF2B5EF4-FFF2-40B4-BE49-F238E27FC236}">
+                  <a16:creationId xmlns:a16="http://schemas.microsoft.com/office/drawing/2014/main" id="{25F87F93-6A5F-4492-809E-EF83069760F2}"/>
+                </a:ext>
+              </a:extLst>
+            </p:cNvPr>
+            <p:cNvSpPr>
+              <a:spLocks noChangeArrowheads="1"/>
+            </p:cNvSpPr>
+            <p:nvPr/>
+          </p:nvSpPr>
+          <p:spPr bwMode="auto">
+            <a:xfrm rot="18753471">
+              <a:off x="7577072" y="2965315"/>
+              <a:ext cx="388975" cy="762892"/>
+            </a:xfrm>
+            <a:prstGeom prst="rect">
+              <a:avLst/>
+            </a:prstGeom>
+            <a:solidFill>
+              <a:srgbClr val="40CDF5"/>
+            </a:solidFill>
+            <a:ln>
+              <a:noFill/>
+            </a:ln>
+            <a:extLst>
+              <a:ext uri="{91240B29-F687-4F45-9708-019B960494DF}">
+                <a14:hiddenLine xmlns:a14="http://schemas.microsoft.com/office/drawing/2010/main" w="9525">
+                  <a:solidFill>
+                    <a:srgbClr val="000000"/>
+                  </a:solidFill>
+                  <a:miter lim="800000"/>
+                  <a:headEnd/>
+                  <a:tailEnd/>
+                </a14:hiddenLine>
+              </a:ext>
+            </a:extLst>
+          </p:spPr>
+          <p:txBody>
+            <a:bodyPr vert="horz" wrap="square" lIns="91440" tIns="45720" rIns="91440" bIns="45720" numCol="1" anchor="t" anchorCtr="0" compatLnSpc="1">
+              <a:prstTxWarp prst="textNoShape">
+                <a:avLst/>
+              </a:prstTxWarp>
+            </a:bodyPr>
+            <a:lstStyle/>
+            <a:p>
+              <a:endParaRPr lang="en-US"/>
+            </a:p>
+          </p:txBody>
+        </p:sp>
+        <p:sp>
+          <p:nvSpPr>
+            <p:cNvPr id="64" name="Freeform 591">
+              <a:extLst>
+                <a:ext uri="{FF2B5EF4-FFF2-40B4-BE49-F238E27FC236}">
+                  <a16:creationId xmlns:a16="http://schemas.microsoft.com/office/drawing/2014/main" id="{DE445C3C-A2F8-4ADC-8B46-FB19073D660A}"/>
+                </a:ext>
+              </a:extLst>
+            </p:cNvPr>
+            <p:cNvSpPr>
+              <a:spLocks/>
+            </p:cNvSpPr>
+            <p:nvPr/>
+          </p:nvSpPr>
+          <p:spPr bwMode="auto">
+            <a:xfrm>
+              <a:off x="8513390" y="2061610"/>
+              <a:ext cx="941023" cy="499524"/>
+            </a:xfrm>
+            <a:custGeom>
+              <a:avLst/>
+              <a:gdLst>
+                <a:gd name="T0" fmla="*/ 147 w 170"/>
+                <a:gd name="T1" fmla="*/ 45 h 91"/>
+                <a:gd name="T2" fmla="*/ 146 w 170"/>
+                <a:gd name="T3" fmla="*/ 45 h 91"/>
+                <a:gd name="T4" fmla="*/ 101 w 170"/>
+                <a:gd name="T5" fmla="*/ 0 h 91"/>
+                <a:gd name="T6" fmla="*/ 56 w 170"/>
+                <a:gd name="T7" fmla="*/ 40 h 91"/>
+                <a:gd name="T8" fmla="*/ 31 w 170"/>
+                <a:gd name="T9" fmla="*/ 28 h 91"/>
+                <a:gd name="T10" fmla="*/ 0 w 170"/>
+                <a:gd name="T11" fmla="*/ 60 h 91"/>
+                <a:gd name="T12" fmla="*/ 31 w 170"/>
+                <a:gd name="T13" fmla="*/ 91 h 91"/>
+                <a:gd name="T14" fmla="*/ 147 w 170"/>
+                <a:gd name="T15" fmla="*/ 91 h 91"/>
+                <a:gd name="T16" fmla="*/ 170 w 170"/>
+                <a:gd name="T17" fmla="*/ 68 h 91"/>
+                <a:gd name="T18" fmla="*/ 147 w 170"/>
+                <a:gd name="T19" fmla="*/ 45 h 91"/>
+              </a:gdLst>
+              <a:ahLst/>
+              <a:cxnLst>
+                <a:cxn ang="0">
+                  <a:pos x="T0" y="T1"/>
+                </a:cxn>
+                <a:cxn ang="0">
+                  <a:pos x="T2" y="T3"/>
+                </a:cxn>
+                <a:cxn ang="0">
+                  <a:pos x="T4" y="T5"/>
+                </a:cxn>
+                <a:cxn ang="0">
+                  <a:pos x="T6" y="T7"/>
+                </a:cxn>
+                <a:cxn ang="0">
+                  <a:pos x="T8" y="T9"/>
+                </a:cxn>
+                <a:cxn ang="0">
+                  <a:pos x="T10" y="T11"/>
+                </a:cxn>
+                <a:cxn ang="0">
+                  <a:pos x="T12" y="T13"/>
+                </a:cxn>
+                <a:cxn ang="0">
+                  <a:pos x="T14" y="T15"/>
+                </a:cxn>
+                <a:cxn ang="0">
+                  <a:pos x="T16" y="T17"/>
+                </a:cxn>
+                <a:cxn ang="0">
+                  <a:pos x="T18" y="T19"/>
+                </a:cxn>
+              </a:cxnLst>
+              <a:rect l="0" t="0" r="r" b="b"/>
+              <a:pathLst>
+                <a:path w="170" h="91">
+                  <a:moveTo>
+                    <a:pt x="147" y="45"/>
+                  </a:moveTo>
+                  <a:cubicBezTo>
+                    <a:pt x="146" y="45"/>
+                    <a:pt x="146" y="45"/>
+                    <a:pt x="146" y="45"/>
+                  </a:cubicBezTo>
+                  <a:cubicBezTo>
+                    <a:pt x="146" y="20"/>
+                    <a:pt x="126" y="0"/>
+                    <a:pt x="101" y="0"/>
+                  </a:cubicBezTo>
+                  <a:cubicBezTo>
+                    <a:pt x="78" y="0"/>
+                    <a:pt x="59" y="18"/>
+                    <a:pt x="56" y="40"/>
+                  </a:cubicBezTo>
+                  <a:cubicBezTo>
+                    <a:pt x="50" y="33"/>
+                    <a:pt x="41" y="28"/>
+                    <a:pt x="31" y="28"/>
+                  </a:cubicBezTo>
+                  <a:cubicBezTo>
+                    <a:pt x="14" y="28"/>
+                    <a:pt x="0" y="42"/>
+                    <a:pt x="0" y="60"/>
+                  </a:cubicBezTo>
+                  <a:cubicBezTo>
+                    <a:pt x="0" y="77"/>
+                    <a:pt x="14" y="91"/>
+                    <a:pt x="31" y="91"/>
+                  </a:cubicBezTo>
+                  <a:cubicBezTo>
+                    <a:pt x="147" y="91"/>
+                    <a:pt x="147" y="91"/>
+                    <a:pt x="147" y="91"/>
+                  </a:cubicBezTo>
+                  <a:cubicBezTo>
+                    <a:pt x="160" y="91"/>
+                    <a:pt x="170" y="81"/>
+                    <a:pt x="170" y="68"/>
+                  </a:cubicBezTo>
+                  <a:cubicBezTo>
+                    <a:pt x="170" y="56"/>
+                    <a:pt x="160" y="45"/>
+                    <a:pt x="147" y="45"/>
+                  </a:cubicBezTo>
+                  <a:close/>
+                </a:path>
+              </a:pathLst>
+            </a:custGeom>
+            <a:solidFill>
+              <a:schemeClr val="bg1">
+                <a:lumMod val="95000"/>
+              </a:schemeClr>
+            </a:solidFill>
+            <a:ln>
+              <a:noFill/>
+            </a:ln>
+            <a:extLst>
+              <a:ext uri="{91240B29-F687-4F45-9708-019B960494DF}">
+                <a14:hiddenLine xmlns:a14="http://schemas.microsoft.com/office/drawing/2010/main" w="9525">
+                  <a:solidFill>
+                    <a:srgbClr val="000000"/>
+                  </a:solidFill>
+                  <a:round/>
+                  <a:headEnd/>
+                  <a:tailEnd/>
+                </a14:hiddenLine>
+              </a:ext>
+            </a:extLst>
+          </p:spPr>
+          <p:txBody>
+            <a:bodyPr vert="horz" wrap="square" lIns="91440" tIns="45720" rIns="91440" bIns="45720" numCol="1" anchor="t" anchorCtr="0" compatLnSpc="1">
+              <a:prstTxWarp prst="textNoShape">
+                <a:avLst/>
+              </a:prstTxWarp>
+            </a:bodyPr>
+            <a:lstStyle/>
+            <a:p>
+              <a:endParaRPr lang="en-US"/>
+            </a:p>
+          </p:txBody>
+        </p:sp>
+        <p:grpSp>
+          <p:nvGrpSpPr>
+            <p:cNvPr id="65" name="Group 64">
+              <a:extLst>
+                <a:ext uri="{FF2B5EF4-FFF2-40B4-BE49-F238E27FC236}">
+                  <a16:creationId xmlns:a16="http://schemas.microsoft.com/office/drawing/2014/main" id="{153BBCFA-6ABE-495C-B347-0B5AACC25827}"/>
+                </a:ext>
+              </a:extLst>
+            </p:cNvPr>
+            <p:cNvGrpSpPr/>
+            <p:nvPr/>
+          </p:nvGrpSpPr>
+          <p:grpSpPr>
+            <a:xfrm>
+              <a:off x="7363425" y="1699274"/>
+              <a:ext cx="388975" cy="1534850"/>
+              <a:chOff x="6130192" y="1830519"/>
+              <a:chExt cx="719319" cy="2838348"/>
+            </a:xfrm>
+          </p:grpSpPr>
+          <p:sp>
+            <p:nvSpPr>
+              <p:cNvPr id="84" name="Rectangle 428">
+                <a:extLst>
+                  <a:ext uri="{FF2B5EF4-FFF2-40B4-BE49-F238E27FC236}">
+                    <a16:creationId xmlns:a16="http://schemas.microsoft.com/office/drawing/2014/main" id="{38265C2D-84C5-465D-893C-6C21DC835193}"/>
+                  </a:ext>
+                </a:extLst>
+              </p:cNvPr>
+              <p:cNvSpPr>
+                <a:spLocks noChangeArrowheads="1"/>
+              </p:cNvSpPr>
+              <p:nvPr/>
+            </p:nvSpPr>
+            <p:spPr bwMode="auto">
+              <a:xfrm>
+                <a:off x="6130192" y="2500575"/>
+                <a:ext cx="719319" cy="2168292"/>
+              </a:xfrm>
+              <a:prstGeom prst="rect">
+                <a:avLst/>
+              </a:prstGeom>
+              <a:solidFill>
+                <a:srgbClr val="40CDF5"/>
+              </a:solidFill>
+              <a:ln>
+                <a:noFill/>
+              </a:ln>
+              <a:extLst>
+                <a:ext uri="{91240B29-F687-4F45-9708-019B960494DF}">
+                  <a14:hiddenLine xmlns:a14="http://schemas.microsoft.com/office/drawing/2010/main" w="9525">
+                    <a:solidFill>
+                      <a:srgbClr val="000000"/>
+                    </a:solidFill>
+                    <a:miter lim="800000"/>
+                    <a:headEnd/>
+                    <a:tailEnd/>
+                  </a14:hiddenLine>
+                </a:ext>
+              </a:extLst>
+            </p:spPr>
+            <p:txBody>
+              <a:bodyPr vert="horz" wrap="square" lIns="91440" tIns="45720" rIns="91440" bIns="45720" numCol="1" anchor="t" anchorCtr="0" compatLnSpc="1">
+                <a:prstTxWarp prst="textNoShape">
+                  <a:avLst/>
+                </a:prstTxWarp>
+              </a:bodyPr>
+              <a:lstStyle/>
+              <a:p>
+                <a:endParaRPr lang="en-US"/>
+              </a:p>
+            </p:txBody>
+          </p:sp>
+          <p:sp>
+            <p:nvSpPr>
+              <p:cNvPr id="85" name="Oval 438">
+                <a:extLst>
+                  <a:ext uri="{FF2B5EF4-FFF2-40B4-BE49-F238E27FC236}">
+                    <a16:creationId xmlns:a16="http://schemas.microsoft.com/office/drawing/2014/main" id="{1715920A-8564-4FF4-AE6B-65B7877337ED}"/>
+                  </a:ext>
+                </a:extLst>
+              </p:cNvPr>
+              <p:cNvSpPr>
+                <a:spLocks noChangeArrowheads="1"/>
+              </p:cNvSpPr>
+              <p:nvPr/>
+            </p:nvSpPr>
+            <p:spPr bwMode="auto">
+              <a:xfrm>
+                <a:off x="6387722" y="2067047"/>
+                <a:ext cx="213131" cy="236528"/>
+              </a:xfrm>
+              <a:prstGeom prst="ellipse">
+                <a:avLst/>
+              </a:prstGeom>
+              <a:solidFill>
+                <a:srgbClr val="002050"/>
+              </a:solidFill>
+              <a:ln>
+                <a:noFill/>
+              </a:ln>
+              <a:extLst>
+                <a:ext uri="{91240B29-F687-4F45-9708-019B960494DF}">
+                  <a14:hiddenLine xmlns:a14="http://schemas.microsoft.com/office/drawing/2010/main" w="9525">
+                    <a:solidFill>
+                      <a:srgbClr val="000000"/>
+                    </a:solidFill>
+                    <a:round/>
+                    <a:headEnd/>
+                    <a:tailEnd/>
+                  </a14:hiddenLine>
+                </a:ext>
+              </a:extLst>
+            </p:spPr>
+            <p:txBody>
+              <a:bodyPr vert="horz" wrap="square" lIns="91440" tIns="45720" rIns="91440" bIns="45720" numCol="1" anchor="t" anchorCtr="0" compatLnSpc="1">
+                <a:prstTxWarp prst="textNoShape">
+                  <a:avLst/>
+                </a:prstTxWarp>
+              </a:bodyPr>
+              <a:lstStyle/>
+              <a:p>
+                <a:endParaRPr lang="en-US"/>
+              </a:p>
+            </p:txBody>
+          </p:sp>
+          <p:sp>
+            <p:nvSpPr>
+              <p:cNvPr id="86" name="Freeform 439">
+                <a:extLst>
+                  <a:ext uri="{FF2B5EF4-FFF2-40B4-BE49-F238E27FC236}">
+                    <a16:creationId xmlns:a16="http://schemas.microsoft.com/office/drawing/2014/main" id="{F79B91BE-7DF3-4936-B503-BA269496EECD}"/>
+                  </a:ext>
+                </a:extLst>
+              </p:cNvPr>
+              <p:cNvSpPr>
+                <a:spLocks/>
+              </p:cNvSpPr>
+              <p:nvPr/>
+            </p:nvSpPr>
+            <p:spPr bwMode="auto">
+              <a:xfrm>
+                <a:off x="6272279" y="2855475"/>
+                <a:ext cx="444022" cy="453346"/>
+              </a:xfrm>
+              <a:custGeom>
+                <a:avLst/>
+                <a:gdLst>
+                  <a:gd name="T0" fmla="*/ 12 w 23"/>
+                  <a:gd name="T1" fmla="*/ 0 h 21"/>
+                  <a:gd name="T2" fmla="*/ 0 w 23"/>
+                  <a:gd name="T3" fmla="*/ 12 h 21"/>
+                  <a:gd name="T4" fmla="*/ 0 w 23"/>
+                  <a:gd name="T5" fmla="*/ 21 h 21"/>
+                  <a:gd name="T6" fmla="*/ 23 w 23"/>
+                  <a:gd name="T7" fmla="*/ 21 h 21"/>
+                  <a:gd name="T8" fmla="*/ 23 w 23"/>
+                  <a:gd name="T9" fmla="*/ 12 h 21"/>
+                  <a:gd name="T10" fmla="*/ 12 w 23"/>
+                  <a:gd name="T11" fmla="*/ 0 h 21"/>
+                </a:gdLst>
+                <a:ahLst/>
+                <a:cxnLst>
+                  <a:cxn ang="0">
+                    <a:pos x="T0" y="T1"/>
+                  </a:cxn>
+                  <a:cxn ang="0">
+                    <a:pos x="T2" y="T3"/>
+                  </a:cxn>
+                  <a:cxn ang="0">
+                    <a:pos x="T4" y="T5"/>
+                  </a:cxn>
+                  <a:cxn ang="0">
+                    <a:pos x="T6" y="T7"/>
+                  </a:cxn>
+                  <a:cxn ang="0">
+                    <a:pos x="T8" y="T9"/>
+                  </a:cxn>
+                  <a:cxn ang="0">
+                    <a:pos x="T10" y="T11"/>
+                  </a:cxn>
+                </a:cxnLst>
+                <a:rect l="0" t="0" r="r" b="b"/>
+                <a:pathLst>
+                  <a:path w="23" h="21">
+                    <a:moveTo>
+                      <a:pt x="12" y="0"/>
+                    </a:moveTo>
+                    <a:cubicBezTo>
+                      <a:pt x="5" y="0"/>
+                      <a:pt x="0" y="5"/>
+                      <a:pt x="0" y="12"/>
+                    </a:cubicBezTo>
+                    <a:cubicBezTo>
+                      <a:pt x="0" y="21"/>
+                      <a:pt x="0" y="21"/>
+                      <a:pt x="0" y="21"/>
+                    </a:cubicBezTo>
+                    <a:cubicBezTo>
+                      <a:pt x="23" y="21"/>
+                      <a:pt x="23" y="21"/>
+                      <a:pt x="23" y="21"/>
+                    </a:cubicBezTo>
+                    <a:cubicBezTo>
+                      <a:pt x="23" y="12"/>
+                      <a:pt x="23" y="12"/>
+                      <a:pt x="23" y="12"/>
+                    </a:cubicBezTo>
+                    <a:cubicBezTo>
+                      <a:pt x="23" y="5"/>
+                      <a:pt x="18" y="0"/>
+                      <a:pt x="12" y="0"/>
+                    </a:cubicBezTo>
+                    <a:close/>
+                  </a:path>
+                </a:pathLst>
+              </a:custGeom>
+              <a:solidFill>
+                <a:srgbClr val="002050"/>
+              </a:solidFill>
+              <a:ln>
+                <a:noFill/>
+              </a:ln>
+              <a:extLst>
+                <a:ext uri="{91240B29-F687-4F45-9708-019B960494DF}">
+                  <a14:hiddenLine xmlns:a14="http://schemas.microsoft.com/office/drawing/2010/main" w="9525">
+                    <a:solidFill>
+                      <a:srgbClr val="000000"/>
+                    </a:solidFill>
+                    <a:round/>
+                    <a:headEnd/>
+                    <a:tailEnd/>
+                  </a14:hiddenLine>
+                </a:ext>
+              </a:extLst>
+            </p:spPr>
+            <p:txBody>
+              <a:bodyPr vert="horz" wrap="square" lIns="91440" tIns="45720" rIns="91440" bIns="45720" numCol="1" anchor="t" anchorCtr="0" compatLnSpc="1">
+                <a:prstTxWarp prst="textNoShape">
+                  <a:avLst/>
+                </a:prstTxWarp>
+              </a:bodyPr>
+              <a:lstStyle/>
+              <a:p>
+                <a:endParaRPr lang="en-US"/>
+              </a:p>
+            </p:txBody>
+          </p:sp>
+          <p:sp>
+            <p:nvSpPr>
+              <p:cNvPr id="87" name="Freeform 486">
+                <a:extLst>
+                  <a:ext uri="{FF2B5EF4-FFF2-40B4-BE49-F238E27FC236}">
+                    <a16:creationId xmlns:a16="http://schemas.microsoft.com/office/drawing/2014/main" id="{3AAFD0B4-15AD-465F-B93D-82D9AE2C089F}"/>
+                  </a:ext>
+                </a:extLst>
+              </p:cNvPr>
+              <p:cNvSpPr>
+                <a:spLocks/>
+              </p:cNvSpPr>
+              <p:nvPr/>
+            </p:nvSpPr>
+            <p:spPr bwMode="auto">
+              <a:xfrm>
+                <a:off x="6130192" y="1830519"/>
+                <a:ext cx="719319" cy="601180"/>
+              </a:xfrm>
+              <a:custGeom>
+                <a:avLst/>
+                <a:gdLst>
+                  <a:gd name="T0" fmla="*/ 42 w 81"/>
+                  <a:gd name="T1" fmla="*/ 0 h 61"/>
+                  <a:gd name="T2" fmla="*/ 0 w 81"/>
+                  <a:gd name="T3" fmla="*/ 61 h 61"/>
+                  <a:gd name="T4" fmla="*/ 81 w 81"/>
+                  <a:gd name="T5" fmla="*/ 61 h 61"/>
+                  <a:gd name="T6" fmla="*/ 42 w 81"/>
+                  <a:gd name="T7" fmla="*/ 0 h 61"/>
+                </a:gdLst>
+                <a:ahLst/>
+                <a:cxnLst>
+                  <a:cxn ang="0">
+                    <a:pos x="T0" y="T1"/>
+                  </a:cxn>
+                  <a:cxn ang="0">
+                    <a:pos x="T2" y="T3"/>
+                  </a:cxn>
+                  <a:cxn ang="0">
+                    <a:pos x="T4" y="T5"/>
+                  </a:cxn>
+                  <a:cxn ang="0">
+                    <a:pos x="T6" y="T7"/>
+                  </a:cxn>
+                </a:cxnLst>
+                <a:rect l="0" t="0" r="r" b="b"/>
+                <a:pathLst>
+                  <a:path w="81" h="61">
+                    <a:moveTo>
+                      <a:pt x="42" y="0"/>
+                    </a:moveTo>
+                    <a:lnTo>
+                      <a:pt x="0" y="61"/>
+                    </a:lnTo>
+                    <a:lnTo>
+                      <a:pt x="81" y="61"/>
+                    </a:lnTo>
+                    <a:lnTo>
+                      <a:pt x="42" y="0"/>
+                    </a:lnTo>
+                    <a:close/>
+                  </a:path>
+                </a:pathLst>
+              </a:custGeom>
+              <a:solidFill>
+                <a:schemeClr val="bg1">
+                  <a:lumMod val="65000"/>
+                </a:schemeClr>
+              </a:solidFill>
+              <a:ln>
+                <a:noFill/>
+              </a:ln>
+              <a:extLst>
+                <a:ext uri="{91240B29-F687-4F45-9708-019B960494DF}">
+                  <a14:hiddenLine xmlns:a14="http://schemas.microsoft.com/office/drawing/2010/main" w="9525">
+                    <a:solidFill>
+                      <a:srgbClr val="000000"/>
+                    </a:solidFill>
+                    <a:round/>
+                    <a:headEnd/>
+                    <a:tailEnd/>
+                  </a14:hiddenLine>
+                </a:ext>
+              </a:extLst>
+            </p:spPr>
+            <p:txBody>
+              <a:bodyPr vert="horz" wrap="square" lIns="91440" tIns="45720" rIns="91440" bIns="45720" numCol="1" anchor="t" anchorCtr="0" compatLnSpc="1">
+                <a:prstTxWarp prst="textNoShape">
+                  <a:avLst/>
+                </a:prstTxWarp>
+              </a:bodyPr>
+              <a:lstStyle/>
+              <a:p>
+                <a:endParaRPr lang="en-US"/>
+              </a:p>
+            </p:txBody>
+          </p:sp>
+          <p:sp>
+            <p:nvSpPr>
+              <p:cNvPr id="88" name="Rectangle 487">
+                <a:extLst>
+                  <a:ext uri="{FF2B5EF4-FFF2-40B4-BE49-F238E27FC236}">
+                    <a16:creationId xmlns:a16="http://schemas.microsoft.com/office/drawing/2014/main" id="{A3EAA4AC-B669-43BF-913B-273DD45B2BFF}"/>
+                  </a:ext>
+                </a:extLst>
+              </p:cNvPr>
+              <p:cNvSpPr>
+                <a:spLocks noChangeArrowheads="1"/>
+              </p:cNvSpPr>
+              <p:nvPr/>
+            </p:nvSpPr>
+            <p:spPr bwMode="auto">
+              <a:xfrm>
+                <a:off x="6369961" y="2816054"/>
+                <a:ext cx="17761" cy="650453"/>
+              </a:xfrm>
+              <a:prstGeom prst="rect">
+                <a:avLst/>
+              </a:prstGeom>
+              <a:solidFill>
+                <a:srgbClr val="40CDF5"/>
+              </a:solidFill>
+              <a:ln>
+                <a:noFill/>
+              </a:ln>
+              <a:extLst>
+                <a:ext uri="{91240B29-F687-4F45-9708-019B960494DF}">
+                  <a14:hiddenLine xmlns:a14="http://schemas.microsoft.com/office/drawing/2010/main" w="9525">
+                    <a:solidFill>
+                      <a:srgbClr val="000000"/>
+                    </a:solidFill>
+                    <a:miter lim="800000"/>
+                    <a:headEnd/>
+                    <a:tailEnd/>
+                  </a14:hiddenLine>
+                </a:ext>
+              </a:extLst>
+            </p:spPr>
+            <p:txBody>
+              <a:bodyPr vert="horz" wrap="square" lIns="91440" tIns="45720" rIns="91440" bIns="45720" numCol="1" anchor="t" anchorCtr="0" compatLnSpc="1">
+                <a:prstTxWarp prst="textNoShape">
+                  <a:avLst/>
+                </a:prstTxWarp>
+              </a:bodyPr>
+              <a:lstStyle/>
+              <a:p>
+                <a:endParaRPr lang="en-US"/>
+              </a:p>
+            </p:txBody>
+          </p:sp>
+          <p:sp>
+            <p:nvSpPr>
+              <p:cNvPr id="89" name="Rectangle 488">
+                <a:extLst>
+                  <a:ext uri="{FF2B5EF4-FFF2-40B4-BE49-F238E27FC236}">
+                    <a16:creationId xmlns:a16="http://schemas.microsoft.com/office/drawing/2014/main" id="{82FF6225-BDF2-49D6-9CD2-8BBA29837CFF}"/>
+                  </a:ext>
+                </a:extLst>
+              </p:cNvPr>
+              <p:cNvSpPr>
+                <a:spLocks noChangeArrowheads="1"/>
+              </p:cNvSpPr>
+              <p:nvPr/>
+            </p:nvSpPr>
+            <p:spPr bwMode="auto">
+              <a:xfrm>
+                <a:off x="6600853" y="2816054"/>
+                <a:ext cx="35522" cy="650453"/>
+              </a:xfrm>
+              <a:prstGeom prst="rect">
+                <a:avLst/>
+              </a:prstGeom>
+              <a:solidFill>
+                <a:srgbClr val="40CDF5"/>
+              </a:solidFill>
+              <a:ln>
+                <a:noFill/>
+              </a:ln>
+              <a:extLst>
+                <a:ext uri="{91240B29-F687-4F45-9708-019B960494DF}">
+                  <a14:hiddenLine xmlns:a14="http://schemas.microsoft.com/office/drawing/2010/main" w="9525">
+                    <a:solidFill>
+                      <a:srgbClr val="000000"/>
+                    </a:solidFill>
+                    <a:miter lim="800000"/>
+                    <a:headEnd/>
+                    <a:tailEnd/>
+                  </a14:hiddenLine>
+                </a:ext>
+              </a:extLst>
+            </p:spPr>
+            <p:txBody>
+              <a:bodyPr vert="horz" wrap="square" lIns="91440" tIns="45720" rIns="91440" bIns="45720" numCol="1" anchor="t" anchorCtr="0" compatLnSpc="1">
+                <a:prstTxWarp prst="textNoShape">
+                  <a:avLst/>
+                </a:prstTxWarp>
+              </a:bodyPr>
+              <a:lstStyle/>
+              <a:p>
+                <a:endParaRPr lang="en-US"/>
+              </a:p>
+            </p:txBody>
+          </p:sp>
+          <p:sp>
+            <p:nvSpPr>
+              <p:cNvPr id="90" name="Rectangle 489">
+                <a:extLst>
+                  <a:ext uri="{FF2B5EF4-FFF2-40B4-BE49-F238E27FC236}">
+                    <a16:creationId xmlns:a16="http://schemas.microsoft.com/office/drawing/2014/main" id="{97C94B03-6F6A-450A-9510-2BF77B400C81}"/>
+                  </a:ext>
+                </a:extLst>
+              </p:cNvPr>
+              <p:cNvSpPr>
+                <a:spLocks noChangeArrowheads="1"/>
+              </p:cNvSpPr>
+              <p:nvPr/>
+            </p:nvSpPr>
+            <p:spPr bwMode="auto">
+              <a:xfrm>
+                <a:off x="6192352" y="3141284"/>
+                <a:ext cx="586110" cy="19711"/>
+              </a:xfrm>
+              <a:prstGeom prst="rect">
+                <a:avLst/>
+              </a:prstGeom>
+              <a:solidFill>
+                <a:srgbClr val="40CDF5"/>
+              </a:solidFill>
+              <a:ln>
+                <a:noFill/>
+              </a:ln>
+              <a:extLst>
+                <a:ext uri="{91240B29-F687-4F45-9708-019B960494DF}">
+                  <a14:hiddenLine xmlns:a14="http://schemas.microsoft.com/office/drawing/2010/main" w="9525">
+                    <a:solidFill>
+                      <a:srgbClr val="000000"/>
+                    </a:solidFill>
+                    <a:miter lim="800000"/>
+                    <a:headEnd/>
+                    <a:tailEnd/>
+                  </a14:hiddenLine>
+                </a:ext>
+              </a:extLst>
+            </p:spPr>
+            <p:txBody>
+              <a:bodyPr vert="horz" wrap="square" lIns="91440" tIns="45720" rIns="91440" bIns="45720" numCol="1" anchor="t" anchorCtr="0" compatLnSpc="1">
+                <a:prstTxWarp prst="textNoShape">
+                  <a:avLst/>
+                </a:prstTxWarp>
+              </a:bodyPr>
+              <a:lstStyle/>
+              <a:p>
+                <a:endParaRPr lang="en-US"/>
+              </a:p>
+            </p:txBody>
+          </p:sp>
+        </p:grpSp>
+        <p:grpSp>
+          <p:nvGrpSpPr>
+            <p:cNvPr id="66" name="Group 65">
+              <a:extLst>
+                <a:ext uri="{FF2B5EF4-FFF2-40B4-BE49-F238E27FC236}">
+                  <a16:creationId xmlns:a16="http://schemas.microsoft.com/office/drawing/2014/main" id="{EBE07B51-B322-49DE-8180-BDA0B2AE70EE}"/>
+                </a:ext>
+              </a:extLst>
+            </p:cNvPr>
+            <p:cNvGrpSpPr/>
+            <p:nvPr/>
+          </p:nvGrpSpPr>
+          <p:grpSpPr>
+            <a:xfrm>
+              <a:off x="7884075" y="1077124"/>
+              <a:ext cx="910251" cy="3591743"/>
+              <a:chOff x="8075007" y="1830519"/>
+              <a:chExt cx="719319" cy="2838348"/>
+            </a:xfrm>
+          </p:grpSpPr>
+          <p:sp>
+            <p:nvSpPr>
+              <p:cNvPr id="73" name="Rectangle 427">
+                <a:extLst>
+                  <a:ext uri="{FF2B5EF4-FFF2-40B4-BE49-F238E27FC236}">
+                    <a16:creationId xmlns:a16="http://schemas.microsoft.com/office/drawing/2014/main" id="{9A2EFE30-65DC-4637-8D6B-B88AE94177F1}"/>
+                  </a:ext>
+                </a:extLst>
+              </p:cNvPr>
+              <p:cNvSpPr>
+                <a:spLocks noChangeArrowheads="1"/>
+              </p:cNvSpPr>
+              <p:nvPr/>
+            </p:nvSpPr>
+            <p:spPr bwMode="auto">
+              <a:xfrm>
+                <a:off x="8075007" y="2471120"/>
+                <a:ext cx="719319" cy="2197747"/>
+              </a:xfrm>
+              <a:prstGeom prst="rect">
+                <a:avLst/>
+              </a:prstGeom>
+              <a:solidFill>
+                <a:srgbClr val="40CDF5"/>
+              </a:solidFill>
+              <a:ln>
+                <a:noFill/>
+              </a:ln>
+              <a:extLst>
+                <a:ext uri="{91240B29-F687-4F45-9708-019B960494DF}">
+                  <a14:hiddenLine xmlns:a14="http://schemas.microsoft.com/office/drawing/2010/main" w="9525">
+                    <a:solidFill>
+                      <a:srgbClr val="000000"/>
+                    </a:solidFill>
+                    <a:miter lim="800000"/>
+                    <a:headEnd/>
+                    <a:tailEnd/>
+                  </a14:hiddenLine>
+                </a:ext>
+              </a:extLst>
+            </p:spPr>
+            <p:txBody>
+              <a:bodyPr vert="horz" wrap="square" lIns="91440" tIns="45720" rIns="91440" bIns="45720" numCol="1" anchor="t" anchorCtr="0" compatLnSpc="1">
+                <a:prstTxWarp prst="textNoShape">
+                  <a:avLst/>
+                </a:prstTxWarp>
+              </a:bodyPr>
+              <a:lstStyle/>
+              <a:p>
+                <a:endParaRPr lang="en-US"/>
+              </a:p>
+            </p:txBody>
+          </p:sp>
+          <p:sp>
+            <p:nvSpPr>
+              <p:cNvPr id="74" name="Oval 440">
+                <a:extLst>
+                  <a:ext uri="{FF2B5EF4-FFF2-40B4-BE49-F238E27FC236}">
+                    <a16:creationId xmlns:a16="http://schemas.microsoft.com/office/drawing/2014/main" id="{2886AAC9-B7B3-44D8-A2FA-167DAF94A7AF}"/>
+                  </a:ext>
+                </a:extLst>
+              </p:cNvPr>
+              <p:cNvSpPr>
+                <a:spLocks noChangeArrowheads="1"/>
+              </p:cNvSpPr>
+              <p:nvPr/>
+            </p:nvSpPr>
+            <p:spPr bwMode="auto">
+              <a:xfrm>
+                <a:off x="8332543" y="2067047"/>
+                <a:ext cx="213131" cy="236528"/>
+              </a:xfrm>
+              <a:prstGeom prst="ellipse">
+                <a:avLst/>
+              </a:prstGeom>
+              <a:solidFill>
+                <a:srgbClr val="002050"/>
+              </a:solidFill>
+              <a:ln>
+                <a:noFill/>
+              </a:ln>
+              <a:extLst>
+                <a:ext uri="{91240B29-F687-4F45-9708-019B960494DF}">
+                  <a14:hiddenLine xmlns:a14="http://schemas.microsoft.com/office/drawing/2010/main" w="9525">
+                    <a:solidFill>
+                      <a:srgbClr val="000000"/>
+                    </a:solidFill>
+                    <a:round/>
+                    <a:headEnd/>
+                    <a:tailEnd/>
+                  </a14:hiddenLine>
+                </a:ext>
+              </a:extLst>
+            </p:spPr>
+            <p:txBody>
+              <a:bodyPr vert="horz" wrap="square" lIns="91440" tIns="45720" rIns="91440" bIns="45720" numCol="1" anchor="t" anchorCtr="0" compatLnSpc="1">
+                <a:prstTxWarp prst="textNoShape">
+                  <a:avLst/>
+                </a:prstTxWarp>
+              </a:bodyPr>
+              <a:lstStyle/>
+              <a:p>
+                <a:endParaRPr lang="en-US"/>
+              </a:p>
+            </p:txBody>
+          </p:sp>
+          <p:sp>
+            <p:nvSpPr>
+              <p:cNvPr id="75" name="Freeform 442">
+                <a:extLst>
+                  <a:ext uri="{FF2B5EF4-FFF2-40B4-BE49-F238E27FC236}">
+                    <a16:creationId xmlns:a16="http://schemas.microsoft.com/office/drawing/2014/main" id="{3191446F-8885-4DA7-B1B2-E7CB05142683}"/>
+                  </a:ext>
+                </a:extLst>
+              </p:cNvPr>
+              <p:cNvSpPr>
+                <a:spLocks/>
+              </p:cNvSpPr>
+              <p:nvPr/>
+            </p:nvSpPr>
+            <p:spPr bwMode="auto">
+              <a:xfrm>
+                <a:off x="8217095" y="2855475"/>
+                <a:ext cx="444022" cy="453346"/>
+              </a:xfrm>
+              <a:custGeom>
+                <a:avLst/>
+                <a:gdLst>
+                  <a:gd name="T0" fmla="*/ 11 w 23"/>
+                  <a:gd name="T1" fmla="*/ 0 h 21"/>
+                  <a:gd name="T2" fmla="*/ 0 w 23"/>
+                  <a:gd name="T3" fmla="*/ 12 h 21"/>
+                  <a:gd name="T4" fmla="*/ 0 w 23"/>
+                  <a:gd name="T5" fmla="*/ 21 h 21"/>
+                  <a:gd name="T6" fmla="*/ 23 w 23"/>
+                  <a:gd name="T7" fmla="*/ 21 h 21"/>
+                  <a:gd name="T8" fmla="*/ 23 w 23"/>
+                  <a:gd name="T9" fmla="*/ 12 h 21"/>
+                  <a:gd name="T10" fmla="*/ 11 w 23"/>
+                  <a:gd name="T11" fmla="*/ 0 h 21"/>
+                </a:gdLst>
+                <a:ahLst/>
+                <a:cxnLst>
+                  <a:cxn ang="0">
+                    <a:pos x="T0" y="T1"/>
+                  </a:cxn>
+                  <a:cxn ang="0">
+                    <a:pos x="T2" y="T3"/>
+                  </a:cxn>
+                  <a:cxn ang="0">
+                    <a:pos x="T4" y="T5"/>
+                  </a:cxn>
+                  <a:cxn ang="0">
+                    <a:pos x="T6" y="T7"/>
+                  </a:cxn>
+                  <a:cxn ang="0">
+                    <a:pos x="T8" y="T9"/>
+                  </a:cxn>
+                  <a:cxn ang="0">
+                    <a:pos x="T10" y="T11"/>
+                  </a:cxn>
+                </a:cxnLst>
+                <a:rect l="0" t="0" r="r" b="b"/>
+                <a:pathLst>
+                  <a:path w="23" h="21">
+                    <a:moveTo>
+                      <a:pt x="11" y="0"/>
+                    </a:moveTo>
+                    <a:cubicBezTo>
+                      <a:pt x="5" y="0"/>
+                      <a:pt x="0" y="5"/>
+                      <a:pt x="0" y="12"/>
+                    </a:cubicBezTo>
+                    <a:cubicBezTo>
+                      <a:pt x="0" y="21"/>
+                      <a:pt x="0" y="21"/>
+                      <a:pt x="0" y="21"/>
+                    </a:cubicBezTo>
+                    <a:cubicBezTo>
+                      <a:pt x="23" y="21"/>
+                      <a:pt x="23" y="21"/>
+                      <a:pt x="23" y="21"/>
+                    </a:cubicBezTo>
+                    <a:cubicBezTo>
+                      <a:pt x="23" y="12"/>
+                      <a:pt x="23" y="12"/>
+                      <a:pt x="23" y="12"/>
+                    </a:cubicBezTo>
+                    <a:cubicBezTo>
+                      <a:pt x="23" y="5"/>
+                      <a:pt x="18" y="0"/>
+                      <a:pt x="11" y="0"/>
+                    </a:cubicBezTo>
+                    <a:close/>
+                  </a:path>
+                </a:pathLst>
+              </a:custGeom>
+              <a:solidFill>
+                <a:srgbClr val="002050"/>
+              </a:solidFill>
+              <a:ln>
+                <a:noFill/>
+              </a:ln>
+              <a:extLst>
+                <a:ext uri="{91240B29-F687-4F45-9708-019B960494DF}">
+                  <a14:hiddenLine xmlns:a14="http://schemas.microsoft.com/office/drawing/2010/main" w="9525">
+                    <a:solidFill>
+                      <a:srgbClr val="000000"/>
+                    </a:solidFill>
+                    <a:round/>
+                    <a:headEnd/>
+                    <a:tailEnd/>
+                  </a14:hiddenLine>
+                </a:ext>
+              </a:extLst>
+            </p:spPr>
+            <p:txBody>
+              <a:bodyPr vert="horz" wrap="square" lIns="91440" tIns="45720" rIns="91440" bIns="45720" numCol="1" anchor="t" anchorCtr="0" compatLnSpc="1">
+                <a:prstTxWarp prst="textNoShape">
+                  <a:avLst/>
+                </a:prstTxWarp>
+              </a:bodyPr>
+              <a:lstStyle/>
+              <a:p>
+                <a:endParaRPr lang="en-US"/>
+              </a:p>
+            </p:txBody>
+          </p:sp>
+          <p:sp>
+            <p:nvSpPr>
+              <p:cNvPr id="76" name="Rectangle 459">
+                <a:extLst>
+                  <a:ext uri="{FF2B5EF4-FFF2-40B4-BE49-F238E27FC236}">
+                    <a16:creationId xmlns:a16="http://schemas.microsoft.com/office/drawing/2014/main" id="{3B9F7C48-79F3-4E07-B4D1-BB03ABB5B413}"/>
+                  </a:ext>
+                </a:extLst>
+              </p:cNvPr>
+              <p:cNvSpPr>
+                <a:spLocks noChangeArrowheads="1"/>
+              </p:cNvSpPr>
+              <p:nvPr/>
+            </p:nvSpPr>
+            <p:spPr bwMode="auto">
+              <a:xfrm>
+                <a:off x="8283699" y="3485624"/>
+                <a:ext cx="97688" cy="216818"/>
+              </a:xfrm>
+              <a:prstGeom prst="rect">
+                <a:avLst/>
+              </a:prstGeom>
+              <a:solidFill>
+                <a:srgbClr val="002050"/>
+              </a:solidFill>
+              <a:ln>
+                <a:noFill/>
+              </a:ln>
+              <a:extLst>
+                <a:ext uri="{91240B29-F687-4F45-9708-019B960494DF}">
+                  <a14:hiddenLine xmlns:a14="http://schemas.microsoft.com/office/drawing/2010/main" w="9525">
+                    <a:solidFill>
+                      <a:srgbClr val="000000"/>
+                    </a:solidFill>
+                    <a:miter lim="800000"/>
+                    <a:headEnd/>
+                    <a:tailEnd/>
+                  </a14:hiddenLine>
+                </a:ext>
+              </a:extLst>
+            </p:spPr>
+            <p:txBody>
+              <a:bodyPr vert="horz" wrap="square" lIns="91440" tIns="45720" rIns="91440" bIns="45720" numCol="1" anchor="t" anchorCtr="0" compatLnSpc="1">
+                <a:prstTxWarp prst="textNoShape">
+                  <a:avLst/>
+                </a:prstTxWarp>
+              </a:bodyPr>
+              <a:lstStyle/>
+              <a:p>
+                <a:endParaRPr lang="en-US"/>
+              </a:p>
+            </p:txBody>
+          </p:sp>
+          <p:sp>
+            <p:nvSpPr>
+              <p:cNvPr id="77" name="Rectangle 460">
+                <a:extLst>
+                  <a:ext uri="{FF2B5EF4-FFF2-40B4-BE49-F238E27FC236}">
+                    <a16:creationId xmlns:a16="http://schemas.microsoft.com/office/drawing/2014/main" id="{ECD4FF31-B4BC-40A2-A8C2-F361C175D616}"/>
+                  </a:ext>
+                </a:extLst>
+              </p:cNvPr>
+              <p:cNvSpPr>
+                <a:spLocks noChangeArrowheads="1"/>
+              </p:cNvSpPr>
+              <p:nvPr/>
+            </p:nvSpPr>
+            <p:spPr bwMode="auto">
+              <a:xfrm>
+                <a:off x="8523468" y="3485624"/>
+                <a:ext cx="88804" cy="216818"/>
+              </a:xfrm>
+              <a:prstGeom prst="rect">
+                <a:avLst/>
+              </a:prstGeom>
+              <a:solidFill>
+                <a:srgbClr val="002050"/>
+              </a:solidFill>
+              <a:ln>
+                <a:noFill/>
+              </a:ln>
+              <a:extLst>
+                <a:ext uri="{91240B29-F687-4F45-9708-019B960494DF}">
+                  <a14:hiddenLine xmlns:a14="http://schemas.microsoft.com/office/drawing/2010/main" w="9525">
+                    <a:solidFill>
+                      <a:srgbClr val="000000"/>
+                    </a:solidFill>
+                    <a:miter lim="800000"/>
+                    <a:headEnd/>
+                    <a:tailEnd/>
+                  </a14:hiddenLine>
+                </a:ext>
+              </a:extLst>
+            </p:spPr>
+            <p:txBody>
+              <a:bodyPr vert="horz" wrap="square" lIns="91440" tIns="45720" rIns="91440" bIns="45720" numCol="1" anchor="t" anchorCtr="0" compatLnSpc="1">
+                <a:prstTxWarp prst="textNoShape">
+                  <a:avLst/>
+                </a:prstTxWarp>
+              </a:bodyPr>
+              <a:lstStyle/>
+              <a:p>
+                <a:endParaRPr lang="en-US"/>
+              </a:p>
+            </p:txBody>
+          </p:sp>
+          <p:sp>
+            <p:nvSpPr>
+              <p:cNvPr id="78" name="Rectangle 461">
+                <a:extLst>
+                  <a:ext uri="{FF2B5EF4-FFF2-40B4-BE49-F238E27FC236}">
+                    <a16:creationId xmlns:a16="http://schemas.microsoft.com/office/drawing/2014/main" id="{F3D28433-933E-4A17-9583-4C4953091EB2}"/>
+                  </a:ext>
+                </a:extLst>
+              </p:cNvPr>
+              <p:cNvSpPr>
+                <a:spLocks noChangeArrowheads="1"/>
+              </p:cNvSpPr>
+              <p:nvPr/>
+            </p:nvSpPr>
+            <p:spPr bwMode="auto">
+              <a:xfrm>
+                <a:off x="8283699" y="4027665"/>
+                <a:ext cx="97688" cy="216818"/>
+              </a:xfrm>
+              <a:prstGeom prst="rect">
+                <a:avLst/>
+              </a:prstGeom>
+              <a:solidFill>
+                <a:srgbClr val="002050"/>
+              </a:solidFill>
+              <a:ln>
+                <a:noFill/>
+              </a:ln>
+              <a:extLst>
+                <a:ext uri="{91240B29-F687-4F45-9708-019B960494DF}">
+                  <a14:hiddenLine xmlns:a14="http://schemas.microsoft.com/office/drawing/2010/main" w="9525">
+                    <a:solidFill>
+                      <a:srgbClr val="000000"/>
+                    </a:solidFill>
+                    <a:miter lim="800000"/>
+                    <a:headEnd/>
+                    <a:tailEnd/>
+                  </a14:hiddenLine>
+                </a:ext>
+              </a:extLst>
+            </p:spPr>
+            <p:txBody>
+              <a:bodyPr vert="horz" wrap="square" lIns="91440" tIns="45720" rIns="91440" bIns="45720" numCol="1" anchor="t" anchorCtr="0" compatLnSpc="1">
+                <a:prstTxWarp prst="textNoShape">
+                  <a:avLst/>
+                </a:prstTxWarp>
+              </a:bodyPr>
+              <a:lstStyle/>
+              <a:p>
+                <a:endParaRPr lang="en-US"/>
+              </a:p>
+            </p:txBody>
+          </p:sp>
+          <p:sp>
+            <p:nvSpPr>
+              <p:cNvPr id="79" name="Rectangle 462">
+                <a:extLst>
+                  <a:ext uri="{FF2B5EF4-FFF2-40B4-BE49-F238E27FC236}">
+                    <a16:creationId xmlns:a16="http://schemas.microsoft.com/office/drawing/2014/main" id="{89A2D300-FBD5-4D0B-9F7F-776FBFBD0E68}"/>
+                  </a:ext>
+                </a:extLst>
+              </p:cNvPr>
+              <p:cNvSpPr>
+                <a:spLocks noChangeArrowheads="1"/>
+              </p:cNvSpPr>
+              <p:nvPr/>
+            </p:nvSpPr>
+            <p:spPr bwMode="auto">
+              <a:xfrm>
+                <a:off x="8523468" y="4027665"/>
+                <a:ext cx="88804" cy="216818"/>
+              </a:xfrm>
+              <a:prstGeom prst="rect">
+                <a:avLst/>
+              </a:prstGeom>
+              <a:solidFill>
+                <a:srgbClr val="002050"/>
+              </a:solidFill>
+              <a:ln>
+                <a:noFill/>
+              </a:ln>
+              <a:extLst>
+                <a:ext uri="{91240B29-F687-4F45-9708-019B960494DF}">
+                  <a14:hiddenLine xmlns:a14="http://schemas.microsoft.com/office/drawing/2010/main" w="9525">
+                    <a:solidFill>
+                      <a:srgbClr val="000000"/>
+                    </a:solidFill>
+                    <a:miter lim="800000"/>
+                    <a:headEnd/>
+                    <a:tailEnd/>
+                  </a14:hiddenLine>
+                </a:ext>
+              </a:extLst>
+            </p:spPr>
+            <p:txBody>
+              <a:bodyPr vert="horz" wrap="square" lIns="91440" tIns="45720" rIns="91440" bIns="45720" numCol="1" anchor="t" anchorCtr="0" compatLnSpc="1">
+                <a:prstTxWarp prst="textNoShape">
+                  <a:avLst/>
+                </a:prstTxWarp>
+              </a:bodyPr>
+              <a:lstStyle/>
+              <a:p>
+                <a:endParaRPr lang="en-US"/>
+              </a:p>
+            </p:txBody>
+          </p:sp>
+          <p:sp>
+            <p:nvSpPr>
+              <p:cNvPr id="80" name="Freeform 490">
+                <a:extLst>
+                  <a:ext uri="{FF2B5EF4-FFF2-40B4-BE49-F238E27FC236}">
+                    <a16:creationId xmlns:a16="http://schemas.microsoft.com/office/drawing/2014/main" id="{5CE5902D-4672-40AC-96DA-8857D4BE961F}"/>
+                  </a:ext>
+                </a:extLst>
+              </p:cNvPr>
+              <p:cNvSpPr>
+                <a:spLocks/>
+              </p:cNvSpPr>
+              <p:nvPr/>
+            </p:nvSpPr>
+            <p:spPr bwMode="auto">
+              <a:xfrm>
+                <a:off x="8075007" y="1830519"/>
+                <a:ext cx="719319" cy="601180"/>
+              </a:xfrm>
+              <a:custGeom>
+                <a:avLst/>
+                <a:gdLst>
+                  <a:gd name="T0" fmla="*/ 40 w 81"/>
+                  <a:gd name="T1" fmla="*/ 0 h 61"/>
+                  <a:gd name="T2" fmla="*/ 0 w 81"/>
+                  <a:gd name="T3" fmla="*/ 61 h 61"/>
+                  <a:gd name="T4" fmla="*/ 81 w 81"/>
+                  <a:gd name="T5" fmla="*/ 61 h 61"/>
+                  <a:gd name="T6" fmla="*/ 40 w 81"/>
+                  <a:gd name="T7" fmla="*/ 0 h 61"/>
+                </a:gdLst>
+                <a:ahLst/>
+                <a:cxnLst>
+                  <a:cxn ang="0">
+                    <a:pos x="T0" y="T1"/>
+                  </a:cxn>
+                  <a:cxn ang="0">
+                    <a:pos x="T2" y="T3"/>
+                  </a:cxn>
+                  <a:cxn ang="0">
+                    <a:pos x="T4" y="T5"/>
+                  </a:cxn>
+                  <a:cxn ang="0">
+                    <a:pos x="T6" y="T7"/>
+                  </a:cxn>
+                </a:cxnLst>
+                <a:rect l="0" t="0" r="r" b="b"/>
+                <a:pathLst>
+                  <a:path w="81" h="61">
+                    <a:moveTo>
+                      <a:pt x="40" y="0"/>
+                    </a:moveTo>
+                    <a:lnTo>
+                      <a:pt x="0" y="61"/>
+                    </a:lnTo>
+                    <a:lnTo>
+                      <a:pt x="81" y="61"/>
+                    </a:lnTo>
+                    <a:lnTo>
+                      <a:pt x="40" y="0"/>
+                    </a:lnTo>
+                    <a:close/>
+                  </a:path>
+                </a:pathLst>
+              </a:custGeom>
+              <a:solidFill>
+                <a:schemeClr val="bg1">
+                  <a:lumMod val="65000"/>
+                </a:schemeClr>
+              </a:solidFill>
+              <a:ln>
+                <a:noFill/>
+              </a:ln>
+              <a:extLst>
+                <a:ext uri="{91240B29-F687-4F45-9708-019B960494DF}">
+                  <a14:hiddenLine xmlns:a14="http://schemas.microsoft.com/office/drawing/2010/main" w="9525">
+                    <a:solidFill>
+                      <a:srgbClr val="000000"/>
+                    </a:solidFill>
+                    <a:round/>
+                    <a:headEnd/>
+                    <a:tailEnd/>
+                  </a14:hiddenLine>
+                </a:ext>
+              </a:extLst>
+            </p:spPr>
+            <p:txBody>
+              <a:bodyPr vert="horz" wrap="square" lIns="91440" tIns="45720" rIns="91440" bIns="45720" numCol="1" anchor="t" anchorCtr="0" compatLnSpc="1">
+                <a:prstTxWarp prst="textNoShape">
+                  <a:avLst/>
+                </a:prstTxWarp>
+              </a:bodyPr>
+              <a:lstStyle/>
+              <a:p>
+                <a:endParaRPr lang="en-US"/>
+              </a:p>
+            </p:txBody>
+          </p:sp>
+          <p:sp>
+            <p:nvSpPr>
+              <p:cNvPr id="81" name="Rectangle 492">
+                <a:extLst>
+                  <a:ext uri="{FF2B5EF4-FFF2-40B4-BE49-F238E27FC236}">
+                    <a16:creationId xmlns:a16="http://schemas.microsoft.com/office/drawing/2014/main" id="{752D01EF-2587-46AD-8D53-49718AD709C4}"/>
+                  </a:ext>
+                </a:extLst>
+              </p:cNvPr>
+              <p:cNvSpPr>
+                <a:spLocks noChangeArrowheads="1"/>
+              </p:cNvSpPr>
+              <p:nvPr/>
+            </p:nvSpPr>
+            <p:spPr bwMode="auto">
+              <a:xfrm>
+                <a:off x="8314782" y="2816054"/>
+                <a:ext cx="17761" cy="650453"/>
+              </a:xfrm>
+              <a:prstGeom prst="rect">
+                <a:avLst/>
+              </a:prstGeom>
+              <a:solidFill>
+                <a:srgbClr val="40CDF5"/>
+              </a:solidFill>
+              <a:ln>
+                <a:noFill/>
+              </a:ln>
+              <a:extLst>
+                <a:ext uri="{91240B29-F687-4F45-9708-019B960494DF}">
+                  <a14:hiddenLine xmlns:a14="http://schemas.microsoft.com/office/drawing/2010/main" w="9525">
+                    <a:solidFill>
+                      <a:srgbClr val="000000"/>
+                    </a:solidFill>
+                    <a:miter lim="800000"/>
+                    <a:headEnd/>
+                    <a:tailEnd/>
+                  </a14:hiddenLine>
+                </a:ext>
+              </a:extLst>
+            </p:spPr>
+            <p:txBody>
+              <a:bodyPr vert="horz" wrap="square" lIns="91440" tIns="45720" rIns="91440" bIns="45720" numCol="1" anchor="t" anchorCtr="0" compatLnSpc="1">
+                <a:prstTxWarp prst="textNoShape">
+                  <a:avLst/>
+                </a:prstTxWarp>
+              </a:bodyPr>
+              <a:lstStyle/>
+              <a:p>
+                <a:endParaRPr lang="en-US"/>
+              </a:p>
+            </p:txBody>
+          </p:sp>
+          <p:sp>
+            <p:nvSpPr>
+              <p:cNvPr id="82" name="Rectangle 493">
+                <a:extLst>
+                  <a:ext uri="{FF2B5EF4-FFF2-40B4-BE49-F238E27FC236}">
+                    <a16:creationId xmlns:a16="http://schemas.microsoft.com/office/drawing/2014/main" id="{7E8B3EE6-1030-457F-A720-716C7AAE2D95}"/>
+                  </a:ext>
+                </a:extLst>
+              </p:cNvPr>
+              <p:cNvSpPr>
+                <a:spLocks noChangeArrowheads="1"/>
+              </p:cNvSpPr>
+              <p:nvPr/>
+            </p:nvSpPr>
+            <p:spPr bwMode="auto">
+              <a:xfrm>
+                <a:off x="8545674" y="2816054"/>
+                <a:ext cx="17761" cy="650453"/>
+              </a:xfrm>
+              <a:prstGeom prst="rect">
+                <a:avLst/>
+              </a:prstGeom>
+              <a:solidFill>
+                <a:srgbClr val="40CDF5"/>
+              </a:solidFill>
+              <a:ln>
+                <a:noFill/>
+              </a:ln>
+              <a:extLst>
+                <a:ext uri="{91240B29-F687-4F45-9708-019B960494DF}">
+                  <a14:hiddenLine xmlns:a14="http://schemas.microsoft.com/office/drawing/2010/main" w="9525">
+                    <a:solidFill>
+                      <a:srgbClr val="000000"/>
+                    </a:solidFill>
+                    <a:miter lim="800000"/>
+                    <a:headEnd/>
+                    <a:tailEnd/>
+                  </a14:hiddenLine>
+                </a:ext>
+              </a:extLst>
+            </p:spPr>
+            <p:txBody>
+              <a:bodyPr vert="horz" wrap="square" lIns="91440" tIns="45720" rIns="91440" bIns="45720" numCol="1" anchor="t" anchorCtr="0" compatLnSpc="1">
+                <a:prstTxWarp prst="textNoShape">
+                  <a:avLst/>
+                </a:prstTxWarp>
+              </a:bodyPr>
+              <a:lstStyle/>
+              <a:p>
+                <a:endParaRPr lang="en-US"/>
+              </a:p>
+            </p:txBody>
+          </p:sp>
+          <p:sp>
+            <p:nvSpPr>
+              <p:cNvPr id="83" name="Rectangle 494">
+                <a:extLst>
+                  <a:ext uri="{FF2B5EF4-FFF2-40B4-BE49-F238E27FC236}">
+                    <a16:creationId xmlns:a16="http://schemas.microsoft.com/office/drawing/2014/main" id="{ADD83331-7B29-4645-8703-20C939C7CF80}"/>
+                  </a:ext>
+                </a:extLst>
+              </p:cNvPr>
+              <p:cNvSpPr>
+                <a:spLocks noChangeArrowheads="1"/>
+              </p:cNvSpPr>
+              <p:nvPr/>
+            </p:nvSpPr>
+            <p:spPr bwMode="auto">
+              <a:xfrm>
+                <a:off x="8137173" y="3141284"/>
+                <a:ext cx="568349" cy="19711"/>
+              </a:xfrm>
+              <a:prstGeom prst="rect">
+                <a:avLst/>
+              </a:prstGeom>
+              <a:solidFill>
+                <a:srgbClr val="40CDF5"/>
+              </a:solidFill>
+              <a:ln>
+                <a:noFill/>
+              </a:ln>
+              <a:extLst>
+                <a:ext uri="{91240B29-F687-4F45-9708-019B960494DF}">
+                  <a14:hiddenLine xmlns:a14="http://schemas.microsoft.com/office/drawing/2010/main" w="9525">
+                    <a:solidFill>
+                      <a:srgbClr val="000000"/>
+                    </a:solidFill>
+                    <a:miter lim="800000"/>
+                    <a:headEnd/>
+                    <a:tailEnd/>
+                  </a14:hiddenLine>
+                </a:ext>
+              </a:extLst>
+            </p:spPr>
+            <p:txBody>
+              <a:bodyPr vert="horz" wrap="square" lIns="91440" tIns="45720" rIns="91440" bIns="45720" numCol="1" anchor="t" anchorCtr="0" compatLnSpc="1">
+                <a:prstTxWarp prst="textNoShape">
+                  <a:avLst/>
+                </a:prstTxWarp>
+              </a:bodyPr>
+              <a:lstStyle/>
+              <a:p>
+                <a:endParaRPr lang="en-US"/>
+              </a:p>
+            </p:txBody>
+          </p:sp>
+        </p:grpSp>
+        <p:sp>
+          <p:nvSpPr>
+            <p:cNvPr id="67" name="Freeform 431">
+              <a:extLst>
+                <a:ext uri="{FF2B5EF4-FFF2-40B4-BE49-F238E27FC236}">
+                  <a16:creationId xmlns:a16="http://schemas.microsoft.com/office/drawing/2014/main" id="{44FCFDEB-080D-4AC5-88FC-4751A54C1DC0}"/>
+                </a:ext>
+              </a:extLst>
+            </p:cNvPr>
+            <p:cNvSpPr>
+              <a:spLocks/>
+            </p:cNvSpPr>
+            <p:nvPr/>
+          </p:nvSpPr>
+          <p:spPr bwMode="auto">
+            <a:xfrm>
+              <a:off x="8008395" y="4381500"/>
+              <a:ext cx="852523" cy="563310"/>
+            </a:xfrm>
+            <a:custGeom>
+              <a:avLst/>
+              <a:gdLst>
+                <a:gd name="T0" fmla="*/ 44 w 44"/>
+                <a:gd name="T1" fmla="*/ 20 h 20"/>
+                <a:gd name="T2" fmla="*/ 22 w 44"/>
+                <a:gd name="T3" fmla="*/ 0 h 20"/>
+                <a:gd name="T4" fmla="*/ 0 w 44"/>
+                <a:gd name="T5" fmla="*/ 20 h 20"/>
+                <a:gd name="T6" fmla="*/ 44 w 44"/>
+                <a:gd name="T7" fmla="*/ 20 h 20"/>
+              </a:gdLst>
+              <a:ahLst/>
+              <a:cxnLst>
+                <a:cxn ang="0">
+                  <a:pos x="T0" y="T1"/>
+                </a:cxn>
+                <a:cxn ang="0">
+                  <a:pos x="T2" y="T3"/>
+                </a:cxn>
+                <a:cxn ang="0">
+                  <a:pos x="T4" y="T5"/>
+                </a:cxn>
+                <a:cxn ang="0">
+                  <a:pos x="T6" y="T7"/>
+                </a:cxn>
+              </a:cxnLst>
+              <a:rect l="0" t="0" r="r" b="b"/>
+              <a:pathLst>
+                <a:path w="44" h="20">
+                  <a:moveTo>
+                    <a:pt x="44" y="20"/>
+                  </a:moveTo>
+                  <a:cubicBezTo>
+                    <a:pt x="43" y="9"/>
+                    <a:pt x="33" y="0"/>
+                    <a:pt x="22" y="0"/>
+                  </a:cubicBezTo>
+                  <a:cubicBezTo>
+                    <a:pt x="10" y="0"/>
+                    <a:pt x="1" y="9"/>
+                    <a:pt x="0" y="20"/>
+                  </a:cubicBezTo>
+                  <a:lnTo>
+                    <a:pt x="44" y="20"/>
+                  </a:lnTo>
+                  <a:close/>
+                </a:path>
+              </a:pathLst>
+            </a:custGeom>
+            <a:solidFill>
+              <a:srgbClr val="0070C0"/>
+            </a:solidFill>
+            <a:ln>
+              <a:noFill/>
+            </a:ln>
+            <a:extLst/>
+          </p:spPr>
+          <p:txBody>
+            <a:bodyPr vert="horz" wrap="square" lIns="91440" tIns="45720" rIns="91440" bIns="45720" numCol="1" anchor="t" anchorCtr="0" compatLnSpc="1">
+              <a:prstTxWarp prst="textNoShape">
+                <a:avLst/>
+              </a:prstTxWarp>
+            </a:bodyPr>
+            <a:lstStyle/>
+            <a:p>
+              <a:endParaRPr lang="en-US"/>
+            </a:p>
+          </p:txBody>
+        </p:sp>
+        <p:sp>
+          <p:nvSpPr>
+            <p:cNvPr id="68" name="Freeform 484">
+              <a:extLst>
+                <a:ext uri="{FF2B5EF4-FFF2-40B4-BE49-F238E27FC236}">
+                  <a16:creationId xmlns:a16="http://schemas.microsoft.com/office/drawing/2014/main" id="{530B39AA-767D-49E5-B135-191370651394}"/>
+                </a:ext>
+              </a:extLst>
+            </p:cNvPr>
+            <p:cNvSpPr>
+              <a:spLocks/>
+            </p:cNvSpPr>
+            <p:nvPr/>
+          </p:nvSpPr>
+          <p:spPr bwMode="auto">
+            <a:xfrm>
+              <a:off x="7006571" y="4472013"/>
+              <a:ext cx="1354601" cy="472796"/>
+            </a:xfrm>
+            <a:custGeom>
+              <a:avLst/>
+              <a:gdLst>
+                <a:gd name="T0" fmla="*/ 58 w 58"/>
+                <a:gd name="T1" fmla="*/ 26 h 26"/>
+                <a:gd name="T2" fmla="*/ 29 w 58"/>
+                <a:gd name="T3" fmla="*/ 0 h 26"/>
+                <a:gd name="T4" fmla="*/ 0 w 58"/>
+                <a:gd name="T5" fmla="*/ 26 h 26"/>
+                <a:gd name="T6" fmla="*/ 58 w 58"/>
+                <a:gd name="T7" fmla="*/ 26 h 26"/>
+              </a:gdLst>
+              <a:ahLst/>
+              <a:cxnLst>
+                <a:cxn ang="0">
+                  <a:pos x="T0" y="T1"/>
+                </a:cxn>
+                <a:cxn ang="0">
+                  <a:pos x="T2" y="T3"/>
+                </a:cxn>
+                <a:cxn ang="0">
+                  <a:pos x="T4" y="T5"/>
+                </a:cxn>
+                <a:cxn ang="0">
+                  <a:pos x="T6" y="T7"/>
+                </a:cxn>
+              </a:cxnLst>
+              <a:rect l="0" t="0" r="r" b="b"/>
+              <a:pathLst>
+                <a:path w="58" h="26">
+                  <a:moveTo>
+                    <a:pt x="58" y="26"/>
+                  </a:moveTo>
+                  <a:cubicBezTo>
+                    <a:pt x="56" y="11"/>
+                    <a:pt x="44" y="0"/>
+                    <a:pt x="29" y="0"/>
+                  </a:cubicBezTo>
+                  <a:cubicBezTo>
+                    <a:pt x="14" y="0"/>
+                    <a:pt x="1" y="11"/>
+                    <a:pt x="0" y="26"/>
+                  </a:cubicBezTo>
+                  <a:lnTo>
+                    <a:pt x="58" y="26"/>
+                  </a:lnTo>
+                  <a:close/>
+                </a:path>
+              </a:pathLst>
+            </a:custGeom>
+            <a:solidFill>
+              <a:srgbClr val="002050"/>
+            </a:solidFill>
+            <a:ln>
+              <a:noFill/>
+            </a:ln>
+            <a:extLst/>
+          </p:spPr>
+          <p:txBody>
+            <a:bodyPr vert="horz" wrap="square" lIns="91440" tIns="45720" rIns="91440" bIns="45720" numCol="1" anchor="t" anchorCtr="0" compatLnSpc="1">
+              <a:prstTxWarp prst="textNoShape">
+                <a:avLst/>
+              </a:prstTxWarp>
+            </a:bodyPr>
+            <a:lstStyle/>
+            <a:p>
+              <a:endParaRPr lang="en-US"/>
+            </a:p>
+          </p:txBody>
+        </p:sp>
+        <p:sp>
+          <p:nvSpPr>
+            <p:cNvPr id="69" name="Freeform 431">
+              <a:extLst>
+                <a:ext uri="{FF2B5EF4-FFF2-40B4-BE49-F238E27FC236}">
+                  <a16:creationId xmlns:a16="http://schemas.microsoft.com/office/drawing/2014/main" id="{242A41C9-E8A2-4CDB-B9C9-4AC94AE787F0}"/>
+                </a:ext>
+              </a:extLst>
+            </p:cNvPr>
+            <p:cNvSpPr>
+              <a:spLocks/>
+            </p:cNvSpPr>
+            <p:nvPr/>
+          </p:nvSpPr>
+          <p:spPr bwMode="auto">
+            <a:xfrm>
+              <a:off x="8434657" y="4459537"/>
+              <a:ext cx="852523" cy="485273"/>
+            </a:xfrm>
+            <a:custGeom>
+              <a:avLst/>
+              <a:gdLst>
+                <a:gd name="T0" fmla="*/ 44 w 44"/>
+                <a:gd name="T1" fmla="*/ 20 h 20"/>
+                <a:gd name="T2" fmla="*/ 22 w 44"/>
+                <a:gd name="T3" fmla="*/ 0 h 20"/>
+                <a:gd name="T4" fmla="*/ 0 w 44"/>
+                <a:gd name="T5" fmla="*/ 20 h 20"/>
+                <a:gd name="T6" fmla="*/ 44 w 44"/>
+                <a:gd name="T7" fmla="*/ 20 h 20"/>
+              </a:gdLst>
+              <a:ahLst/>
+              <a:cxnLst>
+                <a:cxn ang="0">
+                  <a:pos x="T0" y="T1"/>
+                </a:cxn>
+                <a:cxn ang="0">
+                  <a:pos x="T2" y="T3"/>
+                </a:cxn>
+                <a:cxn ang="0">
+                  <a:pos x="T4" y="T5"/>
+                </a:cxn>
+                <a:cxn ang="0">
+                  <a:pos x="T6" y="T7"/>
+                </a:cxn>
+              </a:cxnLst>
+              <a:rect l="0" t="0" r="r" b="b"/>
+              <a:pathLst>
+                <a:path w="44" h="20">
+                  <a:moveTo>
+                    <a:pt x="44" y="20"/>
+                  </a:moveTo>
+                  <a:cubicBezTo>
+                    <a:pt x="43" y="9"/>
+                    <a:pt x="33" y="0"/>
+                    <a:pt x="22" y="0"/>
+                  </a:cubicBezTo>
+                  <a:cubicBezTo>
+                    <a:pt x="10" y="0"/>
+                    <a:pt x="1" y="9"/>
+                    <a:pt x="0" y="20"/>
+                  </a:cubicBezTo>
+                  <a:lnTo>
+                    <a:pt x="44" y="20"/>
+                  </a:lnTo>
+                  <a:close/>
+                </a:path>
+              </a:pathLst>
+            </a:custGeom>
+            <a:solidFill>
+              <a:schemeClr val="bg1">
+                <a:lumMod val="65000"/>
+              </a:schemeClr>
+            </a:solidFill>
+            <a:ln>
+              <a:noFill/>
+            </a:ln>
+            <a:extLst/>
+          </p:spPr>
+          <p:txBody>
+            <a:bodyPr vert="horz" wrap="square" lIns="91440" tIns="45720" rIns="91440" bIns="45720" numCol="1" anchor="t" anchorCtr="0" compatLnSpc="1">
+              <a:prstTxWarp prst="textNoShape">
+                <a:avLst/>
+              </a:prstTxWarp>
+            </a:bodyPr>
+            <a:lstStyle/>
+            <a:p>
+              <a:endParaRPr lang="en-US"/>
+            </a:p>
+          </p:txBody>
+        </p:sp>
+        <p:sp>
+          <p:nvSpPr>
+            <p:cNvPr id="70" name="Freeform 592">
+              <a:extLst>
+                <a:ext uri="{FF2B5EF4-FFF2-40B4-BE49-F238E27FC236}">
+                  <a16:creationId xmlns:a16="http://schemas.microsoft.com/office/drawing/2014/main" id="{C676F2F2-A1B7-47B6-B548-79ECE602104D}"/>
+                </a:ext>
+              </a:extLst>
+            </p:cNvPr>
+            <p:cNvSpPr>
+              <a:spLocks/>
+            </p:cNvSpPr>
+            <p:nvPr/>
+          </p:nvSpPr>
+          <p:spPr bwMode="auto">
+            <a:xfrm>
+              <a:off x="8130061" y="1120968"/>
+              <a:ext cx="1513708" cy="610529"/>
+            </a:xfrm>
+            <a:custGeom>
+              <a:avLst/>
+              <a:gdLst>
+                <a:gd name="T0" fmla="*/ 245 w 274"/>
+                <a:gd name="T1" fmla="*/ 52 h 111"/>
+                <a:gd name="T2" fmla="*/ 240 w 274"/>
+                <a:gd name="T3" fmla="*/ 52 h 111"/>
+                <a:gd name="T4" fmla="*/ 185 w 274"/>
+                <a:gd name="T5" fmla="*/ 0 h 111"/>
+                <a:gd name="T6" fmla="*/ 131 w 274"/>
+                <a:gd name="T7" fmla="*/ 41 h 111"/>
+                <a:gd name="T8" fmla="*/ 102 w 274"/>
+                <a:gd name="T9" fmla="*/ 29 h 111"/>
+                <a:gd name="T10" fmla="*/ 61 w 274"/>
+                <a:gd name="T11" fmla="*/ 66 h 111"/>
+                <a:gd name="T12" fmla="*/ 41 w 274"/>
+                <a:gd name="T13" fmla="*/ 75 h 111"/>
+                <a:gd name="T14" fmla="*/ 23 w 274"/>
+                <a:gd name="T15" fmla="*/ 65 h 111"/>
+                <a:gd name="T16" fmla="*/ 0 w 274"/>
+                <a:gd name="T17" fmla="*/ 88 h 111"/>
+                <a:gd name="T18" fmla="*/ 23 w 274"/>
+                <a:gd name="T19" fmla="*/ 111 h 111"/>
+                <a:gd name="T20" fmla="*/ 29 w 274"/>
+                <a:gd name="T21" fmla="*/ 111 h 111"/>
+                <a:gd name="T22" fmla="*/ 104 w 274"/>
+                <a:gd name="T23" fmla="*/ 111 h 111"/>
+                <a:gd name="T24" fmla="*/ 146 w 274"/>
+                <a:gd name="T25" fmla="*/ 111 h 111"/>
+                <a:gd name="T26" fmla="*/ 247 w 274"/>
+                <a:gd name="T27" fmla="*/ 111 h 111"/>
+                <a:gd name="T28" fmla="*/ 247 w 274"/>
+                <a:gd name="T29" fmla="*/ 111 h 111"/>
+                <a:gd name="T30" fmla="*/ 274 w 274"/>
+                <a:gd name="T31" fmla="*/ 81 h 111"/>
+                <a:gd name="T32" fmla="*/ 245 w 274"/>
+                <a:gd name="T33" fmla="*/ 52 h 111"/>
+              </a:gdLst>
+              <a:ahLst/>
+              <a:cxnLst>
+                <a:cxn ang="0">
+                  <a:pos x="T0" y="T1"/>
+                </a:cxn>
+                <a:cxn ang="0">
+                  <a:pos x="T2" y="T3"/>
+                </a:cxn>
+                <a:cxn ang="0">
+                  <a:pos x="T4" y="T5"/>
+                </a:cxn>
+                <a:cxn ang="0">
+                  <a:pos x="T6" y="T7"/>
+                </a:cxn>
+                <a:cxn ang="0">
+                  <a:pos x="T8" y="T9"/>
+                </a:cxn>
+                <a:cxn ang="0">
+                  <a:pos x="T10" y="T11"/>
+                </a:cxn>
+                <a:cxn ang="0">
+                  <a:pos x="T12" y="T13"/>
+                </a:cxn>
+                <a:cxn ang="0">
+                  <a:pos x="T14" y="T15"/>
+                </a:cxn>
+                <a:cxn ang="0">
+                  <a:pos x="T16" y="T17"/>
+                </a:cxn>
+                <a:cxn ang="0">
+                  <a:pos x="T18" y="T19"/>
+                </a:cxn>
+                <a:cxn ang="0">
+                  <a:pos x="T20" y="T21"/>
+                </a:cxn>
+                <a:cxn ang="0">
+                  <a:pos x="T22" y="T23"/>
+                </a:cxn>
+                <a:cxn ang="0">
+                  <a:pos x="T24" y="T25"/>
+                </a:cxn>
+                <a:cxn ang="0">
+                  <a:pos x="T26" y="T27"/>
+                </a:cxn>
+                <a:cxn ang="0">
+                  <a:pos x="T28" y="T29"/>
+                </a:cxn>
+                <a:cxn ang="0">
+                  <a:pos x="T30" y="T31"/>
+                </a:cxn>
+                <a:cxn ang="0">
+                  <a:pos x="T32" y="T33"/>
+                </a:cxn>
+              </a:cxnLst>
+              <a:rect l="0" t="0" r="r" b="b"/>
+              <a:pathLst>
+                <a:path w="274" h="111">
+                  <a:moveTo>
+                    <a:pt x="245" y="52"/>
+                  </a:moveTo>
+                  <a:cubicBezTo>
+                    <a:pt x="243" y="52"/>
+                    <a:pt x="242" y="52"/>
+                    <a:pt x="240" y="52"/>
+                  </a:cubicBezTo>
+                  <a:cubicBezTo>
+                    <a:pt x="239" y="23"/>
+                    <a:pt x="214" y="0"/>
+                    <a:pt x="185" y="0"/>
+                  </a:cubicBezTo>
+                  <a:cubicBezTo>
+                    <a:pt x="159" y="0"/>
+                    <a:pt x="137" y="17"/>
+                    <a:pt x="131" y="41"/>
+                  </a:cubicBezTo>
+                  <a:cubicBezTo>
+                    <a:pt x="123" y="33"/>
+                    <a:pt x="113" y="29"/>
+                    <a:pt x="102" y="29"/>
+                  </a:cubicBezTo>
+                  <a:cubicBezTo>
+                    <a:pt x="80" y="29"/>
+                    <a:pt x="63" y="45"/>
+                    <a:pt x="61" y="66"/>
+                  </a:cubicBezTo>
+                  <a:cubicBezTo>
+                    <a:pt x="53" y="67"/>
+                    <a:pt x="47" y="70"/>
+                    <a:pt x="41" y="75"/>
+                  </a:cubicBezTo>
+                  <a:cubicBezTo>
+                    <a:pt x="37" y="69"/>
+                    <a:pt x="30" y="65"/>
+                    <a:pt x="23" y="65"/>
+                  </a:cubicBezTo>
+                  <a:cubicBezTo>
+                    <a:pt x="10" y="65"/>
+                    <a:pt x="0" y="75"/>
+                    <a:pt x="0" y="88"/>
+                  </a:cubicBezTo>
+                  <a:cubicBezTo>
+                    <a:pt x="0" y="101"/>
+                    <a:pt x="10" y="111"/>
+                    <a:pt x="23" y="111"/>
+                  </a:cubicBezTo>
+                  <a:cubicBezTo>
+                    <a:pt x="29" y="111"/>
+                    <a:pt x="29" y="111"/>
+                    <a:pt x="29" y="111"/>
+                  </a:cubicBezTo>
+                  <a:cubicBezTo>
+                    <a:pt x="104" y="111"/>
+                    <a:pt x="104" y="111"/>
+                    <a:pt x="104" y="111"/>
+                  </a:cubicBezTo>
+                  <a:cubicBezTo>
+                    <a:pt x="146" y="111"/>
+                    <a:pt x="146" y="111"/>
+                    <a:pt x="146" y="111"/>
+                  </a:cubicBezTo>
+                  <a:cubicBezTo>
+                    <a:pt x="247" y="111"/>
+                    <a:pt x="247" y="111"/>
+                    <a:pt x="247" y="111"/>
+                  </a:cubicBezTo>
+                  <a:cubicBezTo>
+                    <a:pt x="247" y="111"/>
+                    <a:pt x="247" y="111"/>
+                    <a:pt x="247" y="111"/>
+                  </a:cubicBezTo>
+                  <a:cubicBezTo>
+                    <a:pt x="262" y="110"/>
+                    <a:pt x="274" y="97"/>
+                    <a:pt x="274" y="81"/>
+                  </a:cubicBezTo>
+                  <a:cubicBezTo>
+                    <a:pt x="274" y="65"/>
+                    <a:pt x="261" y="52"/>
+                    <a:pt x="245" y="52"/>
+                  </a:cubicBezTo>
+                  <a:close/>
+                </a:path>
+              </a:pathLst>
+            </a:custGeom>
+            <a:solidFill>
+              <a:schemeClr val="bg1">
+                <a:lumMod val="95000"/>
+              </a:schemeClr>
+            </a:solidFill>
+            <a:ln>
+              <a:noFill/>
+            </a:ln>
+            <a:extLst>
+              <a:ext uri="{91240B29-F687-4F45-9708-019B960494DF}">
+                <a14:hiddenLine xmlns:a14="http://schemas.microsoft.com/office/drawing/2010/main" w="9525">
+                  <a:solidFill>
+                    <a:srgbClr val="000000"/>
+                  </a:solidFill>
+                  <a:round/>
+                  <a:headEnd/>
+                  <a:tailEnd/>
+                </a14:hiddenLine>
+              </a:ext>
+            </a:extLst>
+          </p:spPr>
+          <p:txBody>
+            <a:bodyPr vert="horz" wrap="square" lIns="91440" tIns="45720" rIns="91440" bIns="45720" numCol="1" anchor="t" anchorCtr="0" compatLnSpc="1">
+              <a:prstTxWarp prst="textNoShape">
+                <a:avLst/>
+              </a:prstTxWarp>
+            </a:bodyPr>
+            <a:lstStyle/>
+            <a:p>
+              <a:endParaRPr lang="en-US"/>
+            </a:p>
+          </p:txBody>
+        </p:sp>
+        <p:sp>
+          <p:nvSpPr>
+            <p:cNvPr id="71" name="Freeform 593">
+              <a:extLst>
+                <a:ext uri="{FF2B5EF4-FFF2-40B4-BE49-F238E27FC236}">
+                  <a16:creationId xmlns:a16="http://schemas.microsoft.com/office/drawing/2014/main" id="{25B1E9A6-E5AC-4F36-B373-0587CE3CE648}"/>
+                </a:ext>
+              </a:extLst>
+            </p:cNvPr>
+            <p:cNvSpPr>
+              <a:spLocks/>
+            </p:cNvSpPr>
+            <p:nvPr/>
+          </p:nvSpPr>
+          <p:spPr bwMode="auto">
+            <a:xfrm>
+              <a:off x="7006571" y="2117316"/>
+              <a:ext cx="867859" cy="489432"/>
+            </a:xfrm>
+            <a:custGeom>
+              <a:avLst/>
+              <a:gdLst>
+                <a:gd name="T0" fmla="*/ 131 w 157"/>
+                <a:gd name="T1" fmla="*/ 37 h 89"/>
+                <a:gd name="T2" fmla="*/ 128 w 157"/>
+                <a:gd name="T3" fmla="*/ 38 h 89"/>
+                <a:gd name="T4" fmla="*/ 131 w 157"/>
+                <a:gd name="T5" fmla="*/ 26 h 89"/>
+                <a:gd name="T6" fmla="*/ 105 w 157"/>
+                <a:gd name="T7" fmla="*/ 0 h 89"/>
+                <a:gd name="T8" fmla="*/ 80 w 157"/>
+                <a:gd name="T9" fmla="*/ 23 h 89"/>
+                <a:gd name="T10" fmla="*/ 60 w 157"/>
+                <a:gd name="T11" fmla="*/ 15 h 89"/>
+                <a:gd name="T12" fmla="*/ 35 w 157"/>
+                <a:gd name="T13" fmla="*/ 39 h 89"/>
+                <a:gd name="T14" fmla="*/ 26 w 157"/>
+                <a:gd name="T15" fmla="*/ 37 h 89"/>
+                <a:gd name="T16" fmla="*/ 0 w 157"/>
+                <a:gd name="T17" fmla="*/ 63 h 89"/>
+                <a:gd name="T18" fmla="*/ 26 w 157"/>
+                <a:gd name="T19" fmla="*/ 89 h 89"/>
+                <a:gd name="T20" fmla="*/ 131 w 157"/>
+                <a:gd name="T21" fmla="*/ 89 h 89"/>
+                <a:gd name="T22" fmla="*/ 157 w 157"/>
+                <a:gd name="T23" fmla="*/ 63 h 89"/>
+                <a:gd name="T24" fmla="*/ 131 w 157"/>
+                <a:gd name="T25" fmla="*/ 37 h 89"/>
+              </a:gdLst>
+              <a:ahLst/>
+              <a:cxnLst>
+                <a:cxn ang="0">
+                  <a:pos x="T0" y="T1"/>
+                </a:cxn>
+                <a:cxn ang="0">
+                  <a:pos x="T2" y="T3"/>
+                </a:cxn>
+                <a:cxn ang="0">
+                  <a:pos x="T4" y="T5"/>
+                </a:cxn>
+                <a:cxn ang="0">
+                  <a:pos x="T6" y="T7"/>
+                </a:cxn>
+                <a:cxn ang="0">
+                  <a:pos x="T8" y="T9"/>
+                </a:cxn>
+                <a:cxn ang="0">
+                  <a:pos x="T10" y="T11"/>
+                </a:cxn>
+                <a:cxn ang="0">
+                  <a:pos x="T12" y="T13"/>
+                </a:cxn>
+                <a:cxn ang="0">
+                  <a:pos x="T14" y="T15"/>
+                </a:cxn>
+                <a:cxn ang="0">
+                  <a:pos x="T16" y="T17"/>
+                </a:cxn>
+                <a:cxn ang="0">
+                  <a:pos x="T18" y="T19"/>
+                </a:cxn>
+                <a:cxn ang="0">
+                  <a:pos x="T20" y="T21"/>
+                </a:cxn>
+                <a:cxn ang="0">
+                  <a:pos x="T22" y="T23"/>
+                </a:cxn>
+                <a:cxn ang="0">
+                  <a:pos x="T24" y="T25"/>
+                </a:cxn>
+              </a:cxnLst>
+              <a:rect l="0" t="0" r="r" b="b"/>
+              <a:pathLst>
+                <a:path w="157" h="89">
+                  <a:moveTo>
+                    <a:pt x="131" y="37"/>
+                  </a:moveTo>
+                  <a:cubicBezTo>
+                    <a:pt x="130" y="37"/>
+                    <a:pt x="129" y="38"/>
+                    <a:pt x="128" y="38"/>
+                  </a:cubicBezTo>
+                  <a:cubicBezTo>
+                    <a:pt x="130" y="34"/>
+                    <a:pt x="131" y="30"/>
+                    <a:pt x="131" y="26"/>
+                  </a:cubicBezTo>
+                  <a:cubicBezTo>
+                    <a:pt x="131" y="12"/>
+                    <a:pt x="120" y="0"/>
+                    <a:pt x="105" y="0"/>
+                  </a:cubicBezTo>
+                  <a:cubicBezTo>
+                    <a:pt x="92" y="0"/>
+                    <a:pt x="81" y="10"/>
+                    <a:pt x="80" y="23"/>
+                  </a:cubicBezTo>
+                  <a:cubicBezTo>
+                    <a:pt x="75" y="18"/>
+                    <a:pt x="68" y="15"/>
+                    <a:pt x="60" y="15"/>
+                  </a:cubicBezTo>
+                  <a:cubicBezTo>
+                    <a:pt x="47" y="15"/>
+                    <a:pt x="35" y="25"/>
+                    <a:pt x="35" y="39"/>
+                  </a:cubicBezTo>
+                  <a:cubicBezTo>
+                    <a:pt x="32" y="38"/>
+                    <a:pt x="29" y="37"/>
+                    <a:pt x="26" y="37"/>
+                  </a:cubicBezTo>
+                  <a:cubicBezTo>
+                    <a:pt x="12" y="37"/>
+                    <a:pt x="0" y="49"/>
+                    <a:pt x="0" y="63"/>
+                  </a:cubicBezTo>
+                  <a:cubicBezTo>
+                    <a:pt x="0" y="78"/>
+                    <a:pt x="12" y="89"/>
+                    <a:pt x="26" y="89"/>
+                  </a:cubicBezTo>
+                  <a:cubicBezTo>
+                    <a:pt x="131" y="89"/>
+                    <a:pt x="131" y="89"/>
+                    <a:pt x="131" y="89"/>
+                  </a:cubicBezTo>
+                  <a:cubicBezTo>
+                    <a:pt x="145" y="89"/>
+                    <a:pt x="157" y="78"/>
+                    <a:pt x="157" y="63"/>
+                  </a:cubicBezTo>
+                  <a:cubicBezTo>
+                    <a:pt x="157" y="49"/>
+                    <a:pt x="145" y="37"/>
+                    <a:pt x="131" y="37"/>
+                  </a:cubicBezTo>
+                  <a:close/>
+                </a:path>
+              </a:pathLst>
+            </a:custGeom>
+            <a:solidFill>
+              <a:schemeClr val="bg1">
+                <a:lumMod val="95000"/>
+              </a:schemeClr>
+            </a:solidFill>
+            <a:ln>
+              <a:noFill/>
+            </a:ln>
+            <a:extLst>
+              <a:ext uri="{91240B29-F687-4F45-9708-019B960494DF}">
+                <a14:hiddenLine xmlns:a14="http://schemas.microsoft.com/office/drawing/2010/main" w="9525">
+                  <a:solidFill>
+                    <a:srgbClr val="000000"/>
+                  </a:solidFill>
+                  <a:round/>
+                  <a:headEnd/>
+                  <a:tailEnd/>
+                </a14:hiddenLine>
+              </a:ext>
+            </a:extLst>
+          </p:spPr>
+          <p:txBody>
+            <a:bodyPr vert="horz" wrap="square" lIns="91440" tIns="45720" rIns="91440" bIns="45720" numCol="1" anchor="t" anchorCtr="0" compatLnSpc="1">
+              <a:prstTxWarp prst="textNoShape">
+                <a:avLst/>
+              </a:prstTxWarp>
+            </a:bodyPr>
+            <a:lstStyle/>
+            <a:p>
+              <a:endParaRPr lang="en-US"/>
+            </a:p>
+          </p:txBody>
+        </p:sp>
+        <p:sp>
+          <p:nvSpPr>
+            <p:cNvPr id="72" name="Freeform 591">
+              <a:extLst>
+                <a:ext uri="{FF2B5EF4-FFF2-40B4-BE49-F238E27FC236}">
+                  <a16:creationId xmlns:a16="http://schemas.microsoft.com/office/drawing/2014/main" id="{1D32D0B1-3473-4D39-B144-A751564298DE}"/>
+                </a:ext>
+              </a:extLst>
+            </p:cNvPr>
+            <p:cNvSpPr>
+              <a:spLocks/>
+            </p:cNvSpPr>
+            <p:nvPr/>
+          </p:nvSpPr>
+          <p:spPr bwMode="auto">
+            <a:xfrm>
+              <a:off x="7474594" y="1010691"/>
+              <a:ext cx="589284" cy="312810"/>
+            </a:xfrm>
+            <a:custGeom>
+              <a:avLst/>
+              <a:gdLst>
+                <a:gd name="T0" fmla="*/ 147 w 170"/>
+                <a:gd name="T1" fmla="*/ 45 h 91"/>
+                <a:gd name="T2" fmla="*/ 146 w 170"/>
+                <a:gd name="T3" fmla="*/ 45 h 91"/>
+                <a:gd name="T4" fmla="*/ 101 w 170"/>
+                <a:gd name="T5" fmla="*/ 0 h 91"/>
+                <a:gd name="T6" fmla="*/ 56 w 170"/>
+                <a:gd name="T7" fmla="*/ 40 h 91"/>
+                <a:gd name="T8" fmla="*/ 31 w 170"/>
+                <a:gd name="T9" fmla="*/ 28 h 91"/>
+                <a:gd name="T10" fmla="*/ 0 w 170"/>
+                <a:gd name="T11" fmla="*/ 60 h 91"/>
+                <a:gd name="T12" fmla="*/ 31 w 170"/>
+                <a:gd name="T13" fmla="*/ 91 h 91"/>
+                <a:gd name="T14" fmla="*/ 147 w 170"/>
+                <a:gd name="T15" fmla="*/ 91 h 91"/>
+                <a:gd name="T16" fmla="*/ 170 w 170"/>
+                <a:gd name="T17" fmla="*/ 68 h 91"/>
+                <a:gd name="T18" fmla="*/ 147 w 170"/>
+                <a:gd name="T19" fmla="*/ 45 h 91"/>
+              </a:gdLst>
+              <a:ahLst/>
+              <a:cxnLst>
+                <a:cxn ang="0">
+                  <a:pos x="T0" y="T1"/>
+                </a:cxn>
+                <a:cxn ang="0">
+                  <a:pos x="T2" y="T3"/>
+                </a:cxn>
+                <a:cxn ang="0">
+                  <a:pos x="T4" y="T5"/>
+                </a:cxn>
+                <a:cxn ang="0">
+                  <a:pos x="T6" y="T7"/>
+                </a:cxn>
+                <a:cxn ang="0">
+                  <a:pos x="T8" y="T9"/>
+                </a:cxn>
+                <a:cxn ang="0">
+                  <a:pos x="T10" y="T11"/>
+                </a:cxn>
+                <a:cxn ang="0">
+                  <a:pos x="T12" y="T13"/>
+                </a:cxn>
+                <a:cxn ang="0">
+                  <a:pos x="T14" y="T15"/>
+                </a:cxn>
+                <a:cxn ang="0">
+                  <a:pos x="T16" y="T17"/>
+                </a:cxn>
+                <a:cxn ang="0">
+                  <a:pos x="T18" y="T19"/>
+                </a:cxn>
+              </a:cxnLst>
+              <a:rect l="0" t="0" r="r" b="b"/>
+              <a:pathLst>
+                <a:path w="170" h="91">
+                  <a:moveTo>
+                    <a:pt x="147" y="45"/>
+                  </a:moveTo>
+                  <a:cubicBezTo>
+                    <a:pt x="146" y="45"/>
+                    <a:pt x="146" y="45"/>
+                    <a:pt x="146" y="45"/>
+                  </a:cubicBezTo>
+                  <a:cubicBezTo>
+                    <a:pt x="146" y="20"/>
+                    <a:pt x="126" y="0"/>
+                    <a:pt x="101" y="0"/>
+                  </a:cubicBezTo>
+                  <a:cubicBezTo>
+                    <a:pt x="78" y="0"/>
+                    <a:pt x="59" y="18"/>
+                    <a:pt x="56" y="40"/>
+                  </a:cubicBezTo>
+                  <a:cubicBezTo>
+                    <a:pt x="50" y="33"/>
+                    <a:pt x="41" y="28"/>
+                    <a:pt x="31" y="28"/>
+                  </a:cubicBezTo>
+                  <a:cubicBezTo>
+                    <a:pt x="14" y="28"/>
+                    <a:pt x="0" y="42"/>
+                    <a:pt x="0" y="60"/>
+                  </a:cubicBezTo>
+                  <a:cubicBezTo>
+                    <a:pt x="0" y="77"/>
+                    <a:pt x="14" y="91"/>
+                    <a:pt x="31" y="91"/>
+                  </a:cubicBezTo>
+                  <a:cubicBezTo>
+                    <a:pt x="147" y="91"/>
+                    <a:pt x="147" y="91"/>
+                    <a:pt x="147" y="91"/>
+                  </a:cubicBezTo>
+                  <a:cubicBezTo>
+                    <a:pt x="160" y="91"/>
+                    <a:pt x="170" y="81"/>
+                    <a:pt x="170" y="68"/>
+                  </a:cubicBezTo>
+                  <a:cubicBezTo>
+                    <a:pt x="170" y="56"/>
+                    <a:pt x="160" y="45"/>
+                    <a:pt x="147" y="45"/>
+                  </a:cubicBezTo>
+                  <a:close/>
+                </a:path>
+              </a:pathLst>
+            </a:custGeom>
+            <a:solidFill>
+              <a:schemeClr val="bg1">
+                <a:lumMod val="95000"/>
+              </a:schemeClr>
+            </a:solidFill>
+            <a:ln>
+              <a:noFill/>
+            </a:ln>
+            <a:extLst>
+              <a:ext uri="{91240B29-F687-4F45-9708-019B960494DF}">
+                <a14:hiddenLine xmlns:a14="http://schemas.microsoft.com/office/drawing/2010/main" w="9525">
+                  <a:solidFill>
+                    <a:srgbClr val="000000"/>
+                  </a:solidFill>
+                  <a:round/>
+                  <a:headEnd/>
+                  <a:tailEnd/>
+                </a14:hiddenLine>
+              </a:ext>
+            </a:extLst>
+          </p:spPr>
+          <p:txBody>
+            <a:bodyPr vert="horz" wrap="square" lIns="91440" tIns="45720" rIns="91440" bIns="45720" numCol="1" anchor="t" anchorCtr="0" compatLnSpc="1">
+              <a:prstTxWarp prst="textNoShape">
+                <a:avLst/>
+              </a:prstTxWarp>
+            </a:bodyPr>
+            <a:lstStyle/>
+            <a:p>
+              <a:endParaRPr lang="en-US"/>
+            </a:p>
+          </p:txBody>
+        </p:sp>
+      </p:grpSp>
+    </p:spTree>
+    <p:extLst>
+      <p:ext uri="{BB962C8B-B14F-4D97-AF65-F5344CB8AC3E}">
+        <p14:creationId xmlns:p14="http://schemas.microsoft.com/office/powerpoint/2010/main" val="2786863369"/>
+      </p:ext>
+    </p:extLst>
+  </p:cSld>
+  <p:clrMapOvr>
+    <a:masterClrMapping/>
+  </p:clrMapOvr>
+</p:sld>
+</file>
+
+<file path=ppt/slides/slide3.xml><?xml version="1.0" encoding="utf-8"?>
+<p:sld xmlns:a="http://schemas.openxmlformats.org/drawingml/2006/main" xmlns:r="http://schemas.openxmlformats.org/officeDocument/2006/relationships" xmlns:p="http://schemas.openxmlformats.org/presentationml/2006/main">
+  <p:cSld>
+    <p:spTree>
+      <p:nvGrpSpPr>
+        <p:cNvPr id="1" name=""/>
+        <p:cNvGrpSpPr/>
+        <p:nvPr/>
+      </p:nvGrpSpPr>
+      <p:grpSpPr>
+        <a:xfrm>
+          <a:off x="0" y="0"/>
+          <a:ext cx="0" cy="0"/>
+          <a:chOff x="0" y="0"/>
+          <a:chExt cx="0" cy="0"/>
+        </a:xfrm>
+      </p:grpSpPr>
+      <p:sp>
+        <p:nvSpPr>
           <p:cNvPr id="2" name="Title 1"/>
           <p:cNvSpPr>
             <a:spLocks noGrp="1"/>

</xml_diff>

<commit_message>
Update Sept 2018 for WinOps
</commit_message>
<xml_diff>
--- a/images/AzureCitadelBanner.pptx
+++ b/images/AzureCitadelBanner.pptx
@@ -117,10 +117,6 @@
 </p:presentation>
 </file>
 
-<file path=ppt/revisionInfo.xml><?xml version="1.0" encoding="utf-8"?>
-<p1510:revInfo xmlns:a="http://schemas.openxmlformats.org/drawingml/2006/main" xmlns:r="http://schemas.openxmlformats.org/officeDocument/2006/relationships" xmlns:p1510="http://schemas.microsoft.com/office/powerpoint/2015/10/main"/>
-</file>
-
 <file path=ppt/notesMasters/notesMaster1.xml><?xml version="1.0" encoding="utf-8"?>
 <p:notesMaster xmlns:a="http://schemas.openxmlformats.org/drawingml/2006/main" xmlns:r="http://schemas.openxmlformats.org/officeDocument/2006/relationships" xmlns:p="http://schemas.openxmlformats.org/presentationml/2006/main">
   <p:cSld>
@@ -203,7 +199,7 @@
           <a:p>
             <a:fld id="{7B6D4EAA-ACCA-462D-97CE-B7FFB398C493}" type="datetimeFigureOut">
               <a:rPr lang="en-GB" smtClean="0"/>
-              <a:t>20/10/2017</a:t>
+              <a:t>01/11/2018</a:t>
             </a:fld>
             <a:endParaRPr lang="en-GB"/>
           </a:p>
@@ -872,7 +868,7 @@
           <a:p>
             <a:fld id="{3A34A2D0-F9BC-4E75-AABA-0F8BFEBF7988}" type="datetimeFigureOut">
               <a:rPr lang="en-GB" smtClean="0"/>
-              <a:t>20/10/2017</a:t>
+              <a:t>01/11/2018</a:t>
             </a:fld>
             <a:endParaRPr lang="en-GB"/>
           </a:p>
@@ -1072,7 +1068,7 @@
           <a:p>
             <a:fld id="{3A34A2D0-F9BC-4E75-AABA-0F8BFEBF7988}" type="datetimeFigureOut">
               <a:rPr lang="en-GB" smtClean="0"/>
-              <a:t>20/10/2017</a:t>
+              <a:t>01/11/2018</a:t>
             </a:fld>
             <a:endParaRPr lang="en-GB"/>
           </a:p>
@@ -1282,7 +1278,7 @@
           <a:p>
             <a:fld id="{3A34A2D0-F9BC-4E75-AABA-0F8BFEBF7988}" type="datetimeFigureOut">
               <a:rPr lang="en-GB" smtClean="0"/>
-              <a:t>20/10/2017</a:t>
+              <a:t>01/11/2018</a:t>
             </a:fld>
             <a:endParaRPr lang="en-GB"/>
           </a:p>
@@ -1482,7 +1478,7 @@
           <a:p>
             <a:fld id="{3A34A2D0-F9BC-4E75-AABA-0F8BFEBF7988}" type="datetimeFigureOut">
               <a:rPr lang="en-GB" smtClean="0"/>
-              <a:t>20/10/2017</a:t>
+              <a:t>01/11/2018</a:t>
             </a:fld>
             <a:endParaRPr lang="en-GB"/>
           </a:p>
@@ -1758,7 +1754,7 @@
           <a:p>
             <a:fld id="{3A34A2D0-F9BC-4E75-AABA-0F8BFEBF7988}" type="datetimeFigureOut">
               <a:rPr lang="en-GB" smtClean="0"/>
-              <a:t>20/10/2017</a:t>
+              <a:t>01/11/2018</a:t>
             </a:fld>
             <a:endParaRPr lang="en-GB"/>
           </a:p>
@@ -2026,7 +2022,7 @@
           <a:p>
             <a:fld id="{3A34A2D0-F9BC-4E75-AABA-0F8BFEBF7988}" type="datetimeFigureOut">
               <a:rPr lang="en-GB" smtClean="0"/>
-              <a:t>20/10/2017</a:t>
+              <a:t>01/11/2018</a:t>
             </a:fld>
             <a:endParaRPr lang="en-GB"/>
           </a:p>
@@ -2441,7 +2437,7 @@
           <a:p>
             <a:fld id="{3A34A2D0-F9BC-4E75-AABA-0F8BFEBF7988}" type="datetimeFigureOut">
               <a:rPr lang="en-GB" smtClean="0"/>
-              <a:t>20/10/2017</a:t>
+              <a:t>01/11/2018</a:t>
             </a:fld>
             <a:endParaRPr lang="en-GB"/>
           </a:p>
@@ -2583,7 +2579,7 @@
           <a:p>
             <a:fld id="{3A34A2D0-F9BC-4E75-AABA-0F8BFEBF7988}" type="datetimeFigureOut">
               <a:rPr lang="en-GB" smtClean="0"/>
-              <a:t>20/10/2017</a:t>
+              <a:t>01/11/2018</a:t>
             </a:fld>
             <a:endParaRPr lang="en-GB"/>
           </a:p>
@@ -2696,7 +2692,7 @@
           <a:p>
             <a:fld id="{3A34A2D0-F9BC-4E75-AABA-0F8BFEBF7988}" type="datetimeFigureOut">
               <a:rPr lang="en-GB" smtClean="0"/>
-              <a:t>20/10/2017</a:t>
+              <a:t>01/11/2018</a:t>
             </a:fld>
             <a:endParaRPr lang="en-GB"/>
           </a:p>
@@ -3009,7 +3005,7 @@
           <a:p>
             <a:fld id="{3A34A2D0-F9BC-4E75-AABA-0F8BFEBF7988}" type="datetimeFigureOut">
               <a:rPr lang="en-GB" smtClean="0"/>
-              <a:t>20/10/2017</a:t>
+              <a:t>01/11/2018</a:t>
             </a:fld>
             <a:endParaRPr lang="en-GB"/>
           </a:p>
@@ -3298,7 +3294,7 @@
           <a:p>
             <a:fld id="{3A34A2D0-F9BC-4E75-AABA-0F8BFEBF7988}" type="datetimeFigureOut">
               <a:rPr lang="en-GB" smtClean="0"/>
-              <a:t>20/10/2017</a:t>
+              <a:t>01/11/2018</a:t>
             </a:fld>
             <a:endParaRPr lang="en-GB"/>
           </a:p>
@@ -3541,7 +3537,7 @@
           <a:p>
             <a:fld id="{3A34A2D0-F9BC-4E75-AABA-0F8BFEBF7988}" type="datetimeFigureOut">
               <a:rPr lang="en-GB" smtClean="0"/>
-              <a:t>20/10/2017</a:t>
+              <a:t>01/11/2018</a:t>
             </a:fld>
             <a:endParaRPr lang="en-GB"/>
           </a:p>
@@ -11554,6 +11550,636 @@
           </p:txBody>
         </p:sp>
       </p:grpSp>
+      <p:sp>
+        <p:nvSpPr>
+          <p:cNvPr id="33" name="Rectangle 32">
+            <a:extLst>
+              <a:ext uri="{FF2B5EF4-FFF2-40B4-BE49-F238E27FC236}">
+                <a16:creationId xmlns:a16="http://schemas.microsoft.com/office/drawing/2014/main" id="{FD013ED5-8DEB-48CD-9418-0198097BBB80}"/>
+              </a:ext>
+            </a:extLst>
+          </p:cNvPr>
+          <p:cNvSpPr/>
+          <p:nvPr/>
+        </p:nvSpPr>
+        <p:spPr>
+          <a:xfrm>
+            <a:off x="4133425" y="3776554"/>
+            <a:ext cx="3254886" cy="686969"/>
+          </a:xfrm>
+          <a:prstGeom prst="rect">
+            <a:avLst/>
+          </a:prstGeom>
+          <a:solidFill>
+            <a:srgbClr val="407855"/>
+          </a:solidFill>
+          <a:ln>
+            <a:noFill/>
+          </a:ln>
+        </p:spPr>
+        <p:style>
+          <a:lnRef idx="2">
+            <a:schemeClr val="accent1">
+              <a:shade val="50000"/>
+            </a:schemeClr>
+          </a:lnRef>
+          <a:fillRef idx="1">
+            <a:schemeClr val="accent1"/>
+          </a:fillRef>
+          <a:effectRef idx="0">
+            <a:schemeClr val="accent1"/>
+          </a:effectRef>
+          <a:fontRef idx="minor">
+            <a:schemeClr val="lt1"/>
+          </a:fontRef>
+        </p:style>
+        <p:txBody>
+          <a:bodyPr rtlCol="0" anchor="ctr"/>
+          <a:lstStyle/>
+          <a:p>
+            <a:pPr algn="ctr"/>
+            <a:endParaRPr lang="en-GB"/>
+          </a:p>
+        </p:txBody>
+      </p:sp>
+      <p:sp>
+        <p:nvSpPr>
+          <p:cNvPr id="34" name="Rectangle 33">
+            <a:extLst>
+              <a:ext uri="{FF2B5EF4-FFF2-40B4-BE49-F238E27FC236}">
+                <a16:creationId xmlns:a16="http://schemas.microsoft.com/office/drawing/2014/main" id="{22B6F120-9247-46F7-9002-ED9F5599528A}"/>
+              </a:ext>
+            </a:extLst>
+          </p:cNvPr>
+          <p:cNvSpPr/>
+          <p:nvPr/>
+        </p:nvSpPr>
+        <p:spPr>
+          <a:xfrm>
+            <a:off x="4698733" y="1435359"/>
+            <a:ext cx="1904034" cy="1904034"/>
+          </a:xfrm>
+          <a:prstGeom prst="rect">
+            <a:avLst/>
+          </a:prstGeom>
+          <a:solidFill>
+            <a:schemeClr val="tx1">
+              <a:lumMod val="75000"/>
+              <a:lumOff val="25000"/>
+            </a:schemeClr>
+          </a:solidFill>
+          <a:ln>
+            <a:noFill/>
+          </a:ln>
+        </p:spPr>
+        <p:style>
+          <a:lnRef idx="2">
+            <a:schemeClr val="accent1">
+              <a:shade val="50000"/>
+            </a:schemeClr>
+          </a:lnRef>
+          <a:fillRef idx="1">
+            <a:schemeClr val="accent1"/>
+          </a:fillRef>
+          <a:effectRef idx="0">
+            <a:schemeClr val="accent1"/>
+          </a:effectRef>
+          <a:fontRef idx="minor">
+            <a:schemeClr val="lt1"/>
+          </a:fontRef>
+        </p:style>
+        <p:txBody>
+          <a:bodyPr rtlCol="0" anchor="ctr"/>
+          <a:lstStyle/>
+          <a:p>
+            <a:pPr algn="ctr"/>
+            <a:endParaRPr lang="en-GB" dirty="0"/>
+          </a:p>
+        </p:txBody>
+      </p:sp>
+      <p:sp>
+        <p:nvSpPr>
+          <p:cNvPr id="46" name="Rectangle 427">
+            <a:extLst>
+              <a:ext uri="{FF2B5EF4-FFF2-40B4-BE49-F238E27FC236}">
+                <a16:creationId xmlns:a16="http://schemas.microsoft.com/office/drawing/2014/main" id="{09D2FCEC-5164-4325-9778-ECE613EF5289}"/>
+              </a:ext>
+            </a:extLst>
+          </p:cNvPr>
+          <p:cNvSpPr>
+            <a:spLocks noChangeArrowheads="1"/>
+          </p:cNvSpPr>
+          <p:nvPr/>
+        </p:nvSpPr>
+        <p:spPr bwMode="auto">
+          <a:xfrm>
+            <a:off x="5299324" y="2154646"/>
+            <a:ext cx="696019" cy="2095911"/>
+          </a:xfrm>
+          <a:prstGeom prst="rect">
+            <a:avLst/>
+          </a:prstGeom>
+          <a:solidFill>
+            <a:srgbClr val="0078D7"/>
+          </a:solidFill>
+          <a:ln>
+            <a:noFill/>
+          </a:ln>
+          <a:extLst/>
+        </p:spPr>
+        <p:txBody>
+          <a:bodyPr vert="horz" wrap="square" lIns="91440" tIns="45720" rIns="91440" bIns="45720" numCol="1" anchor="t" anchorCtr="0" compatLnSpc="1">
+            <a:prstTxWarp prst="textNoShape">
+              <a:avLst/>
+            </a:prstTxWarp>
+          </a:bodyPr>
+          <a:lstStyle/>
+          <a:p>
+            <a:endParaRPr lang="en-US"/>
+          </a:p>
+        </p:txBody>
+      </p:sp>
+      <p:sp>
+        <p:nvSpPr>
+          <p:cNvPr id="47" name="Oval 440">
+            <a:extLst>
+              <a:ext uri="{FF2B5EF4-FFF2-40B4-BE49-F238E27FC236}">
+                <a16:creationId xmlns:a16="http://schemas.microsoft.com/office/drawing/2014/main" id="{CE22E352-07BC-4921-A86E-DB7A379A3E18}"/>
+              </a:ext>
+            </a:extLst>
+          </p:cNvPr>
+          <p:cNvSpPr>
+            <a:spLocks noChangeArrowheads="1"/>
+          </p:cNvSpPr>
+          <p:nvPr/>
+        </p:nvSpPr>
+        <p:spPr bwMode="auto">
+          <a:xfrm>
+            <a:off x="5548518" y="1733015"/>
+            <a:ext cx="206227" cy="228866"/>
+          </a:xfrm>
+          <a:prstGeom prst="ellipse">
+            <a:avLst/>
+          </a:prstGeom>
+          <a:solidFill>
+            <a:srgbClr val="002050"/>
+          </a:solidFill>
+          <a:ln>
+            <a:noFill/>
+          </a:ln>
+          <a:extLst>
+            <a:ext uri="{91240B29-F687-4F45-9708-019B960494DF}">
+              <a14:hiddenLine xmlns:a14="http://schemas.microsoft.com/office/drawing/2010/main" w="9525">
+                <a:solidFill>
+                  <a:srgbClr val="000000"/>
+                </a:solidFill>
+                <a:round/>
+                <a:headEnd/>
+                <a:tailEnd/>
+              </a14:hiddenLine>
+            </a:ext>
+          </a:extLst>
+        </p:spPr>
+        <p:txBody>
+          <a:bodyPr vert="horz" wrap="square" lIns="91440" tIns="45720" rIns="91440" bIns="45720" numCol="1" anchor="t" anchorCtr="0" compatLnSpc="1">
+            <a:prstTxWarp prst="textNoShape">
+              <a:avLst/>
+            </a:prstTxWarp>
+          </a:bodyPr>
+          <a:lstStyle/>
+          <a:p>
+            <a:endParaRPr lang="en-US"/>
+          </a:p>
+        </p:txBody>
+      </p:sp>
+      <p:sp>
+        <p:nvSpPr>
+          <p:cNvPr id="48" name="Freeform 442">
+            <a:extLst>
+              <a:ext uri="{FF2B5EF4-FFF2-40B4-BE49-F238E27FC236}">
+                <a16:creationId xmlns:a16="http://schemas.microsoft.com/office/drawing/2014/main" id="{315A83DD-D3BB-49D6-83CD-E17444EBF01E}"/>
+              </a:ext>
+            </a:extLst>
+          </p:cNvPr>
+          <p:cNvSpPr>
+            <a:spLocks/>
+          </p:cNvSpPr>
+          <p:nvPr/>
+        </p:nvSpPr>
+        <p:spPr bwMode="auto">
+          <a:xfrm>
+            <a:off x="5436810" y="2267952"/>
+            <a:ext cx="429639" cy="438661"/>
+          </a:xfrm>
+          <a:custGeom>
+            <a:avLst/>
+            <a:gdLst>
+              <a:gd name="T0" fmla="*/ 11 w 23"/>
+              <a:gd name="T1" fmla="*/ 0 h 21"/>
+              <a:gd name="T2" fmla="*/ 0 w 23"/>
+              <a:gd name="T3" fmla="*/ 12 h 21"/>
+              <a:gd name="T4" fmla="*/ 0 w 23"/>
+              <a:gd name="T5" fmla="*/ 21 h 21"/>
+              <a:gd name="T6" fmla="*/ 23 w 23"/>
+              <a:gd name="T7" fmla="*/ 21 h 21"/>
+              <a:gd name="T8" fmla="*/ 23 w 23"/>
+              <a:gd name="T9" fmla="*/ 12 h 21"/>
+              <a:gd name="T10" fmla="*/ 11 w 23"/>
+              <a:gd name="T11" fmla="*/ 0 h 21"/>
+            </a:gdLst>
+            <a:ahLst/>
+            <a:cxnLst>
+              <a:cxn ang="0">
+                <a:pos x="T0" y="T1"/>
+              </a:cxn>
+              <a:cxn ang="0">
+                <a:pos x="T2" y="T3"/>
+              </a:cxn>
+              <a:cxn ang="0">
+                <a:pos x="T4" y="T5"/>
+              </a:cxn>
+              <a:cxn ang="0">
+                <a:pos x="T6" y="T7"/>
+              </a:cxn>
+              <a:cxn ang="0">
+                <a:pos x="T8" y="T9"/>
+              </a:cxn>
+              <a:cxn ang="0">
+                <a:pos x="T10" y="T11"/>
+              </a:cxn>
+            </a:cxnLst>
+            <a:rect l="0" t="0" r="r" b="b"/>
+            <a:pathLst>
+              <a:path w="23" h="21">
+                <a:moveTo>
+                  <a:pt x="11" y="0"/>
+                </a:moveTo>
+                <a:cubicBezTo>
+                  <a:pt x="5" y="0"/>
+                  <a:pt x="0" y="5"/>
+                  <a:pt x="0" y="12"/>
+                </a:cubicBezTo>
+                <a:cubicBezTo>
+                  <a:pt x="0" y="21"/>
+                  <a:pt x="0" y="21"/>
+                  <a:pt x="0" y="21"/>
+                </a:cubicBezTo>
+                <a:cubicBezTo>
+                  <a:pt x="23" y="21"/>
+                  <a:pt x="23" y="21"/>
+                  <a:pt x="23" y="21"/>
+                </a:cubicBezTo>
+                <a:cubicBezTo>
+                  <a:pt x="23" y="12"/>
+                  <a:pt x="23" y="12"/>
+                  <a:pt x="23" y="12"/>
+                </a:cubicBezTo>
+                <a:cubicBezTo>
+                  <a:pt x="23" y="5"/>
+                  <a:pt x="18" y="0"/>
+                  <a:pt x="11" y="0"/>
+                </a:cubicBezTo>
+                <a:close/>
+              </a:path>
+            </a:pathLst>
+          </a:custGeom>
+          <a:solidFill>
+            <a:schemeClr val="bg1"/>
+          </a:solidFill>
+          <a:ln>
+            <a:noFill/>
+          </a:ln>
+          <a:extLst/>
+        </p:spPr>
+        <p:txBody>
+          <a:bodyPr vert="horz" wrap="square" lIns="91440" tIns="45720" rIns="91440" bIns="45720" numCol="1" anchor="t" anchorCtr="0" compatLnSpc="1">
+            <a:prstTxWarp prst="textNoShape">
+              <a:avLst/>
+            </a:prstTxWarp>
+          </a:bodyPr>
+          <a:lstStyle/>
+          <a:p>
+            <a:endParaRPr lang="en-US"/>
+          </a:p>
+        </p:txBody>
+      </p:sp>
+      <p:sp>
+        <p:nvSpPr>
+          <p:cNvPr id="51" name="Rectangle 461">
+            <a:extLst>
+              <a:ext uri="{FF2B5EF4-FFF2-40B4-BE49-F238E27FC236}">
+                <a16:creationId xmlns:a16="http://schemas.microsoft.com/office/drawing/2014/main" id="{023DCC4A-66E0-4DE0-A6E1-1DE13A39AA52}"/>
+              </a:ext>
+            </a:extLst>
+          </p:cNvPr>
+          <p:cNvSpPr>
+            <a:spLocks noChangeArrowheads="1"/>
+          </p:cNvSpPr>
+          <p:nvPr/>
+        </p:nvSpPr>
+        <p:spPr bwMode="auto">
+          <a:xfrm>
+            <a:off x="5501256" y="3630125"/>
+            <a:ext cx="94524" cy="209795"/>
+          </a:xfrm>
+          <a:prstGeom prst="rect">
+            <a:avLst/>
+          </a:prstGeom>
+          <a:solidFill>
+            <a:srgbClr val="002050"/>
+          </a:solidFill>
+          <a:ln>
+            <a:noFill/>
+          </a:ln>
+          <a:extLst>
+            <a:ext uri="{91240B29-F687-4F45-9708-019B960494DF}">
+              <a14:hiddenLine xmlns:a14="http://schemas.microsoft.com/office/drawing/2010/main" w="9525">
+                <a:solidFill>
+                  <a:srgbClr val="000000"/>
+                </a:solidFill>
+                <a:miter lim="800000"/>
+                <a:headEnd/>
+                <a:tailEnd/>
+              </a14:hiddenLine>
+            </a:ext>
+          </a:extLst>
+        </p:spPr>
+        <p:txBody>
+          <a:bodyPr vert="horz" wrap="square" lIns="91440" tIns="45720" rIns="91440" bIns="45720" numCol="1" anchor="t" anchorCtr="0" compatLnSpc="1">
+            <a:prstTxWarp prst="textNoShape">
+              <a:avLst/>
+            </a:prstTxWarp>
+          </a:bodyPr>
+          <a:lstStyle/>
+          <a:p>
+            <a:endParaRPr lang="en-US"/>
+          </a:p>
+        </p:txBody>
+      </p:sp>
+      <p:sp>
+        <p:nvSpPr>
+          <p:cNvPr id="52" name="Rectangle 462">
+            <a:extLst>
+              <a:ext uri="{FF2B5EF4-FFF2-40B4-BE49-F238E27FC236}">
+                <a16:creationId xmlns:a16="http://schemas.microsoft.com/office/drawing/2014/main" id="{04720978-B30C-4EE3-A585-437A0B5B32FE}"/>
+              </a:ext>
+            </a:extLst>
+          </p:cNvPr>
+          <p:cNvSpPr>
+            <a:spLocks noChangeArrowheads="1"/>
+          </p:cNvSpPr>
+          <p:nvPr/>
+        </p:nvSpPr>
+        <p:spPr bwMode="auto">
+          <a:xfrm>
+            <a:off x="5733259" y="3630125"/>
+            <a:ext cx="85927" cy="209795"/>
+          </a:xfrm>
+          <a:prstGeom prst="rect">
+            <a:avLst/>
+          </a:prstGeom>
+          <a:solidFill>
+            <a:srgbClr val="002050"/>
+          </a:solidFill>
+          <a:ln>
+            <a:noFill/>
+          </a:ln>
+          <a:extLst>
+            <a:ext uri="{91240B29-F687-4F45-9708-019B960494DF}">
+              <a14:hiddenLine xmlns:a14="http://schemas.microsoft.com/office/drawing/2010/main" w="9525">
+                <a:solidFill>
+                  <a:srgbClr val="000000"/>
+                </a:solidFill>
+                <a:miter lim="800000"/>
+                <a:headEnd/>
+                <a:tailEnd/>
+              </a14:hiddenLine>
+            </a:ext>
+          </a:extLst>
+        </p:spPr>
+        <p:txBody>
+          <a:bodyPr vert="horz" wrap="square" lIns="91440" tIns="45720" rIns="91440" bIns="45720" numCol="1" anchor="t" anchorCtr="0" compatLnSpc="1">
+            <a:prstTxWarp prst="textNoShape">
+              <a:avLst/>
+            </a:prstTxWarp>
+          </a:bodyPr>
+          <a:lstStyle/>
+          <a:p>
+            <a:endParaRPr lang="en-US"/>
+          </a:p>
+        </p:txBody>
+      </p:sp>
+      <p:sp>
+        <p:nvSpPr>
+          <p:cNvPr id="53" name="Freeform 490">
+            <a:extLst>
+              <a:ext uri="{FF2B5EF4-FFF2-40B4-BE49-F238E27FC236}">
+                <a16:creationId xmlns:a16="http://schemas.microsoft.com/office/drawing/2014/main" id="{A3F1B497-BCDD-4B73-986A-2068DDE69EE6}"/>
+              </a:ext>
+            </a:extLst>
+          </p:cNvPr>
+          <p:cNvSpPr>
+            <a:spLocks/>
+          </p:cNvSpPr>
+          <p:nvPr/>
+        </p:nvSpPr>
+        <p:spPr bwMode="auto">
+          <a:xfrm>
+            <a:off x="5299324" y="1504149"/>
+            <a:ext cx="696019" cy="581707"/>
+          </a:xfrm>
+          <a:custGeom>
+            <a:avLst/>
+            <a:gdLst>
+              <a:gd name="T0" fmla="*/ 40 w 81"/>
+              <a:gd name="T1" fmla="*/ 0 h 61"/>
+              <a:gd name="T2" fmla="*/ 0 w 81"/>
+              <a:gd name="T3" fmla="*/ 61 h 61"/>
+              <a:gd name="T4" fmla="*/ 81 w 81"/>
+              <a:gd name="T5" fmla="*/ 61 h 61"/>
+              <a:gd name="T6" fmla="*/ 40 w 81"/>
+              <a:gd name="T7" fmla="*/ 0 h 61"/>
+            </a:gdLst>
+            <a:ahLst/>
+            <a:cxnLst>
+              <a:cxn ang="0">
+                <a:pos x="T0" y="T1"/>
+              </a:cxn>
+              <a:cxn ang="0">
+                <a:pos x="T2" y="T3"/>
+              </a:cxn>
+              <a:cxn ang="0">
+                <a:pos x="T4" y="T5"/>
+              </a:cxn>
+              <a:cxn ang="0">
+                <a:pos x="T6" y="T7"/>
+              </a:cxn>
+            </a:cxnLst>
+            <a:rect l="0" t="0" r="r" b="b"/>
+            <a:pathLst>
+              <a:path w="81" h="61">
+                <a:moveTo>
+                  <a:pt x="40" y="0"/>
+                </a:moveTo>
+                <a:lnTo>
+                  <a:pt x="0" y="61"/>
+                </a:lnTo>
+                <a:lnTo>
+                  <a:pt x="81" y="61"/>
+                </a:lnTo>
+                <a:lnTo>
+                  <a:pt x="40" y="0"/>
+                </a:lnTo>
+                <a:close/>
+              </a:path>
+            </a:pathLst>
+          </a:custGeom>
+          <a:solidFill>
+            <a:srgbClr val="0078D7"/>
+          </a:solidFill>
+          <a:ln>
+            <a:noFill/>
+          </a:ln>
+          <a:extLst/>
+        </p:spPr>
+        <p:txBody>
+          <a:bodyPr vert="horz" wrap="square" lIns="91440" tIns="45720" rIns="91440" bIns="45720" numCol="1" anchor="t" anchorCtr="0" compatLnSpc="1">
+            <a:prstTxWarp prst="textNoShape">
+              <a:avLst/>
+            </a:prstTxWarp>
+          </a:bodyPr>
+          <a:lstStyle/>
+          <a:p>
+            <a:endParaRPr lang="en-US"/>
+          </a:p>
+        </p:txBody>
+      </p:sp>
+      <p:sp>
+        <p:nvSpPr>
+          <p:cNvPr id="54" name="Rectangle 492">
+            <a:extLst>
+              <a:ext uri="{FF2B5EF4-FFF2-40B4-BE49-F238E27FC236}">
+                <a16:creationId xmlns:a16="http://schemas.microsoft.com/office/drawing/2014/main" id="{76B333F5-5BE7-45E9-BD48-E9D0D07DA938}"/>
+              </a:ext>
+            </a:extLst>
+          </p:cNvPr>
+          <p:cNvSpPr>
+            <a:spLocks noChangeArrowheads="1"/>
+          </p:cNvSpPr>
+          <p:nvPr/>
+        </p:nvSpPr>
+        <p:spPr bwMode="auto">
+          <a:xfrm>
+            <a:off x="5531331" y="2229807"/>
+            <a:ext cx="45719" cy="629383"/>
+          </a:xfrm>
+          <a:prstGeom prst="rect">
+            <a:avLst/>
+          </a:prstGeom>
+          <a:solidFill>
+            <a:srgbClr val="0078D7"/>
+          </a:solidFill>
+          <a:ln>
+            <a:noFill/>
+          </a:ln>
+          <a:extLst/>
+        </p:spPr>
+        <p:txBody>
+          <a:bodyPr vert="horz" wrap="square" lIns="91440" tIns="45720" rIns="91440" bIns="45720" numCol="1" anchor="t" anchorCtr="0" compatLnSpc="1">
+            <a:prstTxWarp prst="textNoShape">
+              <a:avLst/>
+            </a:prstTxWarp>
+          </a:bodyPr>
+          <a:lstStyle/>
+          <a:p>
+            <a:endParaRPr lang="en-US"/>
+          </a:p>
+        </p:txBody>
+      </p:sp>
+      <p:sp>
+        <p:nvSpPr>
+          <p:cNvPr id="55" name="Rectangle 493">
+            <a:extLst>
+              <a:ext uri="{FF2B5EF4-FFF2-40B4-BE49-F238E27FC236}">
+                <a16:creationId xmlns:a16="http://schemas.microsoft.com/office/drawing/2014/main" id="{8A54EDED-42BC-46EE-A615-FC234ED2F498}"/>
+              </a:ext>
+            </a:extLst>
+          </p:cNvPr>
+          <p:cNvSpPr>
+            <a:spLocks noChangeArrowheads="1"/>
+          </p:cNvSpPr>
+          <p:nvPr/>
+        </p:nvSpPr>
+        <p:spPr bwMode="auto">
+          <a:xfrm>
+            <a:off x="5726212" y="2229807"/>
+            <a:ext cx="45719" cy="629383"/>
+          </a:xfrm>
+          <a:prstGeom prst="rect">
+            <a:avLst/>
+          </a:prstGeom>
+          <a:solidFill>
+            <a:srgbClr val="0078D7"/>
+          </a:solidFill>
+          <a:ln>
+            <a:noFill/>
+          </a:ln>
+          <a:extLst/>
+        </p:spPr>
+        <p:txBody>
+          <a:bodyPr vert="horz" wrap="square" lIns="91440" tIns="45720" rIns="91440" bIns="45720" numCol="1" anchor="t" anchorCtr="0" compatLnSpc="1">
+            <a:prstTxWarp prst="textNoShape">
+              <a:avLst/>
+            </a:prstTxWarp>
+          </a:bodyPr>
+          <a:lstStyle/>
+          <a:p>
+            <a:endParaRPr lang="en-US"/>
+          </a:p>
+        </p:txBody>
+      </p:sp>
+      <p:sp>
+        <p:nvSpPr>
+          <p:cNvPr id="56" name="Rectangle 494">
+            <a:extLst>
+              <a:ext uri="{FF2B5EF4-FFF2-40B4-BE49-F238E27FC236}">
+                <a16:creationId xmlns:a16="http://schemas.microsoft.com/office/drawing/2014/main" id="{0C0F2DA3-520D-4F3A-9B10-9D4624051106}"/>
+              </a:ext>
+            </a:extLst>
+          </p:cNvPr>
+          <p:cNvSpPr>
+            <a:spLocks noChangeArrowheads="1"/>
+          </p:cNvSpPr>
+          <p:nvPr/>
+        </p:nvSpPr>
+        <p:spPr bwMode="auto">
+          <a:xfrm>
+            <a:off x="5359476" y="2517857"/>
+            <a:ext cx="549939" cy="45719"/>
+          </a:xfrm>
+          <a:prstGeom prst="rect">
+            <a:avLst/>
+          </a:prstGeom>
+          <a:solidFill>
+            <a:srgbClr val="0078D7"/>
+          </a:solidFill>
+          <a:ln>
+            <a:noFill/>
+          </a:ln>
+          <a:extLst/>
+        </p:spPr>
+        <p:txBody>
+          <a:bodyPr vert="horz" wrap="square" lIns="91440" tIns="45720" rIns="91440" bIns="45720" numCol="1" anchor="t" anchorCtr="0" compatLnSpc="1">
+            <a:prstTxWarp prst="textNoShape">
+              <a:avLst/>
+            </a:prstTxWarp>
+          </a:bodyPr>
+          <a:lstStyle/>
+          <a:p>
+            <a:endParaRPr lang="en-US"/>
+          </a:p>
+        </p:txBody>
+      </p:sp>
     </p:spTree>
     <p:extLst>
       <p:ext uri="{BB962C8B-B14F-4D97-AF65-F5344CB8AC3E}">

</xml_diff>